<commit_message>
Updates on PPT Report and added charts to excel
</commit_message>
<xml_diff>
--- a/SDV_Talent_Report.pptx
+++ b/SDV_Talent_Report.pptx
@@ -7,9 +7,9 @@
   <p:sldIdLst>
     <p:sldId id="257" r:id="rId2"/>
     <p:sldId id="258" r:id="rId3"/>
-    <p:sldId id="261" r:id="rId4"/>
-    <p:sldId id="260" r:id="rId5"/>
-    <p:sldId id="259" r:id="rId6"/>
+    <p:sldId id="262" r:id="rId4"/>
+    <p:sldId id="259" r:id="rId5"/>
+    <p:sldId id="260" r:id="rId6"/>
   </p:sldIdLst>
   <p:sldSz cx="9144000" cy="6858000" type="screen4x3"/>
   <p:notesSz cx="6858000" cy="9144000"/>
@@ -127,6 +127,2959 @@
 </p:presentation>
 </file>
 
+<file path=ppt/charts/chart1.xml><?xml version="1.0" encoding="utf-8"?>
+<c:chartSpace xmlns:c="http://schemas.openxmlformats.org/drawingml/2006/chart" xmlns:a="http://schemas.openxmlformats.org/drawingml/2006/main" xmlns:r="http://schemas.openxmlformats.org/officeDocument/2006/relationships" xmlns:c16r2="http://schemas.microsoft.com/office/drawing/2015/06/chart">
+  <c:date1904 val="0"/>
+  <c:lang val="en-US"/>
+  <c:roundedCorners val="0"/>
+  <mc:AlternateContent xmlns:mc="http://schemas.openxmlformats.org/markup-compatibility/2006">
+    <mc:Choice xmlns:c14="http://schemas.microsoft.com/office/drawing/2007/8/2/chart" Requires="c14">
+      <c14:style val="102"/>
+    </mc:Choice>
+    <mc:Fallback>
+      <c:style val="2"/>
+    </mc:Fallback>
+  </mc:AlternateContent>
+  <c:pivotSource>
+    <c:name>[Automotive_HR_Software_Talent_Dataset_v3_Enhanced.xlsx]Key_Question _4!PivotTable4</c:name>
+    <c:fmtId val="8"/>
+  </c:pivotSource>
+  <c:chart>
+    <c:title>
+      <c:tx>
+        <c:rich>
+          <a:bodyPr rot="0" spcFirstLastPara="1" vertOverflow="ellipsis" vert="horz" wrap="square" anchor="ctr" anchorCtr="1"/>
+          <a:lstStyle/>
+          <a:p>
+            <a:pPr>
+              <a:defRPr sz="1400" b="0" i="0" u="none" strike="noStrike" kern="1200" spc="0" baseline="0">
+                <a:solidFill>
+                  <a:schemeClr val="tx1">
+                    <a:lumMod val="65000"/>
+                    <a:lumOff val="35000"/>
+                  </a:schemeClr>
+                </a:solidFill>
+                <a:latin typeface="+mn-lt"/>
+                <a:ea typeface="+mn-ea"/>
+                <a:cs typeface="+mn-cs"/>
+              </a:defRPr>
+            </a:pPr>
+            <a:r>
+              <a:rPr lang="en-US" b="0"/>
+              <a:t>Hiring Trend (2018-2025H1)</a:t>
+            </a:r>
+          </a:p>
+        </c:rich>
+      </c:tx>
+      <c:overlay val="0"/>
+      <c:spPr>
+        <a:noFill/>
+        <a:ln>
+          <a:noFill/>
+        </a:ln>
+        <a:effectLst/>
+      </c:spPr>
+      <c:txPr>
+        <a:bodyPr rot="0" spcFirstLastPara="1" vertOverflow="ellipsis" vert="horz" wrap="square" anchor="ctr" anchorCtr="1"/>
+        <a:lstStyle/>
+        <a:p>
+          <a:pPr>
+            <a:defRPr sz="1400" b="0" i="0" u="none" strike="noStrike" kern="1200" spc="0" baseline="0">
+              <a:solidFill>
+                <a:schemeClr val="tx1">
+                  <a:lumMod val="65000"/>
+                  <a:lumOff val="35000"/>
+                </a:schemeClr>
+              </a:solidFill>
+              <a:latin typeface="+mn-lt"/>
+              <a:ea typeface="+mn-ea"/>
+              <a:cs typeface="+mn-cs"/>
+            </a:defRPr>
+          </a:pPr>
+          <a:endParaRPr lang="en-US"/>
+        </a:p>
+      </c:txPr>
+    </c:title>
+    <c:autoTitleDeleted val="0"/>
+    <c:pivotFmts>
+      <c:pivotFmt>
+        <c:idx val="0"/>
+        <c:spPr>
+          <a:solidFill>
+            <a:schemeClr val="accent1"/>
+          </a:solidFill>
+          <a:ln w="28575" cap="rnd">
+            <a:solidFill>
+              <a:schemeClr val="accent1"/>
+            </a:solidFill>
+            <a:round/>
+          </a:ln>
+          <a:effectLst/>
+        </c:spPr>
+        <c:marker>
+          <c:symbol val="none"/>
+        </c:marker>
+        <c:dLbl>
+          <c:idx val="0"/>
+          <c:spPr>
+            <a:noFill/>
+            <a:ln>
+              <a:noFill/>
+            </a:ln>
+            <a:effectLst/>
+          </c:spPr>
+          <c:txPr>
+            <a:bodyPr rot="0" spcFirstLastPara="1" vertOverflow="ellipsis" vert="horz" wrap="square" lIns="38100" tIns="19050" rIns="38100" bIns="19050" anchor="ctr" anchorCtr="1">
+              <a:spAutoFit/>
+            </a:bodyPr>
+            <a:lstStyle/>
+            <a:p>
+              <a:pPr>
+                <a:defRPr sz="900" b="0" i="0" u="none" strike="noStrike" kern="1200" baseline="0">
+                  <a:solidFill>
+                    <a:schemeClr val="tx1">
+                      <a:lumMod val="75000"/>
+                      <a:lumOff val="25000"/>
+                    </a:schemeClr>
+                  </a:solidFill>
+                  <a:latin typeface="+mn-lt"/>
+                  <a:ea typeface="+mn-ea"/>
+                  <a:cs typeface="+mn-cs"/>
+                </a:defRPr>
+              </a:pPr>
+              <a:endParaRPr lang="en-US"/>
+            </a:p>
+          </c:txPr>
+          <c:showLegendKey val="0"/>
+          <c:showVal val="0"/>
+          <c:showCatName val="0"/>
+          <c:showSerName val="0"/>
+          <c:showPercent val="0"/>
+          <c:showBubbleSize val="0"/>
+          <c:extLst>
+            <c:ext xmlns:c15="http://schemas.microsoft.com/office/drawing/2012/chart" uri="{CE6537A1-D6FC-4f65-9D91-7224C49458BB}"/>
+          </c:extLst>
+        </c:dLbl>
+      </c:pivotFmt>
+      <c:pivotFmt>
+        <c:idx val="1"/>
+        <c:spPr>
+          <a:solidFill>
+            <a:schemeClr val="accent1"/>
+          </a:solidFill>
+          <a:ln>
+            <a:noFill/>
+          </a:ln>
+          <a:effectLst/>
+        </c:spPr>
+        <c:marker>
+          <c:symbol val="none"/>
+        </c:marker>
+        <c:dLbl>
+          <c:idx val="0"/>
+          <c:showLegendKey val="0"/>
+          <c:showVal val="1"/>
+          <c:showCatName val="0"/>
+          <c:showSerName val="0"/>
+          <c:showPercent val="0"/>
+          <c:showBubbleSize val="0"/>
+          <c:extLst>
+            <c:ext xmlns:c15="http://schemas.microsoft.com/office/drawing/2012/chart" uri="{CE6537A1-D6FC-4f65-9D91-7224C49458BB}"/>
+          </c:extLst>
+        </c:dLbl>
+      </c:pivotFmt>
+      <c:pivotFmt>
+        <c:idx val="2"/>
+        <c:spPr>
+          <a:solidFill>
+            <a:schemeClr val="accent1"/>
+          </a:solidFill>
+          <a:ln>
+            <a:noFill/>
+          </a:ln>
+          <a:effectLst/>
+        </c:spPr>
+        <c:marker>
+          <c:symbol val="none"/>
+        </c:marker>
+        <c:dLbl>
+          <c:idx val="0"/>
+          <c:showLegendKey val="0"/>
+          <c:showVal val="1"/>
+          <c:showCatName val="0"/>
+          <c:showSerName val="0"/>
+          <c:showPercent val="0"/>
+          <c:showBubbleSize val="0"/>
+          <c:extLst>
+            <c:ext xmlns:c15="http://schemas.microsoft.com/office/drawing/2012/chart" uri="{CE6537A1-D6FC-4f65-9D91-7224C49458BB}"/>
+          </c:extLst>
+        </c:dLbl>
+      </c:pivotFmt>
+      <c:pivotFmt>
+        <c:idx val="3"/>
+        <c:spPr>
+          <a:solidFill>
+            <a:schemeClr val="accent1"/>
+          </a:solidFill>
+          <a:ln>
+            <a:noFill/>
+          </a:ln>
+          <a:effectLst/>
+        </c:spPr>
+        <c:marker>
+          <c:symbol val="none"/>
+        </c:marker>
+        <c:dLbl>
+          <c:idx val="0"/>
+          <c:showLegendKey val="0"/>
+          <c:showVal val="1"/>
+          <c:showCatName val="0"/>
+          <c:showSerName val="0"/>
+          <c:showPercent val="0"/>
+          <c:showBubbleSize val="0"/>
+          <c:extLst>
+            <c:ext xmlns:c15="http://schemas.microsoft.com/office/drawing/2012/chart" uri="{CE6537A1-D6FC-4f65-9D91-7224C49458BB}"/>
+          </c:extLst>
+        </c:dLbl>
+      </c:pivotFmt>
+      <c:pivotFmt>
+        <c:idx val="4"/>
+        <c:spPr>
+          <a:solidFill>
+            <a:schemeClr val="accent1"/>
+          </a:solidFill>
+          <a:ln>
+            <a:noFill/>
+          </a:ln>
+          <a:effectLst/>
+        </c:spPr>
+        <c:marker>
+          <c:symbol val="none"/>
+        </c:marker>
+        <c:dLbl>
+          <c:idx val="0"/>
+          <c:showLegendKey val="0"/>
+          <c:showVal val="1"/>
+          <c:showCatName val="0"/>
+          <c:showSerName val="0"/>
+          <c:showPercent val="0"/>
+          <c:showBubbleSize val="0"/>
+          <c:extLst>
+            <c:ext xmlns:c15="http://schemas.microsoft.com/office/drawing/2012/chart" uri="{CE6537A1-D6FC-4f65-9D91-7224C49458BB}"/>
+          </c:extLst>
+        </c:dLbl>
+      </c:pivotFmt>
+      <c:pivotFmt>
+        <c:idx val="5"/>
+        <c:spPr>
+          <a:solidFill>
+            <a:schemeClr val="accent1"/>
+          </a:solidFill>
+          <a:ln>
+            <a:noFill/>
+          </a:ln>
+          <a:effectLst/>
+        </c:spPr>
+        <c:marker>
+          <c:symbol val="none"/>
+        </c:marker>
+        <c:dLbl>
+          <c:idx val="0"/>
+          <c:showLegendKey val="0"/>
+          <c:showVal val="1"/>
+          <c:showCatName val="0"/>
+          <c:showSerName val="0"/>
+          <c:showPercent val="0"/>
+          <c:showBubbleSize val="0"/>
+          <c:extLst>
+            <c:ext xmlns:c15="http://schemas.microsoft.com/office/drawing/2012/chart" uri="{CE6537A1-D6FC-4f65-9D91-7224C49458BB}"/>
+          </c:extLst>
+        </c:dLbl>
+      </c:pivotFmt>
+      <c:pivotFmt>
+        <c:idx val="6"/>
+        <c:spPr>
+          <a:solidFill>
+            <a:schemeClr val="accent1"/>
+          </a:solidFill>
+          <a:ln>
+            <a:noFill/>
+          </a:ln>
+          <a:effectLst/>
+        </c:spPr>
+        <c:marker>
+          <c:symbol val="none"/>
+        </c:marker>
+        <c:dLbl>
+          <c:idx val="0"/>
+          <c:showLegendKey val="0"/>
+          <c:showVal val="1"/>
+          <c:showCatName val="0"/>
+          <c:showSerName val="0"/>
+          <c:showPercent val="0"/>
+          <c:showBubbleSize val="0"/>
+          <c:extLst>
+            <c:ext xmlns:c15="http://schemas.microsoft.com/office/drawing/2012/chart" uri="{CE6537A1-D6FC-4f65-9D91-7224C49458BB}"/>
+          </c:extLst>
+        </c:dLbl>
+      </c:pivotFmt>
+      <c:pivotFmt>
+        <c:idx val="7"/>
+        <c:spPr>
+          <a:solidFill>
+            <a:schemeClr val="accent1"/>
+          </a:solidFill>
+          <a:ln>
+            <a:noFill/>
+          </a:ln>
+          <a:effectLst/>
+        </c:spPr>
+        <c:marker>
+          <c:symbol val="none"/>
+        </c:marker>
+        <c:dLbl>
+          <c:idx val="0"/>
+          <c:showLegendKey val="0"/>
+          <c:showVal val="1"/>
+          <c:showCatName val="0"/>
+          <c:showSerName val="0"/>
+          <c:showPercent val="0"/>
+          <c:showBubbleSize val="0"/>
+          <c:extLst>
+            <c:ext xmlns:c15="http://schemas.microsoft.com/office/drawing/2012/chart" uri="{CE6537A1-D6FC-4f65-9D91-7224C49458BB}"/>
+          </c:extLst>
+        </c:dLbl>
+      </c:pivotFmt>
+      <c:pivotFmt>
+        <c:idx val="8"/>
+        <c:spPr>
+          <a:solidFill>
+            <a:schemeClr val="accent1"/>
+          </a:solidFill>
+          <a:ln w="28575" cap="rnd">
+            <a:solidFill>
+              <a:schemeClr val="accent1"/>
+            </a:solidFill>
+            <a:round/>
+          </a:ln>
+          <a:effectLst/>
+        </c:spPr>
+        <c:marker>
+          <c:symbol val="none"/>
+        </c:marker>
+      </c:pivotFmt>
+      <c:pivotFmt>
+        <c:idx val="9"/>
+        <c:spPr>
+          <a:solidFill>
+            <a:schemeClr val="accent1"/>
+          </a:solidFill>
+          <a:ln w="28575" cap="rnd">
+            <a:solidFill>
+              <a:schemeClr val="accent1"/>
+            </a:solidFill>
+            <a:round/>
+          </a:ln>
+          <a:effectLst/>
+        </c:spPr>
+        <c:marker>
+          <c:symbol val="none"/>
+        </c:marker>
+      </c:pivotFmt>
+      <c:pivotFmt>
+        <c:idx val="10"/>
+        <c:spPr>
+          <a:solidFill>
+            <a:schemeClr val="accent1"/>
+          </a:solidFill>
+          <a:ln w="28575" cap="rnd">
+            <a:solidFill>
+              <a:schemeClr val="accent1"/>
+            </a:solidFill>
+            <a:round/>
+          </a:ln>
+          <a:effectLst/>
+        </c:spPr>
+        <c:marker>
+          <c:symbol val="none"/>
+        </c:marker>
+      </c:pivotFmt>
+      <c:pivotFmt>
+        <c:idx val="11"/>
+        <c:spPr>
+          <a:solidFill>
+            <a:schemeClr val="accent1"/>
+          </a:solidFill>
+          <a:ln w="28575" cap="rnd">
+            <a:solidFill>
+              <a:schemeClr val="accent1"/>
+            </a:solidFill>
+            <a:round/>
+          </a:ln>
+          <a:effectLst/>
+        </c:spPr>
+        <c:marker>
+          <c:symbol val="none"/>
+        </c:marker>
+      </c:pivotFmt>
+      <c:pivotFmt>
+        <c:idx val="12"/>
+        <c:spPr>
+          <a:solidFill>
+            <a:schemeClr val="accent1"/>
+          </a:solidFill>
+          <a:ln w="28575" cap="rnd">
+            <a:solidFill>
+              <a:schemeClr val="accent1"/>
+            </a:solidFill>
+            <a:round/>
+          </a:ln>
+          <a:effectLst/>
+        </c:spPr>
+        <c:marker>
+          <c:symbol val="none"/>
+        </c:marker>
+      </c:pivotFmt>
+      <c:pivotFmt>
+        <c:idx val="13"/>
+        <c:spPr>
+          <a:solidFill>
+            <a:schemeClr val="accent1"/>
+          </a:solidFill>
+          <a:ln w="28575" cap="rnd">
+            <a:solidFill>
+              <a:schemeClr val="accent1"/>
+            </a:solidFill>
+            <a:round/>
+          </a:ln>
+          <a:effectLst/>
+        </c:spPr>
+        <c:marker>
+          <c:symbol val="none"/>
+        </c:marker>
+      </c:pivotFmt>
+      <c:pivotFmt>
+        <c:idx val="14"/>
+        <c:spPr>
+          <a:solidFill>
+            <a:schemeClr val="accent1"/>
+          </a:solidFill>
+          <a:ln w="28575" cap="rnd">
+            <a:solidFill>
+              <a:schemeClr val="accent1"/>
+            </a:solidFill>
+            <a:round/>
+          </a:ln>
+          <a:effectLst/>
+        </c:spPr>
+        <c:marker>
+          <c:symbol val="none"/>
+        </c:marker>
+        <c:dLbl>
+          <c:idx val="0"/>
+          <c:layout>
+            <c:manualLayout>
+              <c:x val="-3.7046211951902303E-2"/>
+              <c:y val="-6.9444444444444461E-2"/>
+            </c:manualLayout>
+          </c:layout>
+          <c:spPr>
+            <a:noFill/>
+            <a:ln>
+              <a:noFill/>
+            </a:ln>
+            <a:effectLst/>
+          </c:spPr>
+          <c:txPr>
+            <a:bodyPr rot="0" spcFirstLastPara="1" vertOverflow="ellipsis" vert="horz" wrap="square" lIns="38100" tIns="19050" rIns="38100" bIns="19050" anchor="ctr" anchorCtr="1">
+              <a:spAutoFit/>
+            </a:bodyPr>
+            <a:lstStyle/>
+            <a:p>
+              <a:pPr>
+                <a:defRPr sz="900" b="0" i="0" u="none" strike="noStrike" kern="1200" baseline="0">
+                  <a:solidFill>
+                    <a:schemeClr val="tx1">
+                      <a:lumMod val="75000"/>
+                      <a:lumOff val="25000"/>
+                    </a:schemeClr>
+                  </a:solidFill>
+                  <a:latin typeface="+mn-lt"/>
+                  <a:ea typeface="+mn-ea"/>
+                  <a:cs typeface="+mn-cs"/>
+                </a:defRPr>
+              </a:pPr>
+              <a:endParaRPr lang="en-US"/>
+            </a:p>
+          </c:txPr>
+          <c:showLegendKey val="0"/>
+          <c:showVal val="1"/>
+          <c:showCatName val="0"/>
+          <c:showSerName val="0"/>
+          <c:showPercent val="0"/>
+          <c:showBubbleSize val="0"/>
+          <c:extLst>
+            <c:ext xmlns:c15="http://schemas.microsoft.com/office/drawing/2012/chart" uri="{CE6537A1-D6FC-4f65-9D91-7224C49458BB}"/>
+          </c:extLst>
+        </c:dLbl>
+      </c:pivotFmt>
+      <c:pivotFmt>
+        <c:idx val="15"/>
+        <c:spPr>
+          <a:solidFill>
+            <a:schemeClr val="accent1"/>
+          </a:solidFill>
+          <a:ln w="28575" cap="rnd">
+            <a:solidFill>
+              <a:schemeClr val="accent1"/>
+            </a:solidFill>
+            <a:round/>
+          </a:ln>
+          <a:effectLst/>
+        </c:spPr>
+        <c:marker>
+          <c:symbol val="none"/>
+        </c:marker>
+        <c:dLbl>
+          <c:idx val="0"/>
+          <c:layout>
+            <c:manualLayout>
+              <c:x val="-3.0575141098302238E-2"/>
+              <c:y val="5.0835269008595953E-2"/>
+            </c:manualLayout>
+          </c:layout>
+          <c:spPr>
+            <a:noFill/>
+            <a:ln>
+              <a:noFill/>
+            </a:ln>
+            <a:effectLst/>
+          </c:spPr>
+          <c:txPr>
+            <a:bodyPr rot="0" spcFirstLastPara="1" vertOverflow="ellipsis" vert="horz" wrap="square" lIns="38100" tIns="19050" rIns="38100" bIns="19050" anchor="ctr" anchorCtr="1">
+              <a:spAutoFit/>
+            </a:bodyPr>
+            <a:lstStyle/>
+            <a:p>
+              <a:pPr>
+                <a:defRPr sz="900" b="0" i="0" u="none" strike="noStrike" kern="1200" baseline="0">
+                  <a:solidFill>
+                    <a:schemeClr val="tx1">
+                      <a:lumMod val="75000"/>
+                      <a:lumOff val="25000"/>
+                    </a:schemeClr>
+                  </a:solidFill>
+                  <a:latin typeface="+mn-lt"/>
+                  <a:ea typeface="+mn-ea"/>
+                  <a:cs typeface="+mn-cs"/>
+                </a:defRPr>
+              </a:pPr>
+              <a:endParaRPr lang="en-US"/>
+            </a:p>
+          </c:txPr>
+          <c:showLegendKey val="0"/>
+          <c:showVal val="1"/>
+          <c:showCatName val="0"/>
+          <c:showSerName val="0"/>
+          <c:showPercent val="0"/>
+          <c:showBubbleSize val="0"/>
+          <c:extLst>
+            <c:ext xmlns:c15="http://schemas.microsoft.com/office/drawing/2012/chart" uri="{CE6537A1-D6FC-4f65-9D91-7224C49458BB}"/>
+          </c:extLst>
+        </c:dLbl>
+      </c:pivotFmt>
+      <c:pivotFmt>
+        <c:idx val="16"/>
+        <c:spPr>
+          <a:solidFill>
+            <a:schemeClr val="accent1"/>
+          </a:solidFill>
+          <a:ln w="28575" cap="rnd">
+            <a:solidFill>
+              <a:schemeClr val="accent1"/>
+            </a:solidFill>
+            <a:round/>
+          </a:ln>
+          <a:effectLst/>
+        </c:spPr>
+        <c:marker>
+          <c:symbol val="none"/>
+        </c:marker>
+        <c:dLbl>
+          <c:idx val="0"/>
+          <c:spPr>
+            <a:noFill/>
+            <a:ln>
+              <a:noFill/>
+            </a:ln>
+            <a:effectLst/>
+          </c:spPr>
+          <c:txPr>
+            <a:bodyPr rot="0" spcFirstLastPara="1" vertOverflow="ellipsis" vert="horz" wrap="square" lIns="38100" tIns="19050" rIns="38100" bIns="19050" anchor="ctr" anchorCtr="1">
+              <a:spAutoFit/>
+            </a:bodyPr>
+            <a:lstStyle/>
+            <a:p>
+              <a:pPr>
+                <a:defRPr sz="900" b="0" i="0" u="none" strike="noStrike" kern="1200" baseline="0">
+                  <a:solidFill>
+                    <a:schemeClr val="tx1">
+                      <a:lumMod val="75000"/>
+                      <a:lumOff val="25000"/>
+                    </a:schemeClr>
+                  </a:solidFill>
+                  <a:latin typeface="+mn-lt"/>
+                  <a:ea typeface="+mn-ea"/>
+                  <a:cs typeface="+mn-cs"/>
+                </a:defRPr>
+              </a:pPr>
+              <a:endParaRPr lang="en-US"/>
+            </a:p>
+          </c:txPr>
+          <c:showLegendKey val="0"/>
+          <c:showVal val="0"/>
+          <c:showCatName val="0"/>
+          <c:showSerName val="0"/>
+          <c:showPercent val="0"/>
+          <c:showBubbleSize val="0"/>
+          <c:extLst>
+            <c:ext xmlns:c15="http://schemas.microsoft.com/office/drawing/2012/chart" uri="{CE6537A1-D6FC-4f65-9D91-7224C49458BB}"/>
+          </c:extLst>
+        </c:dLbl>
+      </c:pivotFmt>
+      <c:pivotFmt>
+        <c:idx val="17"/>
+        <c:spPr>
+          <a:solidFill>
+            <a:schemeClr val="accent1"/>
+          </a:solidFill>
+          <a:ln w="28575" cap="rnd">
+            <a:solidFill>
+              <a:schemeClr val="accent1"/>
+            </a:solidFill>
+            <a:round/>
+          </a:ln>
+          <a:effectLst/>
+        </c:spPr>
+        <c:marker>
+          <c:symbol val="none"/>
+        </c:marker>
+        <c:dLbl>
+          <c:idx val="0"/>
+          <c:layout>
+            <c:manualLayout>
+              <c:x val="-3.7046211951902303E-2"/>
+              <c:y val="-6.9444444444444461E-2"/>
+            </c:manualLayout>
+          </c:layout>
+          <c:spPr>
+            <a:noFill/>
+            <a:ln>
+              <a:noFill/>
+            </a:ln>
+            <a:effectLst/>
+          </c:spPr>
+          <c:txPr>
+            <a:bodyPr rot="0" spcFirstLastPara="1" vertOverflow="ellipsis" vert="horz" wrap="square" lIns="38100" tIns="19050" rIns="38100" bIns="19050" anchor="ctr" anchorCtr="1">
+              <a:spAutoFit/>
+            </a:bodyPr>
+            <a:lstStyle/>
+            <a:p>
+              <a:pPr>
+                <a:defRPr sz="900" b="0" i="0" u="none" strike="noStrike" kern="1200" baseline="0">
+                  <a:solidFill>
+                    <a:schemeClr val="tx1">
+                      <a:lumMod val="75000"/>
+                      <a:lumOff val="25000"/>
+                    </a:schemeClr>
+                  </a:solidFill>
+                  <a:latin typeface="+mn-lt"/>
+                  <a:ea typeface="+mn-ea"/>
+                  <a:cs typeface="+mn-cs"/>
+                </a:defRPr>
+              </a:pPr>
+              <a:endParaRPr lang="en-US"/>
+            </a:p>
+          </c:txPr>
+          <c:showLegendKey val="0"/>
+          <c:showVal val="1"/>
+          <c:showCatName val="0"/>
+          <c:showSerName val="0"/>
+          <c:showPercent val="0"/>
+          <c:showBubbleSize val="0"/>
+          <c:extLst>
+            <c:ext xmlns:c15="http://schemas.microsoft.com/office/drawing/2012/chart" uri="{CE6537A1-D6FC-4f65-9D91-7224C49458BB}"/>
+          </c:extLst>
+        </c:dLbl>
+      </c:pivotFmt>
+      <c:pivotFmt>
+        <c:idx val="18"/>
+        <c:spPr>
+          <a:solidFill>
+            <a:schemeClr val="accent1"/>
+          </a:solidFill>
+          <a:ln w="28575" cap="rnd">
+            <a:solidFill>
+              <a:schemeClr val="accent1"/>
+            </a:solidFill>
+            <a:round/>
+          </a:ln>
+          <a:effectLst/>
+        </c:spPr>
+        <c:marker>
+          <c:symbol val="none"/>
+        </c:marker>
+        <c:dLbl>
+          <c:idx val="0"/>
+          <c:layout>
+            <c:manualLayout>
+              <c:x val="-3.0575141098302238E-2"/>
+              <c:y val="5.0835269008595953E-2"/>
+            </c:manualLayout>
+          </c:layout>
+          <c:spPr>
+            <a:noFill/>
+            <a:ln>
+              <a:noFill/>
+            </a:ln>
+            <a:effectLst/>
+          </c:spPr>
+          <c:txPr>
+            <a:bodyPr rot="0" spcFirstLastPara="1" vertOverflow="ellipsis" vert="horz" wrap="square" lIns="38100" tIns="19050" rIns="38100" bIns="19050" anchor="ctr" anchorCtr="1">
+              <a:spAutoFit/>
+            </a:bodyPr>
+            <a:lstStyle/>
+            <a:p>
+              <a:pPr>
+                <a:defRPr sz="900" b="0" i="0" u="none" strike="noStrike" kern="1200" baseline="0">
+                  <a:solidFill>
+                    <a:schemeClr val="tx1">
+                      <a:lumMod val="75000"/>
+                      <a:lumOff val="25000"/>
+                    </a:schemeClr>
+                  </a:solidFill>
+                  <a:latin typeface="+mn-lt"/>
+                  <a:ea typeface="+mn-ea"/>
+                  <a:cs typeface="+mn-cs"/>
+                </a:defRPr>
+              </a:pPr>
+              <a:endParaRPr lang="en-US"/>
+            </a:p>
+          </c:txPr>
+          <c:showLegendKey val="0"/>
+          <c:showVal val="1"/>
+          <c:showCatName val="0"/>
+          <c:showSerName val="0"/>
+          <c:showPercent val="0"/>
+          <c:showBubbleSize val="0"/>
+          <c:extLst>
+            <c:ext xmlns:c15="http://schemas.microsoft.com/office/drawing/2012/chart" uri="{CE6537A1-D6FC-4f65-9D91-7224C49458BB}"/>
+          </c:extLst>
+        </c:dLbl>
+      </c:pivotFmt>
+      <c:pivotFmt>
+        <c:idx val="19"/>
+        <c:spPr>
+          <a:solidFill>
+            <a:schemeClr val="accent1"/>
+          </a:solidFill>
+          <a:ln w="28575" cap="rnd">
+            <a:solidFill>
+              <a:schemeClr val="accent1"/>
+            </a:solidFill>
+            <a:round/>
+          </a:ln>
+          <a:effectLst/>
+        </c:spPr>
+        <c:marker>
+          <c:symbol val="none"/>
+        </c:marker>
+        <c:dLbl>
+          <c:idx val="0"/>
+          <c:spPr>
+            <a:noFill/>
+            <a:ln>
+              <a:noFill/>
+            </a:ln>
+            <a:effectLst/>
+          </c:spPr>
+          <c:txPr>
+            <a:bodyPr rot="0" spcFirstLastPara="1" vertOverflow="ellipsis" vert="horz" wrap="square" lIns="38100" tIns="19050" rIns="38100" bIns="19050" anchor="ctr" anchorCtr="1">
+              <a:spAutoFit/>
+            </a:bodyPr>
+            <a:lstStyle/>
+            <a:p>
+              <a:pPr>
+                <a:defRPr sz="900" b="0" i="0" u="none" strike="noStrike" kern="1200" baseline="0">
+                  <a:solidFill>
+                    <a:schemeClr val="tx1">
+                      <a:lumMod val="75000"/>
+                      <a:lumOff val="25000"/>
+                    </a:schemeClr>
+                  </a:solidFill>
+                  <a:latin typeface="+mn-lt"/>
+                  <a:ea typeface="+mn-ea"/>
+                  <a:cs typeface="+mn-cs"/>
+                </a:defRPr>
+              </a:pPr>
+              <a:endParaRPr lang="en-US"/>
+            </a:p>
+          </c:txPr>
+          <c:showLegendKey val="0"/>
+          <c:showVal val="0"/>
+          <c:showCatName val="0"/>
+          <c:showSerName val="0"/>
+          <c:showPercent val="0"/>
+          <c:showBubbleSize val="0"/>
+          <c:extLst>
+            <c:ext xmlns:c15="http://schemas.microsoft.com/office/drawing/2012/chart" uri="{CE6537A1-D6FC-4f65-9D91-7224C49458BB}"/>
+          </c:extLst>
+        </c:dLbl>
+      </c:pivotFmt>
+      <c:pivotFmt>
+        <c:idx val="20"/>
+        <c:spPr>
+          <a:solidFill>
+            <a:schemeClr val="accent1"/>
+          </a:solidFill>
+          <a:ln w="28575" cap="rnd">
+            <a:solidFill>
+              <a:schemeClr val="accent1"/>
+            </a:solidFill>
+            <a:round/>
+          </a:ln>
+          <a:effectLst/>
+        </c:spPr>
+        <c:marker>
+          <c:symbol val="none"/>
+        </c:marker>
+        <c:dLbl>
+          <c:idx val="0"/>
+          <c:layout>
+            <c:manualLayout>
+              <c:x val="-3.7046211951902303E-2"/>
+              <c:y val="-6.9444444444444461E-2"/>
+            </c:manualLayout>
+          </c:layout>
+          <c:spPr>
+            <a:noFill/>
+            <a:ln>
+              <a:noFill/>
+            </a:ln>
+            <a:effectLst/>
+          </c:spPr>
+          <c:txPr>
+            <a:bodyPr rot="0" spcFirstLastPara="1" vertOverflow="ellipsis" vert="horz" wrap="square" lIns="38100" tIns="19050" rIns="38100" bIns="19050" anchor="ctr" anchorCtr="1">
+              <a:spAutoFit/>
+            </a:bodyPr>
+            <a:lstStyle/>
+            <a:p>
+              <a:pPr>
+                <a:defRPr sz="900" b="0" i="0" u="none" strike="noStrike" kern="1200" baseline="0">
+                  <a:solidFill>
+                    <a:schemeClr val="tx1">
+                      <a:lumMod val="75000"/>
+                      <a:lumOff val="25000"/>
+                    </a:schemeClr>
+                  </a:solidFill>
+                  <a:latin typeface="+mn-lt"/>
+                  <a:ea typeface="+mn-ea"/>
+                  <a:cs typeface="+mn-cs"/>
+                </a:defRPr>
+              </a:pPr>
+              <a:endParaRPr lang="en-US"/>
+            </a:p>
+          </c:txPr>
+          <c:showLegendKey val="0"/>
+          <c:showVal val="1"/>
+          <c:showCatName val="0"/>
+          <c:showSerName val="0"/>
+          <c:showPercent val="0"/>
+          <c:showBubbleSize val="0"/>
+          <c:extLst>
+            <c:ext xmlns:c15="http://schemas.microsoft.com/office/drawing/2012/chart" uri="{CE6537A1-D6FC-4f65-9D91-7224C49458BB}"/>
+          </c:extLst>
+        </c:dLbl>
+      </c:pivotFmt>
+      <c:pivotFmt>
+        <c:idx val="21"/>
+        <c:spPr>
+          <a:solidFill>
+            <a:schemeClr val="accent1"/>
+          </a:solidFill>
+          <a:ln w="28575" cap="rnd">
+            <a:solidFill>
+              <a:schemeClr val="accent1"/>
+            </a:solidFill>
+            <a:round/>
+          </a:ln>
+          <a:effectLst/>
+        </c:spPr>
+        <c:marker>
+          <c:symbol val="none"/>
+        </c:marker>
+        <c:dLbl>
+          <c:idx val="0"/>
+          <c:layout>
+            <c:manualLayout>
+              <c:x val="-3.0575141098302238E-2"/>
+              <c:y val="5.0835269008595953E-2"/>
+            </c:manualLayout>
+          </c:layout>
+          <c:spPr>
+            <a:noFill/>
+            <a:ln>
+              <a:noFill/>
+            </a:ln>
+            <a:effectLst/>
+          </c:spPr>
+          <c:txPr>
+            <a:bodyPr rot="0" spcFirstLastPara="1" vertOverflow="ellipsis" vert="horz" wrap="square" lIns="38100" tIns="19050" rIns="38100" bIns="19050" anchor="ctr" anchorCtr="1">
+              <a:spAutoFit/>
+            </a:bodyPr>
+            <a:lstStyle/>
+            <a:p>
+              <a:pPr>
+                <a:defRPr sz="900" b="0" i="0" u="none" strike="noStrike" kern="1200" baseline="0">
+                  <a:solidFill>
+                    <a:schemeClr val="tx1">
+                      <a:lumMod val="75000"/>
+                      <a:lumOff val="25000"/>
+                    </a:schemeClr>
+                  </a:solidFill>
+                  <a:latin typeface="+mn-lt"/>
+                  <a:ea typeface="+mn-ea"/>
+                  <a:cs typeface="+mn-cs"/>
+                </a:defRPr>
+              </a:pPr>
+              <a:endParaRPr lang="en-US"/>
+            </a:p>
+          </c:txPr>
+          <c:showLegendKey val="0"/>
+          <c:showVal val="1"/>
+          <c:showCatName val="0"/>
+          <c:showSerName val="0"/>
+          <c:showPercent val="0"/>
+          <c:showBubbleSize val="0"/>
+          <c:extLst>
+            <c:ext xmlns:c15="http://schemas.microsoft.com/office/drawing/2012/chart" uri="{CE6537A1-D6FC-4f65-9D91-7224C49458BB}"/>
+          </c:extLst>
+        </c:dLbl>
+      </c:pivotFmt>
+    </c:pivotFmts>
+    <c:plotArea>
+      <c:layout>
+        <c:manualLayout>
+          <c:layoutTarget val="inner"/>
+          <c:xMode val="edge"/>
+          <c:yMode val="edge"/>
+          <c:x val="8.1299718439813706E-2"/>
+          <c:y val="0.18097222222222226"/>
+          <c:w val="0.8873534868316536"/>
+          <c:h val="0.72088764946048411"/>
+        </c:manualLayout>
+      </c:layout>
+      <c:lineChart>
+        <c:grouping val="standard"/>
+        <c:varyColors val="0"/>
+        <c:ser>
+          <c:idx val="0"/>
+          <c:order val="0"/>
+          <c:tx>
+            <c:strRef>
+              <c:f>'Key_Question _4'!$B$68</c:f>
+              <c:strCache>
+                <c:ptCount val="1"/>
+                <c:pt idx="0">
+                  <c:v>Total</c:v>
+                </c:pt>
+              </c:strCache>
+            </c:strRef>
+          </c:tx>
+          <c:spPr>
+            <a:ln w="28575" cap="rnd">
+              <a:solidFill>
+                <a:schemeClr val="accent1"/>
+              </a:solidFill>
+              <a:round/>
+            </a:ln>
+            <a:effectLst/>
+          </c:spPr>
+          <c:marker>
+            <c:symbol val="none"/>
+          </c:marker>
+          <c:dPt>
+            <c:idx val="4"/>
+            <c:marker>
+              <c:symbol val="none"/>
+            </c:marker>
+            <c:bubble3D val="0"/>
+            <c:spPr>
+              <a:ln w="28575" cap="rnd">
+                <a:solidFill>
+                  <a:schemeClr val="accent1"/>
+                </a:solidFill>
+                <a:round/>
+              </a:ln>
+              <a:effectLst/>
+            </c:spPr>
+            <c:extLst>
+              <c:ext xmlns:c16="http://schemas.microsoft.com/office/drawing/2014/chart" uri="{C3380CC4-5D6E-409C-BE32-E72D297353CC}">
+                <c16:uniqueId val="{00000001-423E-49D5-94A2-61083230509B}"/>
+              </c:ext>
+            </c:extLst>
+          </c:dPt>
+          <c:dPt>
+            <c:idx val="5"/>
+            <c:marker>
+              <c:symbol val="none"/>
+            </c:marker>
+            <c:bubble3D val="0"/>
+            <c:spPr>
+              <a:ln w="28575" cap="rnd">
+                <a:solidFill>
+                  <a:schemeClr val="accent1"/>
+                </a:solidFill>
+                <a:round/>
+              </a:ln>
+              <a:effectLst/>
+            </c:spPr>
+            <c:extLst>
+              <c:ext xmlns:c16="http://schemas.microsoft.com/office/drawing/2014/chart" uri="{C3380CC4-5D6E-409C-BE32-E72D297353CC}">
+                <c16:uniqueId val="{00000003-423E-49D5-94A2-61083230509B}"/>
+              </c:ext>
+            </c:extLst>
+          </c:dPt>
+          <c:dLbls>
+            <c:dLbl>
+              <c:idx val="4"/>
+              <c:layout>
+                <c:manualLayout>
+                  <c:x val="-3.7046211951902303E-2"/>
+                  <c:y val="-6.9444444444444461E-2"/>
+                </c:manualLayout>
+              </c:layout>
+              <c:showLegendKey val="0"/>
+              <c:showVal val="1"/>
+              <c:showCatName val="0"/>
+              <c:showSerName val="0"/>
+              <c:showPercent val="0"/>
+              <c:showBubbleSize val="0"/>
+              <c:extLst>
+                <c:ext xmlns:c15="http://schemas.microsoft.com/office/drawing/2012/chart" uri="{CE6537A1-D6FC-4f65-9D91-7224C49458BB}"/>
+                <c:ext xmlns:c16="http://schemas.microsoft.com/office/drawing/2014/chart" uri="{C3380CC4-5D6E-409C-BE32-E72D297353CC}">
+                  <c16:uniqueId val="{00000001-423E-49D5-94A2-61083230509B}"/>
+                </c:ext>
+              </c:extLst>
+            </c:dLbl>
+            <c:dLbl>
+              <c:idx val="5"/>
+              <c:layout>
+                <c:manualLayout>
+                  <c:x val="-3.0575141098302238E-2"/>
+                  <c:y val="5.0835269008595953E-2"/>
+                </c:manualLayout>
+              </c:layout>
+              <c:showLegendKey val="0"/>
+              <c:showVal val="1"/>
+              <c:showCatName val="0"/>
+              <c:showSerName val="0"/>
+              <c:showPercent val="0"/>
+              <c:showBubbleSize val="0"/>
+              <c:extLst>
+                <c:ext xmlns:c15="http://schemas.microsoft.com/office/drawing/2012/chart" uri="{CE6537A1-D6FC-4f65-9D91-7224C49458BB}"/>
+                <c:ext xmlns:c16="http://schemas.microsoft.com/office/drawing/2014/chart" uri="{C3380CC4-5D6E-409C-BE32-E72D297353CC}">
+                  <c16:uniqueId val="{00000003-423E-49D5-94A2-61083230509B}"/>
+                </c:ext>
+              </c:extLst>
+            </c:dLbl>
+            <c:spPr>
+              <a:noFill/>
+              <a:ln>
+                <a:noFill/>
+              </a:ln>
+              <a:effectLst/>
+            </c:spPr>
+            <c:txPr>
+              <a:bodyPr rot="0" spcFirstLastPara="1" vertOverflow="ellipsis" vert="horz" wrap="square" lIns="38100" tIns="19050" rIns="38100" bIns="19050" anchor="ctr" anchorCtr="1">
+                <a:spAutoFit/>
+              </a:bodyPr>
+              <a:lstStyle/>
+              <a:p>
+                <a:pPr>
+                  <a:defRPr sz="900" b="0" i="0" u="none" strike="noStrike" kern="1200" baseline="0">
+                    <a:solidFill>
+                      <a:schemeClr val="tx1">
+                        <a:lumMod val="75000"/>
+                        <a:lumOff val="25000"/>
+                      </a:schemeClr>
+                    </a:solidFill>
+                    <a:latin typeface="+mn-lt"/>
+                    <a:ea typeface="+mn-ea"/>
+                    <a:cs typeface="+mn-cs"/>
+                  </a:defRPr>
+                </a:pPr>
+                <a:endParaRPr lang="en-US"/>
+              </a:p>
+            </c:txPr>
+            <c:showLegendKey val="0"/>
+            <c:showVal val="0"/>
+            <c:showCatName val="0"/>
+            <c:showSerName val="0"/>
+            <c:showPercent val="0"/>
+            <c:showBubbleSize val="0"/>
+            <c:extLst>
+              <c:ext xmlns:c15="http://schemas.microsoft.com/office/drawing/2012/chart" uri="{CE6537A1-D6FC-4f65-9D91-7224C49458BB}">
+                <c15:showLeaderLines val="1"/>
+                <c15:leaderLines>
+                  <c:spPr>
+                    <a:ln w="9525" cap="flat" cmpd="sng" algn="ctr">
+                      <a:solidFill>
+                        <a:schemeClr val="tx1">
+                          <a:lumMod val="35000"/>
+                          <a:lumOff val="65000"/>
+                        </a:schemeClr>
+                      </a:solidFill>
+                      <a:round/>
+                    </a:ln>
+                    <a:effectLst/>
+                  </c:spPr>
+                </c15:leaderLines>
+              </c:ext>
+            </c:extLst>
+          </c:dLbls>
+          <c:cat>
+            <c:strRef>
+              <c:f>'Key_Question _4'!$A$69:$A$77</c:f>
+              <c:strCache>
+                <c:ptCount val="8"/>
+                <c:pt idx="0">
+                  <c:v>2018</c:v>
+                </c:pt>
+                <c:pt idx="1">
+                  <c:v>2019</c:v>
+                </c:pt>
+                <c:pt idx="2">
+                  <c:v>2020</c:v>
+                </c:pt>
+                <c:pt idx="3">
+                  <c:v>2021</c:v>
+                </c:pt>
+                <c:pt idx="4">
+                  <c:v>2022</c:v>
+                </c:pt>
+                <c:pt idx="5">
+                  <c:v>2023</c:v>
+                </c:pt>
+                <c:pt idx="6">
+                  <c:v>2024</c:v>
+                </c:pt>
+                <c:pt idx="7">
+                  <c:v>2025</c:v>
+                </c:pt>
+              </c:strCache>
+            </c:strRef>
+          </c:cat>
+          <c:val>
+            <c:numRef>
+              <c:f>'Key_Question _4'!$B$69:$B$77</c:f>
+              <c:numCache>
+                <c:formatCode>General</c:formatCode>
+                <c:ptCount val="8"/>
+                <c:pt idx="0">
+                  <c:v>59</c:v>
+                </c:pt>
+                <c:pt idx="1">
+                  <c:v>71</c:v>
+                </c:pt>
+                <c:pt idx="2">
+                  <c:v>82</c:v>
+                </c:pt>
+                <c:pt idx="3">
+                  <c:v>98</c:v>
+                </c:pt>
+                <c:pt idx="4">
+                  <c:v>103</c:v>
+                </c:pt>
+                <c:pt idx="5">
+                  <c:v>23</c:v>
+                </c:pt>
+                <c:pt idx="6">
+                  <c:v>48</c:v>
+                </c:pt>
+                <c:pt idx="7">
+                  <c:v>16</c:v>
+                </c:pt>
+              </c:numCache>
+            </c:numRef>
+          </c:val>
+          <c:smooth val="0"/>
+          <c:extLst>
+            <c:ext xmlns:c16="http://schemas.microsoft.com/office/drawing/2014/chart" uri="{C3380CC4-5D6E-409C-BE32-E72D297353CC}">
+              <c16:uniqueId val="{00000004-423E-49D5-94A2-61083230509B}"/>
+            </c:ext>
+          </c:extLst>
+        </c:ser>
+        <c:dLbls>
+          <c:showLegendKey val="0"/>
+          <c:showVal val="0"/>
+          <c:showCatName val="0"/>
+          <c:showSerName val="0"/>
+          <c:showPercent val="0"/>
+          <c:showBubbleSize val="0"/>
+        </c:dLbls>
+        <c:smooth val="0"/>
+        <c:axId val="714374160"/>
+        <c:axId val="714371280"/>
+      </c:lineChart>
+      <c:catAx>
+        <c:axId val="714374160"/>
+        <c:scaling>
+          <c:orientation val="minMax"/>
+        </c:scaling>
+        <c:delete val="0"/>
+        <c:axPos val="b"/>
+        <c:numFmt formatCode="General" sourceLinked="1"/>
+        <c:majorTickMark val="none"/>
+        <c:minorTickMark val="none"/>
+        <c:tickLblPos val="nextTo"/>
+        <c:spPr>
+          <a:noFill/>
+          <a:ln w="9525" cap="flat" cmpd="sng" algn="ctr">
+            <a:solidFill>
+              <a:schemeClr val="tx1">
+                <a:lumMod val="15000"/>
+                <a:lumOff val="85000"/>
+              </a:schemeClr>
+            </a:solidFill>
+            <a:round/>
+          </a:ln>
+          <a:effectLst/>
+        </c:spPr>
+        <c:txPr>
+          <a:bodyPr rot="-60000000" spcFirstLastPara="1" vertOverflow="ellipsis" vert="horz" wrap="square" anchor="ctr" anchorCtr="1"/>
+          <a:lstStyle/>
+          <a:p>
+            <a:pPr>
+              <a:defRPr sz="900" b="0" i="0" u="none" strike="noStrike" kern="1200" baseline="0">
+                <a:solidFill>
+                  <a:schemeClr val="tx1">
+                    <a:lumMod val="65000"/>
+                    <a:lumOff val="35000"/>
+                  </a:schemeClr>
+                </a:solidFill>
+                <a:latin typeface="+mn-lt"/>
+                <a:ea typeface="+mn-ea"/>
+                <a:cs typeface="+mn-cs"/>
+              </a:defRPr>
+            </a:pPr>
+            <a:endParaRPr lang="en-US"/>
+          </a:p>
+        </c:txPr>
+        <c:crossAx val="714371280"/>
+        <c:crosses val="autoZero"/>
+        <c:auto val="1"/>
+        <c:lblAlgn val="ctr"/>
+        <c:lblOffset val="100"/>
+        <c:noMultiLvlLbl val="0"/>
+      </c:catAx>
+      <c:valAx>
+        <c:axId val="714371280"/>
+        <c:scaling>
+          <c:orientation val="minMax"/>
+        </c:scaling>
+        <c:delete val="0"/>
+        <c:axPos val="l"/>
+        <c:majorGridlines>
+          <c:spPr>
+            <a:ln w="9525" cap="flat" cmpd="sng" algn="ctr">
+              <a:noFill/>
+              <a:round/>
+            </a:ln>
+            <a:effectLst/>
+          </c:spPr>
+        </c:majorGridlines>
+        <c:numFmt formatCode="General" sourceLinked="1"/>
+        <c:majorTickMark val="none"/>
+        <c:minorTickMark val="none"/>
+        <c:tickLblPos val="nextTo"/>
+        <c:spPr>
+          <a:noFill/>
+          <a:ln>
+            <a:noFill/>
+          </a:ln>
+          <a:effectLst/>
+        </c:spPr>
+        <c:txPr>
+          <a:bodyPr rot="-60000000" spcFirstLastPara="1" vertOverflow="ellipsis" vert="horz" wrap="square" anchor="ctr" anchorCtr="1"/>
+          <a:lstStyle/>
+          <a:p>
+            <a:pPr>
+              <a:defRPr sz="900" b="0" i="0" u="none" strike="noStrike" kern="1200" baseline="0">
+                <a:solidFill>
+                  <a:schemeClr val="tx1">
+                    <a:lumMod val="65000"/>
+                    <a:lumOff val="35000"/>
+                  </a:schemeClr>
+                </a:solidFill>
+                <a:latin typeface="+mn-lt"/>
+                <a:ea typeface="+mn-ea"/>
+                <a:cs typeface="+mn-cs"/>
+              </a:defRPr>
+            </a:pPr>
+            <a:endParaRPr lang="en-US"/>
+          </a:p>
+        </c:txPr>
+        <c:crossAx val="714374160"/>
+        <c:crosses val="autoZero"/>
+        <c:crossBetween val="between"/>
+      </c:valAx>
+      <c:spPr>
+        <a:noFill/>
+        <a:ln w="25400">
+          <a:noFill/>
+        </a:ln>
+        <a:effectLst/>
+      </c:spPr>
+    </c:plotArea>
+    <c:plotVisOnly val="1"/>
+    <c:dispBlanksAs val="gap"/>
+    <c:extLst>
+      <c:ext xmlns:c16r3="http://schemas.microsoft.com/office/drawing/2017/03/chart" uri="{56B9EC1D-385E-4148-901F-78D8002777C0}">
+        <c16r3:dataDisplayOptions16>
+          <c16r3:dispNaAsBlank val="1"/>
+        </c16r3:dataDisplayOptions16>
+      </c:ext>
+    </c:extLst>
+    <c:showDLblsOverMax val="0"/>
+  </c:chart>
+  <c:spPr>
+    <a:noFill/>
+    <a:ln>
+      <a:noFill/>
+    </a:ln>
+    <a:effectLst/>
+  </c:spPr>
+  <c:txPr>
+    <a:bodyPr/>
+    <a:lstStyle/>
+    <a:p>
+      <a:pPr>
+        <a:defRPr/>
+      </a:pPr>
+      <a:endParaRPr lang="en-US"/>
+    </a:p>
+  </c:txPr>
+  <c:externalData r:id="rId3">
+    <c:autoUpdate val="0"/>
+  </c:externalData>
+  <c:extLst>
+    <c:ext xmlns:c14="http://schemas.microsoft.com/office/drawing/2007/8/2/chart" uri="{781A3756-C4B2-4CAC-9D66-4F8BD8637D16}">
+      <c14:pivotOptions>
+        <c14:dropZoneFilter val="1"/>
+        <c14:dropZonesVisible val="1"/>
+      </c14:pivotOptions>
+    </c:ext>
+    <c:ext xmlns:c16="http://schemas.microsoft.com/office/drawing/2014/chart" uri="{E28EC0CA-F0BB-4C9C-879D-F8772B89E7AC}">
+      <c16:pivotOptions16>
+        <c16:showExpandCollapseFieldButtons val="1"/>
+      </c16:pivotOptions16>
+    </c:ext>
+  </c:extLst>
+</c:chartSpace>
+</file>
+
+<file path=ppt/charts/chart2.xml><?xml version="1.0" encoding="utf-8"?>
+<c:chartSpace xmlns:c="http://schemas.openxmlformats.org/drawingml/2006/chart" xmlns:a="http://schemas.openxmlformats.org/drawingml/2006/main" xmlns:r="http://schemas.openxmlformats.org/officeDocument/2006/relationships" xmlns:c16r2="http://schemas.microsoft.com/office/drawing/2015/06/chart">
+  <c:date1904 val="0"/>
+  <c:lang val="en-US"/>
+  <c:roundedCorners val="0"/>
+  <mc:AlternateContent xmlns:mc="http://schemas.openxmlformats.org/markup-compatibility/2006">
+    <mc:Choice xmlns:c14="http://schemas.microsoft.com/office/drawing/2007/8/2/chart" Requires="c14">
+      <c14:style val="102"/>
+    </mc:Choice>
+    <mc:Fallback>
+      <c:style val="2"/>
+    </mc:Fallback>
+  </mc:AlternateContent>
+  <c:pivotSource>
+    <c:name>[Automotive_HR_Software_Talent_Dataset_v3_Enhanced.xlsx]Key_Question _4!PivotTable8</c:name>
+    <c:fmtId val="9"/>
+  </c:pivotSource>
+  <c:chart>
+    <c:title>
+      <c:tx>
+        <c:rich>
+          <a:bodyPr rot="0" spcFirstLastPara="1" vertOverflow="ellipsis" vert="horz" wrap="square" anchor="ctr" anchorCtr="1"/>
+          <a:lstStyle/>
+          <a:p>
+            <a:pPr>
+              <a:defRPr sz="1400" b="0" i="0" u="none" strike="noStrike" kern="1200" spc="0" baseline="0">
+                <a:solidFill>
+                  <a:schemeClr val="tx1">
+                    <a:lumMod val="65000"/>
+                    <a:lumOff val="35000"/>
+                  </a:schemeClr>
+                </a:solidFill>
+                <a:latin typeface="+mn-lt"/>
+                <a:ea typeface="+mn-ea"/>
+                <a:cs typeface="+mn-cs"/>
+              </a:defRPr>
+            </a:pPr>
+            <a:r>
+              <a:rPr lang="en-US" b="0" dirty="0"/>
+              <a:t>Hiring by</a:t>
+            </a:r>
+            <a:r>
+              <a:rPr lang="en-US" b="0" baseline="0" dirty="0"/>
+              <a:t> Channel (2018-2025H1)</a:t>
+            </a:r>
+            <a:endParaRPr lang="en-US" b="0" dirty="0"/>
+          </a:p>
+        </c:rich>
+      </c:tx>
+      <c:layout>
+        <c:manualLayout>
+          <c:xMode val="edge"/>
+          <c:yMode val="edge"/>
+          <c:x val="0.23486246238941053"/>
+          <c:y val="3.9509557446356772E-2"/>
+        </c:manualLayout>
+      </c:layout>
+      <c:overlay val="0"/>
+      <c:spPr>
+        <a:noFill/>
+        <a:ln>
+          <a:noFill/>
+        </a:ln>
+        <a:effectLst/>
+      </c:spPr>
+      <c:txPr>
+        <a:bodyPr rot="0" spcFirstLastPara="1" vertOverflow="ellipsis" vert="horz" wrap="square" anchor="ctr" anchorCtr="1"/>
+        <a:lstStyle/>
+        <a:p>
+          <a:pPr>
+            <a:defRPr sz="1400" b="0" i="0" u="none" strike="noStrike" kern="1200" spc="0" baseline="0">
+              <a:solidFill>
+                <a:schemeClr val="tx1">
+                  <a:lumMod val="65000"/>
+                  <a:lumOff val="35000"/>
+                </a:schemeClr>
+              </a:solidFill>
+              <a:latin typeface="+mn-lt"/>
+              <a:ea typeface="+mn-ea"/>
+              <a:cs typeface="+mn-cs"/>
+            </a:defRPr>
+          </a:pPr>
+          <a:endParaRPr lang="en-US"/>
+        </a:p>
+      </c:txPr>
+    </c:title>
+    <c:autoTitleDeleted val="0"/>
+    <c:pivotFmts>
+      <c:pivotFmt>
+        <c:idx val="0"/>
+        <c:spPr>
+          <a:solidFill>
+            <a:schemeClr val="accent1"/>
+          </a:solidFill>
+          <a:ln>
+            <a:noFill/>
+          </a:ln>
+          <a:effectLst/>
+        </c:spPr>
+        <c:marker>
+          <c:symbol val="none"/>
+        </c:marker>
+        <c:dLbl>
+          <c:idx val="0"/>
+          <c:spPr>
+            <a:noFill/>
+            <a:ln>
+              <a:noFill/>
+            </a:ln>
+            <a:effectLst/>
+          </c:spPr>
+          <c:txPr>
+            <a:bodyPr rot="0" spcFirstLastPara="1" vertOverflow="ellipsis" vert="horz" wrap="square" lIns="38100" tIns="19050" rIns="38100" bIns="19050" anchor="ctr" anchorCtr="1">
+              <a:spAutoFit/>
+            </a:bodyPr>
+            <a:lstStyle/>
+            <a:p>
+              <a:pPr>
+                <a:defRPr sz="900" b="0" i="0" u="none" strike="noStrike" kern="1200" baseline="0">
+                  <a:solidFill>
+                    <a:schemeClr val="tx1">
+                      <a:lumMod val="75000"/>
+                      <a:lumOff val="25000"/>
+                    </a:schemeClr>
+                  </a:solidFill>
+                  <a:latin typeface="+mn-lt"/>
+                  <a:ea typeface="+mn-ea"/>
+                  <a:cs typeface="+mn-cs"/>
+                </a:defRPr>
+              </a:pPr>
+              <a:endParaRPr lang="en-US"/>
+            </a:p>
+          </c:txPr>
+          <c:showLegendKey val="0"/>
+          <c:showVal val="0"/>
+          <c:showCatName val="0"/>
+          <c:showSerName val="0"/>
+          <c:showPercent val="0"/>
+          <c:showBubbleSize val="0"/>
+          <c:extLst>
+            <c:ext xmlns:c15="http://schemas.microsoft.com/office/drawing/2012/chart" uri="{CE6537A1-D6FC-4f65-9D91-7224C49458BB}"/>
+          </c:extLst>
+        </c:dLbl>
+      </c:pivotFmt>
+      <c:pivotFmt>
+        <c:idx val="1"/>
+        <c:spPr>
+          <a:solidFill>
+            <a:schemeClr val="accent1"/>
+          </a:solidFill>
+          <a:ln>
+            <a:noFill/>
+          </a:ln>
+          <a:effectLst/>
+        </c:spPr>
+        <c:marker>
+          <c:symbol val="none"/>
+        </c:marker>
+        <c:dLbl>
+          <c:idx val="0"/>
+          <c:spPr>
+            <a:noFill/>
+            <a:ln>
+              <a:noFill/>
+            </a:ln>
+            <a:effectLst/>
+          </c:spPr>
+          <c:txPr>
+            <a:bodyPr rot="0" spcFirstLastPara="1" vertOverflow="ellipsis" vert="horz" wrap="square" lIns="38100" tIns="19050" rIns="38100" bIns="19050" anchor="ctr" anchorCtr="1">
+              <a:spAutoFit/>
+            </a:bodyPr>
+            <a:lstStyle/>
+            <a:p>
+              <a:pPr>
+                <a:defRPr sz="900" b="0" i="0" u="none" strike="noStrike" kern="1200" baseline="0">
+                  <a:solidFill>
+                    <a:schemeClr val="tx1">
+                      <a:lumMod val="75000"/>
+                      <a:lumOff val="25000"/>
+                    </a:schemeClr>
+                  </a:solidFill>
+                  <a:latin typeface="+mn-lt"/>
+                  <a:ea typeface="+mn-ea"/>
+                  <a:cs typeface="+mn-cs"/>
+                </a:defRPr>
+              </a:pPr>
+              <a:endParaRPr lang="en-US"/>
+            </a:p>
+          </c:txPr>
+          <c:showLegendKey val="0"/>
+          <c:showVal val="0"/>
+          <c:showCatName val="0"/>
+          <c:showSerName val="0"/>
+          <c:showPercent val="0"/>
+          <c:showBubbleSize val="0"/>
+          <c:extLst>
+            <c:ext xmlns:c15="http://schemas.microsoft.com/office/drawing/2012/chart" uri="{CE6537A1-D6FC-4f65-9D91-7224C49458BB}"/>
+          </c:extLst>
+        </c:dLbl>
+      </c:pivotFmt>
+      <c:pivotFmt>
+        <c:idx val="2"/>
+        <c:spPr>
+          <a:solidFill>
+            <a:schemeClr val="accent1"/>
+          </a:solidFill>
+          <a:ln>
+            <a:noFill/>
+          </a:ln>
+          <a:effectLst/>
+        </c:spPr>
+        <c:marker>
+          <c:symbol val="none"/>
+        </c:marker>
+        <c:dLbl>
+          <c:idx val="0"/>
+          <c:spPr>
+            <a:noFill/>
+            <a:ln>
+              <a:noFill/>
+            </a:ln>
+            <a:effectLst/>
+          </c:spPr>
+          <c:txPr>
+            <a:bodyPr rot="0" spcFirstLastPara="1" vertOverflow="ellipsis" vert="horz" wrap="square" lIns="38100" tIns="19050" rIns="38100" bIns="19050" anchor="ctr" anchorCtr="1">
+              <a:spAutoFit/>
+            </a:bodyPr>
+            <a:lstStyle/>
+            <a:p>
+              <a:pPr>
+                <a:defRPr sz="900" b="0" i="0" u="none" strike="noStrike" kern="1200" baseline="0">
+                  <a:solidFill>
+                    <a:schemeClr val="tx1">
+                      <a:lumMod val="75000"/>
+                      <a:lumOff val="25000"/>
+                    </a:schemeClr>
+                  </a:solidFill>
+                  <a:latin typeface="+mn-lt"/>
+                  <a:ea typeface="+mn-ea"/>
+                  <a:cs typeface="+mn-cs"/>
+                </a:defRPr>
+              </a:pPr>
+              <a:endParaRPr lang="en-US"/>
+            </a:p>
+          </c:txPr>
+          <c:showLegendKey val="0"/>
+          <c:showVal val="0"/>
+          <c:showCatName val="0"/>
+          <c:showSerName val="0"/>
+          <c:showPercent val="0"/>
+          <c:showBubbleSize val="0"/>
+          <c:extLst>
+            <c:ext xmlns:c15="http://schemas.microsoft.com/office/drawing/2012/chart" uri="{CE6537A1-D6FC-4f65-9D91-7224C49458BB}"/>
+          </c:extLst>
+        </c:dLbl>
+      </c:pivotFmt>
+    </c:pivotFmts>
+    <c:plotArea>
+      <c:layout/>
+      <c:barChart>
+        <c:barDir val="col"/>
+        <c:grouping val="clustered"/>
+        <c:varyColors val="0"/>
+        <c:ser>
+          <c:idx val="0"/>
+          <c:order val="0"/>
+          <c:tx>
+            <c:strRef>
+              <c:f>'Key_Question _4'!$B$128</c:f>
+              <c:strCache>
+                <c:ptCount val="1"/>
+                <c:pt idx="0">
+                  <c:v>Total</c:v>
+                </c:pt>
+              </c:strCache>
+            </c:strRef>
+          </c:tx>
+          <c:spPr>
+            <a:solidFill>
+              <a:schemeClr val="accent1"/>
+            </a:solidFill>
+            <a:ln>
+              <a:noFill/>
+            </a:ln>
+            <a:effectLst/>
+          </c:spPr>
+          <c:invertIfNegative val="0"/>
+          <c:cat>
+            <c:strRef>
+              <c:f>'Key_Question _4'!$A$129:$A$133</c:f>
+              <c:strCache>
+                <c:ptCount val="4"/>
+                <c:pt idx="0">
+                  <c:v>Career Fair</c:v>
+                </c:pt>
+                <c:pt idx="1">
+                  <c:v>LinkedIn</c:v>
+                </c:pt>
+                <c:pt idx="2">
+                  <c:v>Recruiter</c:v>
+                </c:pt>
+                <c:pt idx="3">
+                  <c:v>Referral</c:v>
+                </c:pt>
+              </c:strCache>
+            </c:strRef>
+          </c:cat>
+          <c:val>
+            <c:numRef>
+              <c:f>'Key_Question _4'!$B$129:$B$133</c:f>
+              <c:numCache>
+                <c:formatCode>General</c:formatCode>
+                <c:ptCount val="4"/>
+                <c:pt idx="0">
+                  <c:v>70</c:v>
+                </c:pt>
+                <c:pt idx="1">
+                  <c:v>194</c:v>
+                </c:pt>
+                <c:pt idx="2">
+                  <c:v>135</c:v>
+                </c:pt>
+                <c:pt idx="3">
+                  <c:v>101</c:v>
+                </c:pt>
+              </c:numCache>
+            </c:numRef>
+          </c:val>
+          <c:extLst>
+            <c:ext xmlns:c16="http://schemas.microsoft.com/office/drawing/2014/chart" uri="{C3380CC4-5D6E-409C-BE32-E72D297353CC}">
+              <c16:uniqueId val="{00000000-1E96-4629-9344-86566CF04023}"/>
+            </c:ext>
+          </c:extLst>
+        </c:ser>
+        <c:dLbls>
+          <c:showLegendKey val="0"/>
+          <c:showVal val="0"/>
+          <c:showCatName val="0"/>
+          <c:showSerName val="0"/>
+          <c:showPercent val="0"/>
+          <c:showBubbleSize val="0"/>
+        </c:dLbls>
+        <c:gapWidth val="219"/>
+        <c:overlap val="-27"/>
+        <c:axId val="807161823"/>
+        <c:axId val="807161343"/>
+      </c:barChart>
+      <c:catAx>
+        <c:axId val="807161823"/>
+        <c:scaling>
+          <c:orientation val="minMax"/>
+        </c:scaling>
+        <c:delete val="0"/>
+        <c:axPos val="b"/>
+        <c:numFmt formatCode="General" sourceLinked="1"/>
+        <c:majorTickMark val="none"/>
+        <c:minorTickMark val="none"/>
+        <c:tickLblPos val="nextTo"/>
+        <c:spPr>
+          <a:noFill/>
+          <a:ln w="9525" cap="flat" cmpd="sng" algn="ctr">
+            <a:solidFill>
+              <a:schemeClr val="tx1">
+                <a:lumMod val="15000"/>
+                <a:lumOff val="85000"/>
+              </a:schemeClr>
+            </a:solidFill>
+            <a:round/>
+          </a:ln>
+          <a:effectLst/>
+        </c:spPr>
+        <c:txPr>
+          <a:bodyPr rot="-60000000" spcFirstLastPara="1" vertOverflow="ellipsis" vert="horz" wrap="square" anchor="ctr" anchorCtr="1"/>
+          <a:lstStyle/>
+          <a:p>
+            <a:pPr>
+              <a:defRPr sz="900" b="0" i="0" u="none" strike="noStrike" kern="1200" baseline="0">
+                <a:solidFill>
+                  <a:schemeClr val="tx1">
+                    <a:lumMod val="65000"/>
+                    <a:lumOff val="35000"/>
+                  </a:schemeClr>
+                </a:solidFill>
+                <a:latin typeface="+mn-lt"/>
+                <a:ea typeface="+mn-ea"/>
+                <a:cs typeface="+mn-cs"/>
+              </a:defRPr>
+            </a:pPr>
+            <a:endParaRPr lang="en-US"/>
+          </a:p>
+        </c:txPr>
+        <c:crossAx val="807161343"/>
+        <c:crosses val="autoZero"/>
+        <c:auto val="1"/>
+        <c:lblAlgn val="ctr"/>
+        <c:lblOffset val="100"/>
+        <c:noMultiLvlLbl val="0"/>
+      </c:catAx>
+      <c:valAx>
+        <c:axId val="807161343"/>
+        <c:scaling>
+          <c:orientation val="minMax"/>
+        </c:scaling>
+        <c:delete val="0"/>
+        <c:axPos val="l"/>
+        <c:majorGridlines>
+          <c:spPr>
+            <a:ln w="9525" cap="flat" cmpd="sng" algn="ctr">
+              <a:noFill/>
+              <a:round/>
+            </a:ln>
+            <a:effectLst/>
+          </c:spPr>
+        </c:majorGridlines>
+        <c:numFmt formatCode="General" sourceLinked="1"/>
+        <c:majorTickMark val="none"/>
+        <c:minorTickMark val="none"/>
+        <c:tickLblPos val="nextTo"/>
+        <c:spPr>
+          <a:noFill/>
+          <a:ln>
+            <a:noFill/>
+          </a:ln>
+          <a:effectLst/>
+        </c:spPr>
+        <c:txPr>
+          <a:bodyPr rot="-60000000" spcFirstLastPara="1" vertOverflow="ellipsis" vert="horz" wrap="square" anchor="ctr" anchorCtr="1"/>
+          <a:lstStyle/>
+          <a:p>
+            <a:pPr>
+              <a:defRPr sz="900" b="0" i="0" u="none" strike="noStrike" kern="1200" baseline="0">
+                <a:solidFill>
+                  <a:schemeClr val="tx1">
+                    <a:lumMod val="65000"/>
+                    <a:lumOff val="35000"/>
+                  </a:schemeClr>
+                </a:solidFill>
+                <a:latin typeface="+mn-lt"/>
+                <a:ea typeface="+mn-ea"/>
+                <a:cs typeface="+mn-cs"/>
+              </a:defRPr>
+            </a:pPr>
+            <a:endParaRPr lang="en-US"/>
+          </a:p>
+        </c:txPr>
+        <c:crossAx val="807161823"/>
+        <c:crosses val="autoZero"/>
+        <c:crossBetween val="between"/>
+      </c:valAx>
+      <c:spPr>
+        <a:noFill/>
+        <a:ln w="25400">
+          <a:noFill/>
+        </a:ln>
+        <a:effectLst/>
+      </c:spPr>
+    </c:plotArea>
+    <c:plotVisOnly val="1"/>
+    <c:dispBlanksAs val="gap"/>
+    <c:extLst>
+      <c:ext xmlns:c16r3="http://schemas.microsoft.com/office/drawing/2017/03/chart" uri="{56B9EC1D-385E-4148-901F-78D8002777C0}">
+        <c16r3:dataDisplayOptions16>
+          <c16r3:dispNaAsBlank val="1"/>
+        </c16r3:dataDisplayOptions16>
+      </c:ext>
+    </c:extLst>
+    <c:showDLblsOverMax val="0"/>
+  </c:chart>
+  <c:spPr>
+    <a:noFill/>
+    <a:ln>
+      <a:noFill/>
+    </a:ln>
+    <a:effectLst/>
+  </c:spPr>
+  <c:txPr>
+    <a:bodyPr/>
+    <a:lstStyle/>
+    <a:p>
+      <a:pPr>
+        <a:defRPr/>
+      </a:pPr>
+      <a:endParaRPr lang="en-US"/>
+    </a:p>
+  </c:txPr>
+  <c:externalData r:id="rId3">
+    <c:autoUpdate val="0"/>
+  </c:externalData>
+  <c:extLst>
+    <c:ext xmlns:c14="http://schemas.microsoft.com/office/drawing/2007/8/2/chart" uri="{781A3756-C4B2-4CAC-9D66-4F8BD8637D16}">
+      <c14:pivotOptions>
+        <c14:dropZoneFilter val="1"/>
+        <c14:dropZoneCategories val="1"/>
+        <c14:dropZoneData val="1"/>
+      </c14:pivotOptions>
+    </c:ext>
+    <c:ext xmlns:c16="http://schemas.microsoft.com/office/drawing/2014/chart" uri="{E28EC0CA-F0BB-4C9C-879D-F8772B89E7AC}">
+      <c16:pivotOptions16>
+        <c16:showExpandCollapseFieldButtons val="1"/>
+      </c16:pivotOptions16>
+    </c:ext>
+  </c:extLst>
+</c:chartSpace>
+</file>
+
+<file path=ppt/charts/colors1.xml><?xml version="1.0" encoding="utf-8"?>
+<cs:colorStyle xmlns:cs="http://schemas.microsoft.com/office/drawing/2012/chartStyle" xmlns:a="http://schemas.openxmlformats.org/drawingml/2006/main" meth="cycle" id="10">
+  <a:schemeClr val="accent1"/>
+  <a:schemeClr val="accent2"/>
+  <a:schemeClr val="accent3"/>
+  <a:schemeClr val="accent4"/>
+  <a:schemeClr val="accent5"/>
+  <a:schemeClr val="accent6"/>
+  <cs:variation/>
+  <cs:variation>
+    <a:lumMod val="60000"/>
+  </cs:variation>
+  <cs:variation>
+    <a:lumMod val="80000"/>
+    <a:lumOff val="20000"/>
+  </cs:variation>
+  <cs:variation>
+    <a:lumMod val="80000"/>
+  </cs:variation>
+  <cs:variation>
+    <a:lumMod val="60000"/>
+    <a:lumOff val="40000"/>
+  </cs:variation>
+  <cs:variation>
+    <a:lumMod val="50000"/>
+  </cs:variation>
+  <cs:variation>
+    <a:lumMod val="70000"/>
+    <a:lumOff val="30000"/>
+  </cs:variation>
+  <cs:variation>
+    <a:lumMod val="70000"/>
+  </cs:variation>
+  <cs:variation>
+    <a:lumMod val="50000"/>
+    <a:lumOff val="50000"/>
+  </cs:variation>
+</cs:colorStyle>
+</file>
+
+<file path=ppt/charts/colors2.xml><?xml version="1.0" encoding="utf-8"?>
+<cs:colorStyle xmlns:cs="http://schemas.microsoft.com/office/drawing/2012/chartStyle" xmlns:a="http://schemas.openxmlformats.org/drawingml/2006/main" meth="cycle" id="10">
+  <a:schemeClr val="accent1"/>
+  <a:schemeClr val="accent2"/>
+  <a:schemeClr val="accent3"/>
+  <a:schemeClr val="accent4"/>
+  <a:schemeClr val="accent5"/>
+  <a:schemeClr val="accent6"/>
+  <cs:variation/>
+  <cs:variation>
+    <a:lumMod val="60000"/>
+  </cs:variation>
+  <cs:variation>
+    <a:lumMod val="80000"/>
+    <a:lumOff val="20000"/>
+  </cs:variation>
+  <cs:variation>
+    <a:lumMod val="80000"/>
+  </cs:variation>
+  <cs:variation>
+    <a:lumMod val="60000"/>
+    <a:lumOff val="40000"/>
+  </cs:variation>
+  <cs:variation>
+    <a:lumMod val="50000"/>
+  </cs:variation>
+  <cs:variation>
+    <a:lumMod val="70000"/>
+    <a:lumOff val="30000"/>
+  </cs:variation>
+  <cs:variation>
+    <a:lumMod val="70000"/>
+  </cs:variation>
+  <cs:variation>
+    <a:lumMod val="50000"/>
+    <a:lumOff val="50000"/>
+  </cs:variation>
+</cs:colorStyle>
+</file>
+
+<file path=ppt/charts/style1.xml><?xml version="1.0" encoding="utf-8"?>
+<cs:chartStyle xmlns:cs="http://schemas.microsoft.com/office/drawing/2012/chartStyle" xmlns:a="http://schemas.openxmlformats.org/drawingml/2006/main" id="201">
+  <cs:axisTitle>
+    <cs:lnRef idx="0"/>
+    <cs:fillRef idx="0"/>
+    <cs:effectRef idx="0"/>
+    <cs:fontRef idx="minor">
+      <a:schemeClr val="tx1">
+        <a:lumMod val="65000"/>
+        <a:lumOff val="35000"/>
+      </a:schemeClr>
+    </cs:fontRef>
+    <cs:defRPr sz="1000" kern="1200"/>
+  </cs:axisTitle>
+  <cs:categoryAxis>
+    <cs:lnRef idx="0"/>
+    <cs:fillRef idx="0"/>
+    <cs:effectRef idx="0"/>
+    <cs:fontRef idx="minor">
+      <a:schemeClr val="tx1">
+        <a:lumMod val="65000"/>
+        <a:lumOff val="35000"/>
+      </a:schemeClr>
+    </cs:fontRef>
+    <cs:spPr>
+      <a:ln w="9525" cap="flat" cmpd="sng" algn="ctr">
+        <a:solidFill>
+          <a:schemeClr val="tx1">
+            <a:lumMod val="15000"/>
+            <a:lumOff val="85000"/>
+          </a:schemeClr>
+        </a:solidFill>
+        <a:round/>
+      </a:ln>
+    </cs:spPr>
+    <cs:defRPr sz="900" kern="1200"/>
+  </cs:categoryAxis>
+  <cs:chartArea mods="allowNoFillOverride allowNoLineOverride">
+    <cs:lnRef idx="0"/>
+    <cs:fillRef idx="0"/>
+    <cs:effectRef idx="0"/>
+    <cs:fontRef idx="minor">
+      <a:schemeClr val="tx1"/>
+    </cs:fontRef>
+    <cs:spPr>
+      <a:solidFill>
+        <a:schemeClr val="bg1"/>
+      </a:solidFill>
+      <a:ln w="9525" cap="flat" cmpd="sng" algn="ctr">
+        <a:solidFill>
+          <a:schemeClr val="tx1">
+            <a:lumMod val="15000"/>
+            <a:lumOff val="85000"/>
+          </a:schemeClr>
+        </a:solidFill>
+        <a:round/>
+      </a:ln>
+    </cs:spPr>
+    <cs:defRPr sz="1000" kern="1200"/>
+  </cs:chartArea>
+  <cs:dataLabel>
+    <cs:lnRef idx="0"/>
+    <cs:fillRef idx="0"/>
+    <cs:effectRef idx="0"/>
+    <cs:fontRef idx="minor">
+      <a:schemeClr val="tx1">
+        <a:lumMod val="75000"/>
+        <a:lumOff val="25000"/>
+      </a:schemeClr>
+    </cs:fontRef>
+    <cs:defRPr sz="900" kern="1200"/>
+  </cs:dataLabel>
+  <cs:dataLabelCallout>
+    <cs:lnRef idx="0"/>
+    <cs:fillRef idx="0"/>
+    <cs:effectRef idx="0"/>
+    <cs:fontRef idx="minor">
+      <a:schemeClr val="dk1">
+        <a:lumMod val="65000"/>
+        <a:lumOff val="35000"/>
+      </a:schemeClr>
+    </cs:fontRef>
+    <cs:spPr>
+      <a:solidFill>
+        <a:schemeClr val="lt1"/>
+      </a:solidFill>
+      <a:ln>
+        <a:solidFill>
+          <a:schemeClr val="dk1">
+            <a:lumMod val="25000"/>
+            <a:lumOff val="75000"/>
+          </a:schemeClr>
+        </a:solidFill>
+      </a:ln>
+    </cs:spPr>
+    <cs:defRPr sz="900" kern="1200"/>
+    <cs:bodyPr rot="0" spcFirstLastPara="1" vertOverflow="clip" horzOverflow="clip" vert="horz" wrap="square" lIns="36576" tIns="18288" rIns="36576" bIns="18288" anchor="ctr" anchorCtr="1">
+      <a:spAutoFit/>
+    </cs:bodyPr>
+  </cs:dataLabelCallout>
+  <cs:dataPoint>
+    <cs:lnRef idx="0"/>
+    <cs:fillRef idx="1">
+      <cs:styleClr val="auto"/>
+    </cs:fillRef>
+    <cs:effectRef idx="0"/>
+    <cs:fontRef idx="minor">
+      <a:schemeClr val="tx1"/>
+    </cs:fontRef>
+  </cs:dataPoint>
+  <cs:dataPoint3D>
+    <cs:lnRef idx="0"/>
+    <cs:fillRef idx="1">
+      <cs:styleClr val="auto"/>
+    </cs:fillRef>
+    <cs:effectRef idx="0"/>
+    <cs:fontRef idx="minor">
+      <a:schemeClr val="tx1"/>
+    </cs:fontRef>
+  </cs:dataPoint3D>
+  <cs:dataPointLine>
+    <cs:lnRef idx="0">
+      <cs:styleClr val="auto"/>
+    </cs:lnRef>
+    <cs:fillRef idx="1"/>
+    <cs:effectRef idx="0"/>
+    <cs:fontRef idx="minor">
+      <a:schemeClr val="tx1"/>
+    </cs:fontRef>
+    <cs:spPr>
+      <a:ln w="28575" cap="rnd">
+        <a:solidFill>
+          <a:schemeClr val="phClr"/>
+        </a:solidFill>
+        <a:round/>
+      </a:ln>
+    </cs:spPr>
+  </cs:dataPointLine>
+  <cs:dataPointMarker>
+    <cs:lnRef idx="0">
+      <cs:styleClr val="auto"/>
+    </cs:lnRef>
+    <cs:fillRef idx="1">
+      <cs:styleClr val="auto"/>
+    </cs:fillRef>
+    <cs:effectRef idx="0"/>
+    <cs:fontRef idx="minor">
+      <a:schemeClr val="tx1"/>
+    </cs:fontRef>
+    <cs:spPr>
+      <a:ln w="9525">
+        <a:solidFill>
+          <a:schemeClr val="phClr"/>
+        </a:solidFill>
+      </a:ln>
+    </cs:spPr>
+  </cs:dataPointMarker>
+  <cs:dataPointMarkerLayout symbol="circle" size="5"/>
+  <cs:dataPointWireframe>
+    <cs:lnRef idx="0">
+      <cs:styleClr val="auto"/>
+    </cs:lnRef>
+    <cs:fillRef idx="1"/>
+    <cs:effectRef idx="0"/>
+    <cs:fontRef idx="minor">
+      <a:schemeClr val="tx1"/>
+    </cs:fontRef>
+    <cs:spPr>
+      <a:ln w="9525" cap="rnd">
+        <a:solidFill>
+          <a:schemeClr val="phClr"/>
+        </a:solidFill>
+        <a:round/>
+      </a:ln>
+    </cs:spPr>
+  </cs:dataPointWireframe>
+  <cs:dataTable>
+    <cs:lnRef idx="0"/>
+    <cs:fillRef idx="0"/>
+    <cs:effectRef idx="0"/>
+    <cs:fontRef idx="minor">
+      <a:schemeClr val="tx1">
+        <a:lumMod val="65000"/>
+        <a:lumOff val="35000"/>
+      </a:schemeClr>
+    </cs:fontRef>
+    <cs:spPr>
+      <a:noFill/>
+      <a:ln w="9525" cap="flat" cmpd="sng" algn="ctr">
+        <a:solidFill>
+          <a:schemeClr val="tx1">
+            <a:lumMod val="15000"/>
+            <a:lumOff val="85000"/>
+          </a:schemeClr>
+        </a:solidFill>
+        <a:round/>
+      </a:ln>
+    </cs:spPr>
+    <cs:defRPr sz="900" kern="1200"/>
+  </cs:dataTable>
+  <cs:downBar>
+    <cs:lnRef idx="0"/>
+    <cs:fillRef idx="0"/>
+    <cs:effectRef idx="0"/>
+    <cs:fontRef idx="minor">
+      <a:schemeClr val="dk1"/>
+    </cs:fontRef>
+    <cs:spPr>
+      <a:solidFill>
+        <a:schemeClr val="dk1">
+          <a:lumMod val="65000"/>
+          <a:lumOff val="35000"/>
+        </a:schemeClr>
+      </a:solidFill>
+      <a:ln w="9525">
+        <a:solidFill>
+          <a:schemeClr val="tx1">
+            <a:lumMod val="65000"/>
+            <a:lumOff val="35000"/>
+          </a:schemeClr>
+        </a:solidFill>
+      </a:ln>
+    </cs:spPr>
+  </cs:downBar>
+  <cs:dropLine>
+    <cs:lnRef idx="0"/>
+    <cs:fillRef idx="0"/>
+    <cs:effectRef idx="0"/>
+    <cs:fontRef idx="minor">
+      <a:schemeClr val="tx1"/>
+    </cs:fontRef>
+    <cs:spPr>
+      <a:ln w="9525" cap="flat" cmpd="sng" algn="ctr">
+        <a:solidFill>
+          <a:schemeClr val="tx1">
+            <a:lumMod val="35000"/>
+            <a:lumOff val="65000"/>
+          </a:schemeClr>
+        </a:solidFill>
+        <a:round/>
+      </a:ln>
+    </cs:spPr>
+  </cs:dropLine>
+  <cs:errorBar>
+    <cs:lnRef idx="0"/>
+    <cs:fillRef idx="0"/>
+    <cs:effectRef idx="0"/>
+    <cs:fontRef idx="minor">
+      <a:schemeClr val="tx1"/>
+    </cs:fontRef>
+    <cs:spPr>
+      <a:ln w="9525" cap="flat" cmpd="sng" algn="ctr">
+        <a:solidFill>
+          <a:schemeClr val="tx1">
+            <a:lumMod val="65000"/>
+            <a:lumOff val="35000"/>
+          </a:schemeClr>
+        </a:solidFill>
+        <a:round/>
+      </a:ln>
+    </cs:spPr>
+  </cs:errorBar>
+  <cs:floor>
+    <cs:lnRef idx="0"/>
+    <cs:fillRef idx="0"/>
+    <cs:effectRef idx="0"/>
+    <cs:fontRef idx="minor">
+      <a:schemeClr val="tx1"/>
+    </cs:fontRef>
+    <cs:spPr>
+      <a:noFill/>
+      <a:ln>
+        <a:noFill/>
+      </a:ln>
+    </cs:spPr>
+  </cs:floor>
+  <cs:gridlineMajor>
+    <cs:lnRef idx="0"/>
+    <cs:fillRef idx="0"/>
+    <cs:effectRef idx="0"/>
+    <cs:fontRef idx="minor">
+      <a:schemeClr val="tx1"/>
+    </cs:fontRef>
+    <cs:spPr>
+      <a:ln w="9525" cap="flat" cmpd="sng" algn="ctr">
+        <a:solidFill>
+          <a:schemeClr val="tx1">
+            <a:lumMod val="15000"/>
+            <a:lumOff val="85000"/>
+          </a:schemeClr>
+        </a:solidFill>
+        <a:round/>
+      </a:ln>
+    </cs:spPr>
+  </cs:gridlineMajor>
+  <cs:gridlineMinor>
+    <cs:lnRef idx="0"/>
+    <cs:fillRef idx="0"/>
+    <cs:effectRef idx="0"/>
+    <cs:fontRef idx="minor">
+      <a:schemeClr val="tx1"/>
+    </cs:fontRef>
+    <cs:spPr>
+      <a:ln w="9525" cap="flat" cmpd="sng" algn="ctr">
+        <a:solidFill>
+          <a:schemeClr val="tx1">
+            <a:lumMod val="5000"/>
+            <a:lumOff val="95000"/>
+          </a:schemeClr>
+        </a:solidFill>
+        <a:round/>
+      </a:ln>
+    </cs:spPr>
+  </cs:gridlineMinor>
+  <cs:hiLoLine>
+    <cs:lnRef idx="0"/>
+    <cs:fillRef idx="0"/>
+    <cs:effectRef idx="0"/>
+    <cs:fontRef idx="minor">
+      <a:schemeClr val="tx1"/>
+    </cs:fontRef>
+    <cs:spPr>
+      <a:ln w="9525" cap="flat" cmpd="sng" algn="ctr">
+        <a:solidFill>
+          <a:schemeClr val="tx1">
+            <a:lumMod val="75000"/>
+            <a:lumOff val="25000"/>
+          </a:schemeClr>
+        </a:solidFill>
+        <a:round/>
+      </a:ln>
+    </cs:spPr>
+  </cs:hiLoLine>
+  <cs:leaderLine>
+    <cs:lnRef idx="0"/>
+    <cs:fillRef idx="0"/>
+    <cs:effectRef idx="0"/>
+    <cs:fontRef idx="minor">
+      <a:schemeClr val="tx1"/>
+    </cs:fontRef>
+    <cs:spPr>
+      <a:ln w="9525" cap="flat" cmpd="sng" algn="ctr">
+        <a:solidFill>
+          <a:schemeClr val="tx1">
+            <a:lumMod val="35000"/>
+            <a:lumOff val="65000"/>
+          </a:schemeClr>
+        </a:solidFill>
+        <a:round/>
+      </a:ln>
+    </cs:spPr>
+  </cs:leaderLine>
+  <cs:legend>
+    <cs:lnRef idx="0"/>
+    <cs:fillRef idx="0"/>
+    <cs:effectRef idx="0"/>
+    <cs:fontRef idx="minor">
+      <a:schemeClr val="tx1">
+        <a:lumMod val="65000"/>
+        <a:lumOff val="35000"/>
+      </a:schemeClr>
+    </cs:fontRef>
+    <cs:defRPr sz="900" kern="1200"/>
+  </cs:legend>
+  <cs:plotArea mods="allowNoFillOverride allowNoLineOverride">
+    <cs:lnRef idx="0"/>
+    <cs:fillRef idx="0"/>
+    <cs:effectRef idx="0"/>
+    <cs:fontRef idx="minor">
+      <a:schemeClr val="tx1"/>
+    </cs:fontRef>
+  </cs:plotArea>
+  <cs:plotArea3D mods="allowNoFillOverride allowNoLineOverride">
+    <cs:lnRef idx="0"/>
+    <cs:fillRef idx="0"/>
+    <cs:effectRef idx="0"/>
+    <cs:fontRef idx="minor">
+      <a:schemeClr val="tx1"/>
+    </cs:fontRef>
+  </cs:plotArea3D>
+  <cs:seriesAxis>
+    <cs:lnRef idx="0"/>
+    <cs:fillRef idx="0"/>
+    <cs:effectRef idx="0"/>
+    <cs:fontRef idx="minor">
+      <a:schemeClr val="tx1">
+        <a:lumMod val="65000"/>
+        <a:lumOff val="35000"/>
+      </a:schemeClr>
+    </cs:fontRef>
+    <cs:defRPr sz="900" kern="1200"/>
+  </cs:seriesAxis>
+  <cs:seriesLine>
+    <cs:lnRef idx="0"/>
+    <cs:fillRef idx="0"/>
+    <cs:effectRef idx="0"/>
+    <cs:fontRef idx="minor">
+      <a:schemeClr val="tx1"/>
+    </cs:fontRef>
+    <cs:spPr>
+      <a:ln w="9525" cap="flat" cmpd="sng" algn="ctr">
+        <a:solidFill>
+          <a:schemeClr val="tx1">
+            <a:lumMod val="35000"/>
+            <a:lumOff val="65000"/>
+          </a:schemeClr>
+        </a:solidFill>
+        <a:round/>
+      </a:ln>
+    </cs:spPr>
+  </cs:seriesLine>
+  <cs:title>
+    <cs:lnRef idx="0"/>
+    <cs:fillRef idx="0"/>
+    <cs:effectRef idx="0"/>
+    <cs:fontRef idx="minor">
+      <a:schemeClr val="tx1">
+        <a:lumMod val="65000"/>
+        <a:lumOff val="35000"/>
+      </a:schemeClr>
+    </cs:fontRef>
+    <cs:defRPr sz="1400" b="0" kern="1200" spc="0" baseline="0"/>
+  </cs:title>
+  <cs:trendline>
+    <cs:lnRef idx="0">
+      <cs:styleClr val="auto"/>
+    </cs:lnRef>
+    <cs:fillRef idx="0"/>
+    <cs:effectRef idx="0"/>
+    <cs:fontRef idx="minor">
+      <a:schemeClr val="tx1"/>
+    </cs:fontRef>
+    <cs:spPr>
+      <a:ln w="19050" cap="rnd">
+        <a:solidFill>
+          <a:schemeClr val="phClr"/>
+        </a:solidFill>
+        <a:prstDash val="sysDot"/>
+      </a:ln>
+    </cs:spPr>
+  </cs:trendline>
+  <cs:trendlineLabel>
+    <cs:lnRef idx="0"/>
+    <cs:fillRef idx="0"/>
+    <cs:effectRef idx="0"/>
+    <cs:fontRef idx="minor">
+      <a:schemeClr val="tx1">
+        <a:lumMod val="65000"/>
+        <a:lumOff val="35000"/>
+      </a:schemeClr>
+    </cs:fontRef>
+    <cs:defRPr sz="900" kern="1200"/>
+  </cs:trendlineLabel>
+  <cs:upBar>
+    <cs:lnRef idx="0"/>
+    <cs:fillRef idx="0"/>
+    <cs:effectRef idx="0"/>
+    <cs:fontRef idx="minor">
+      <a:schemeClr val="dk1"/>
+    </cs:fontRef>
+    <cs:spPr>
+      <a:solidFill>
+        <a:schemeClr val="lt1"/>
+      </a:solidFill>
+      <a:ln w="9525">
+        <a:solidFill>
+          <a:schemeClr val="tx1">
+            <a:lumMod val="15000"/>
+            <a:lumOff val="85000"/>
+          </a:schemeClr>
+        </a:solidFill>
+      </a:ln>
+    </cs:spPr>
+  </cs:upBar>
+  <cs:valueAxis>
+    <cs:lnRef idx="0"/>
+    <cs:fillRef idx="0"/>
+    <cs:effectRef idx="0"/>
+    <cs:fontRef idx="minor">
+      <a:schemeClr val="tx1">
+        <a:lumMod val="65000"/>
+        <a:lumOff val="35000"/>
+      </a:schemeClr>
+    </cs:fontRef>
+    <cs:defRPr sz="900" kern="1200"/>
+  </cs:valueAxis>
+  <cs:wall>
+    <cs:lnRef idx="0"/>
+    <cs:fillRef idx="0"/>
+    <cs:effectRef idx="0"/>
+    <cs:fontRef idx="minor">
+      <a:schemeClr val="tx1"/>
+    </cs:fontRef>
+    <cs:spPr>
+      <a:noFill/>
+      <a:ln>
+        <a:noFill/>
+      </a:ln>
+    </cs:spPr>
+  </cs:wall>
+</cs:chartStyle>
+</file>
+
+<file path=ppt/charts/style2.xml><?xml version="1.0" encoding="utf-8"?>
+<cs:chartStyle xmlns:cs="http://schemas.microsoft.com/office/drawing/2012/chartStyle" xmlns:a="http://schemas.openxmlformats.org/drawingml/2006/main" id="201">
+  <cs:axisTitle>
+    <cs:lnRef idx="0"/>
+    <cs:fillRef idx="0"/>
+    <cs:effectRef idx="0"/>
+    <cs:fontRef idx="minor">
+      <a:schemeClr val="tx1">
+        <a:lumMod val="65000"/>
+        <a:lumOff val="35000"/>
+      </a:schemeClr>
+    </cs:fontRef>
+    <cs:defRPr sz="1000" kern="1200"/>
+  </cs:axisTitle>
+  <cs:categoryAxis>
+    <cs:lnRef idx="0"/>
+    <cs:fillRef idx="0"/>
+    <cs:effectRef idx="0"/>
+    <cs:fontRef idx="minor">
+      <a:schemeClr val="tx1">
+        <a:lumMod val="65000"/>
+        <a:lumOff val="35000"/>
+      </a:schemeClr>
+    </cs:fontRef>
+    <cs:spPr>
+      <a:ln w="9525" cap="flat" cmpd="sng" algn="ctr">
+        <a:solidFill>
+          <a:schemeClr val="tx1">
+            <a:lumMod val="15000"/>
+            <a:lumOff val="85000"/>
+          </a:schemeClr>
+        </a:solidFill>
+        <a:round/>
+      </a:ln>
+    </cs:spPr>
+    <cs:defRPr sz="900" kern="1200"/>
+  </cs:categoryAxis>
+  <cs:chartArea mods="allowNoFillOverride allowNoLineOverride">
+    <cs:lnRef idx="0"/>
+    <cs:fillRef idx="0"/>
+    <cs:effectRef idx="0"/>
+    <cs:fontRef idx="minor">
+      <a:schemeClr val="tx1"/>
+    </cs:fontRef>
+    <cs:spPr>
+      <a:solidFill>
+        <a:schemeClr val="bg1"/>
+      </a:solidFill>
+      <a:ln w="9525" cap="flat" cmpd="sng" algn="ctr">
+        <a:solidFill>
+          <a:schemeClr val="tx1">
+            <a:lumMod val="15000"/>
+            <a:lumOff val="85000"/>
+          </a:schemeClr>
+        </a:solidFill>
+        <a:round/>
+      </a:ln>
+    </cs:spPr>
+    <cs:defRPr sz="1000" kern="1200"/>
+  </cs:chartArea>
+  <cs:dataLabel>
+    <cs:lnRef idx="0"/>
+    <cs:fillRef idx="0"/>
+    <cs:effectRef idx="0"/>
+    <cs:fontRef idx="minor">
+      <a:schemeClr val="tx1">
+        <a:lumMod val="75000"/>
+        <a:lumOff val="25000"/>
+      </a:schemeClr>
+    </cs:fontRef>
+    <cs:defRPr sz="900" kern="1200"/>
+  </cs:dataLabel>
+  <cs:dataLabelCallout>
+    <cs:lnRef idx="0"/>
+    <cs:fillRef idx="0"/>
+    <cs:effectRef idx="0"/>
+    <cs:fontRef idx="minor">
+      <a:schemeClr val="dk1">
+        <a:lumMod val="65000"/>
+        <a:lumOff val="35000"/>
+      </a:schemeClr>
+    </cs:fontRef>
+    <cs:spPr>
+      <a:solidFill>
+        <a:schemeClr val="lt1"/>
+      </a:solidFill>
+      <a:ln>
+        <a:solidFill>
+          <a:schemeClr val="dk1">
+            <a:lumMod val="25000"/>
+            <a:lumOff val="75000"/>
+          </a:schemeClr>
+        </a:solidFill>
+      </a:ln>
+    </cs:spPr>
+    <cs:defRPr sz="900" kern="1200"/>
+    <cs:bodyPr rot="0" spcFirstLastPara="1" vertOverflow="clip" horzOverflow="clip" vert="horz" wrap="square" lIns="36576" tIns="18288" rIns="36576" bIns="18288" anchor="ctr" anchorCtr="1">
+      <a:spAutoFit/>
+    </cs:bodyPr>
+  </cs:dataLabelCallout>
+  <cs:dataPoint>
+    <cs:lnRef idx="0"/>
+    <cs:fillRef idx="1">
+      <cs:styleClr val="auto"/>
+    </cs:fillRef>
+    <cs:effectRef idx="0"/>
+    <cs:fontRef idx="minor">
+      <a:schemeClr val="tx1"/>
+    </cs:fontRef>
+  </cs:dataPoint>
+  <cs:dataPoint3D>
+    <cs:lnRef idx="0"/>
+    <cs:fillRef idx="1">
+      <cs:styleClr val="auto"/>
+    </cs:fillRef>
+    <cs:effectRef idx="0"/>
+    <cs:fontRef idx="minor">
+      <a:schemeClr val="tx1"/>
+    </cs:fontRef>
+  </cs:dataPoint3D>
+  <cs:dataPointLine>
+    <cs:lnRef idx="0">
+      <cs:styleClr val="auto"/>
+    </cs:lnRef>
+    <cs:fillRef idx="1"/>
+    <cs:effectRef idx="0"/>
+    <cs:fontRef idx="minor">
+      <a:schemeClr val="tx1"/>
+    </cs:fontRef>
+    <cs:spPr>
+      <a:ln w="28575" cap="rnd">
+        <a:solidFill>
+          <a:schemeClr val="phClr"/>
+        </a:solidFill>
+        <a:round/>
+      </a:ln>
+    </cs:spPr>
+  </cs:dataPointLine>
+  <cs:dataPointMarker>
+    <cs:lnRef idx="0">
+      <cs:styleClr val="auto"/>
+    </cs:lnRef>
+    <cs:fillRef idx="1">
+      <cs:styleClr val="auto"/>
+    </cs:fillRef>
+    <cs:effectRef idx="0"/>
+    <cs:fontRef idx="minor">
+      <a:schemeClr val="tx1"/>
+    </cs:fontRef>
+    <cs:spPr>
+      <a:ln w="9525">
+        <a:solidFill>
+          <a:schemeClr val="phClr"/>
+        </a:solidFill>
+      </a:ln>
+    </cs:spPr>
+  </cs:dataPointMarker>
+  <cs:dataPointMarkerLayout symbol="circle" size="5"/>
+  <cs:dataPointWireframe>
+    <cs:lnRef idx="0">
+      <cs:styleClr val="auto"/>
+    </cs:lnRef>
+    <cs:fillRef idx="1"/>
+    <cs:effectRef idx="0"/>
+    <cs:fontRef idx="minor">
+      <a:schemeClr val="tx1"/>
+    </cs:fontRef>
+    <cs:spPr>
+      <a:ln w="9525" cap="rnd">
+        <a:solidFill>
+          <a:schemeClr val="phClr"/>
+        </a:solidFill>
+        <a:round/>
+      </a:ln>
+    </cs:spPr>
+  </cs:dataPointWireframe>
+  <cs:dataTable>
+    <cs:lnRef idx="0"/>
+    <cs:fillRef idx="0"/>
+    <cs:effectRef idx="0"/>
+    <cs:fontRef idx="minor">
+      <a:schemeClr val="tx1">
+        <a:lumMod val="65000"/>
+        <a:lumOff val="35000"/>
+      </a:schemeClr>
+    </cs:fontRef>
+    <cs:spPr>
+      <a:noFill/>
+      <a:ln w="9525" cap="flat" cmpd="sng" algn="ctr">
+        <a:solidFill>
+          <a:schemeClr val="tx1">
+            <a:lumMod val="15000"/>
+            <a:lumOff val="85000"/>
+          </a:schemeClr>
+        </a:solidFill>
+        <a:round/>
+      </a:ln>
+    </cs:spPr>
+    <cs:defRPr sz="900" kern="1200"/>
+  </cs:dataTable>
+  <cs:downBar>
+    <cs:lnRef idx="0"/>
+    <cs:fillRef idx="0"/>
+    <cs:effectRef idx="0"/>
+    <cs:fontRef idx="minor">
+      <a:schemeClr val="dk1"/>
+    </cs:fontRef>
+    <cs:spPr>
+      <a:solidFill>
+        <a:schemeClr val="dk1">
+          <a:lumMod val="65000"/>
+          <a:lumOff val="35000"/>
+        </a:schemeClr>
+      </a:solidFill>
+      <a:ln w="9525">
+        <a:solidFill>
+          <a:schemeClr val="tx1">
+            <a:lumMod val="65000"/>
+            <a:lumOff val="35000"/>
+          </a:schemeClr>
+        </a:solidFill>
+      </a:ln>
+    </cs:spPr>
+  </cs:downBar>
+  <cs:dropLine>
+    <cs:lnRef idx="0"/>
+    <cs:fillRef idx="0"/>
+    <cs:effectRef idx="0"/>
+    <cs:fontRef idx="minor">
+      <a:schemeClr val="tx1"/>
+    </cs:fontRef>
+    <cs:spPr>
+      <a:ln w="9525" cap="flat" cmpd="sng" algn="ctr">
+        <a:solidFill>
+          <a:schemeClr val="tx1">
+            <a:lumMod val="35000"/>
+            <a:lumOff val="65000"/>
+          </a:schemeClr>
+        </a:solidFill>
+        <a:round/>
+      </a:ln>
+    </cs:spPr>
+  </cs:dropLine>
+  <cs:errorBar>
+    <cs:lnRef idx="0"/>
+    <cs:fillRef idx="0"/>
+    <cs:effectRef idx="0"/>
+    <cs:fontRef idx="minor">
+      <a:schemeClr val="tx1"/>
+    </cs:fontRef>
+    <cs:spPr>
+      <a:ln w="9525" cap="flat" cmpd="sng" algn="ctr">
+        <a:solidFill>
+          <a:schemeClr val="tx1">
+            <a:lumMod val="65000"/>
+            <a:lumOff val="35000"/>
+          </a:schemeClr>
+        </a:solidFill>
+        <a:round/>
+      </a:ln>
+    </cs:spPr>
+  </cs:errorBar>
+  <cs:floor>
+    <cs:lnRef idx="0"/>
+    <cs:fillRef idx="0"/>
+    <cs:effectRef idx="0"/>
+    <cs:fontRef idx="minor">
+      <a:schemeClr val="tx1"/>
+    </cs:fontRef>
+    <cs:spPr>
+      <a:noFill/>
+      <a:ln>
+        <a:noFill/>
+      </a:ln>
+    </cs:spPr>
+  </cs:floor>
+  <cs:gridlineMajor>
+    <cs:lnRef idx="0"/>
+    <cs:fillRef idx="0"/>
+    <cs:effectRef idx="0"/>
+    <cs:fontRef idx="minor">
+      <a:schemeClr val="tx1"/>
+    </cs:fontRef>
+    <cs:spPr>
+      <a:ln w="9525" cap="flat" cmpd="sng" algn="ctr">
+        <a:solidFill>
+          <a:schemeClr val="tx1">
+            <a:lumMod val="15000"/>
+            <a:lumOff val="85000"/>
+          </a:schemeClr>
+        </a:solidFill>
+        <a:round/>
+      </a:ln>
+    </cs:spPr>
+  </cs:gridlineMajor>
+  <cs:gridlineMinor>
+    <cs:lnRef idx="0"/>
+    <cs:fillRef idx="0"/>
+    <cs:effectRef idx="0"/>
+    <cs:fontRef idx="minor">
+      <a:schemeClr val="tx1"/>
+    </cs:fontRef>
+    <cs:spPr>
+      <a:ln w="9525" cap="flat" cmpd="sng" algn="ctr">
+        <a:solidFill>
+          <a:schemeClr val="tx1">
+            <a:lumMod val="5000"/>
+            <a:lumOff val="95000"/>
+          </a:schemeClr>
+        </a:solidFill>
+        <a:round/>
+      </a:ln>
+    </cs:spPr>
+  </cs:gridlineMinor>
+  <cs:hiLoLine>
+    <cs:lnRef idx="0"/>
+    <cs:fillRef idx="0"/>
+    <cs:effectRef idx="0"/>
+    <cs:fontRef idx="minor">
+      <a:schemeClr val="tx1"/>
+    </cs:fontRef>
+    <cs:spPr>
+      <a:ln w="9525" cap="flat" cmpd="sng" algn="ctr">
+        <a:solidFill>
+          <a:schemeClr val="tx1">
+            <a:lumMod val="75000"/>
+            <a:lumOff val="25000"/>
+          </a:schemeClr>
+        </a:solidFill>
+        <a:round/>
+      </a:ln>
+    </cs:spPr>
+  </cs:hiLoLine>
+  <cs:leaderLine>
+    <cs:lnRef idx="0"/>
+    <cs:fillRef idx="0"/>
+    <cs:effectRef idx="0"/>
+    <cs:fontRef idx="minor">
+      <a:schemeClr val="tx1"/>
+    </cs:fontRef>
+    <cs:spPr>
+      <a:ln w="9525" cap="flat" cmpd="sng" algn="ctr">
+        <a:solidFill>
+          <a:schemeClr val="tx1">
+            <a:lumMod val="35000"/>
+            <a:lumOff val="65000"/>
+          </a:schemeClr>
+        </a:solidFill>
+        <a:round/>
+      </a:ln>
+    </cs:spPr>
+  </cs:leaderLine>
+  <cs:legend>
+    <cs:lnRef idx="0"/>
+    <cs:fillRef idx="0"/>
+    <cs:effectRef idx="0"/>
+    <cs:fontRef idx="minor">
+      <a:schemeClr val="tx1">
+        <a:lumMod val="65000"/>
+        <a:lumOff val="35000"/>
+      </a:schemeClr>
+    </cs:fontRef>
+    <cs:defRPr sz="900" kern="1200"/>
+  </cs:legend>
+  <cs:plotArea mods="allowNoFillOverride allowNoLineOverride">
+    <cs:lnRef idx="0"/>
+    <cs:fillRef idx="0"/>
+    <cs:effectRef idx="0"/>
+    <cs:fontRef idx="minor">
+      <a:schemeClr val="tx1"/>
+    </cs:fontRef>
+  </cs:plotArea>
+  <cs:plotArea3D mods="allowNoFillOverride allowNoLineOverride">
+    <cs:lnRef idx="0"/>
+    <cs:fillRef idx="0"/>
+    <cs:effectRef idx="0"/>
+    <cs:fontRef idx="minor">
+      <a:schemeClr val="tx1"/>
+    </cs:fontRef>
+  </cs:plotArea3D>
+  <cs:seriesAxis>
+    <cs:lnRef idx="0"/>
+    <cs:fillRef idx="0"/>
+    <cs:effectRef idx="0"/>
+    <cs:fontRef idx="minor">
+      <a:schemeClr val="tx1">
+        <a:lumMod val="65000"/>
+        <a:lumOff val="35000"/>
+      </a:schemeClr>
+    </cs:fontRef>
+    <cs:defRPr sz="900" kern="1200"/>
+  </cs:seriesAxis>
+  <cs:seriesLine>
+    <cs:lnRef idx="0"/>
+    <cs:fillRef idx="0"/>
+    <cs:effectRef idx="0"/>
+    <cs:fontRef idx="minor">
+      <a:schemeClr val="tx1"/>
+    </cs:fontRef>
+    <cs:spPr>
+      <a:ln w="9525" cap="flat" cmpd="sng" algn="ctr">
+        <a:solidFill>
+          <a:schemeClr val="tx1">
+            <a:lumMod val="35000"/>
+            <a:lumOff val="65000"/>
+          </a:schemeClr>
+        </a:solidFill>
+        <a:round/>
+      </a:ln>
+    </cs:spPr>
+  </cs:seriesLine>
+  <cs:title>
+    <cs:lnRef idx="0"/>
+    <cs:fillRef idx="0"/>
+    <cs:effectRef idx="0"/>
+    <cs:fontRef idx="minor">
+      <a:schemeClr val="tx1">
+        <a:lumMod val="65000"/>
+        <a:lumOff val="35000"/>
+      </a:schemeClr>
+    </cs:fontRef>
+    <cs:defRPr sz="1400" b="0" kern="1200" spc="0" baseline="0"/>
+  </cs:title>
+  <cs:trendline>
+    <cs:lnRef idx="0">
+      <cs:styleClr val="auto"/>
+    </cs:lnRef>
+    <cs:fillRef idx="0"/>
+    <cs:effectRef idx="0"/>
+    <cs:fontRef idx="minor">
+      <a:schemeClr val="tx1"/>
+    </cs:fontRef>
+    <cs:spPr>
+      <a:ln w="19050" cap="rnd">
+        <a:solidFill>
+          <a:schemeClr val="phClr"/>
+        </a:solidFill>
+        <a:prstDash val="sysDot"/>
+      </a:ln>
+    </cs:spPr>
+  </cs:trendline>
+  <cs:trendlineLabel>
+    <cs:lnRef idx="0"/>
+    <cs:fillRef idx="0"/>
+    <cs:effectRef idx="0"/>
+    <cs:fontRef idx="minor">
+      <a:schemeClr val="tx1">
+        <a:lumMod val="65000"/>
+        <a:lumOff val="35000"/>
+      </a:schemeClr>
+    </cs:fontRef>
+    <cs:defRPr sz="900" kern="1200"/>
+  </cs:trendlineLabel>
+  <cs:upBar>
+    <cs:lnRef idx="0"/>
+    <cs:fillRef idx="0"/>
+    <cs:effectRef idx="0"/>
+    <cs:fontRef idx="minor">
+      <a:schemeClr val="dk1"/>
+    </cs:fontRef>
+    <cs:spPr>
+      <a:solidFill>
+        <a:schemeClr val="lt1"/>
+      </a:solidFill>
+      <a:ln w="9525">
+        <a:solidFill>
+          <a:schemeClr val="tx1">
+            <a:lumMod val="15000"/>
+            <a:lumOff val="85000"/>
+          </a:schemeClr>
+        </a:solidFill>
+      </a:ln>
+    </cs:spPr>
+  </cs:upBar>
+  <cs:valueAxis>
+    <cs:lnRef idx="0"/>
+    <cs:fillRef idx="0"/>
+    <cs:effectRef idx="0"/>
+    <cs:fontRef idx="minor">
+      <a:schemeClr val="tx1">
+        <a:lumMod val="65000"/>
+        <a:lumOff val="35000"/>
+      </a:schemeClr>
+    </cs:fontRef>
+    <cs:defRPr sz="900" kern="1200"/>
+  </cs:valueAxis>
+  <cs:wall>
+    <cs:lnRef idx="0"/>
+    <cs:fillRef idx="0"/>
+    <cs:effectRef idx="0"/>
+    <cs:fontRef idx="minor">
+      <a:schemeClr val="tx1"/>
+    </cs:fontRef>
+    <cs:spPr>
+      <a:noFill/>
+      <a:ln>
+        <a:noFill/>
+      </a:ln>
+    </cs:spPr>
+  </cs:wall>
+</cs:chartStyle>
+</file>
+
 <file path=ppt/slideLayouts/slideLayout1.xml><?xml version="1.0" encoding="utf-8"?>
 <p:sldLayout xmlns:a="http://schemas.openxmlformats.org/drawingml/2006/main" xmlns:r="http://schemas.openxmlformats.org/officeDocument/2006/relationships" xmlns:p="http://schemas.openxmlformats.org/presentationml/2006/main" type="title" preserve="1">
   <p:cSld name="Title Slide">
@@ -306,7 +3259,7 @@
           <a:p>
             <a:fld id="{5BCAD085-E8A6-8845-BD4E-CB4CCA059FC4}" type="datetimeFigureOut">
               <a:rPr lang="en-US" smtClean="0"/>
-              <a:t>7/15/2025</a:t>
+              <a:t>7/16/2025</a:t>
             </a:fld>
             <a:endParaRPr lang="en-US"/>
           </a:p>
@@ -474,7 +3427,7 @@
           <a:p>
             <a:fld id="{5BCAD085-E8A6-8845-BD4E-CB4CCA059FC4}" type="datetimeFigureOut">
               <a:rPr lang="en-US" smtClean="0"/>
-              <a:t>7/15/2025</a:t>
+              <a:t>7/16/2025</a:t>
             </a:fld>
             <a:endParaRPr lang="en-US"/>
           </a:p>
@@ -652,7 +3605,7 @@
           <a:p>
             <a:fld id="{5BCAD085-E8A6-8845-BD4E-CB4CCA059FC4}" type="datetimeFigureOut">
               <a:rPr lang="en-US" smtClean="0"/>
-              <a:t>7/15/2025</a:t>
+              <a:t>7/16/2025</a:t>
             </a:fld>
             <a:endParaRPr lang="en-US"/>
           </a:p>
@@ -820,7 +3773,7 @@
           <a:p>
             <a:fld id="{5BCAD085-E8A6-8845-BD4E-CB4CCA059FC4}" type="datetimeFigureOut">
               <a:rPr lang="en-US" smtClean="0"/>
-              <a:t>7/15/2025</a:t>
+              <a:t>7/16/2025</a:t>
             </a:fld>
             <a:endParaRPr lang="en-US"/>
           </a:p>
@@ -1065,7 +4018,7 @@
           <a:p>
             <a:fld id="{5BCAD085-E8A6-8845-BD4E-CB4CCA059FC4}" type="datetimeFigureOut">
               <a:rPr lang="en-US" smtClean="0"/>
-              <a:t>7/15/2025</a:t>
+              <a:t>7/16/2025</a:t>
             </a:fld>
             <a:endParaRPr lang="en-US"/>
           </a:p>
@@ -1350,7 +4303,7 @@
           <a:p>
             <a:fld id="{5BCAD085-E8A6-8845-BD4E-CB4CCA059FC4}" type="datetimeFigureOut">
               <a:rPr lang="en-US" smtClean="0"/>
-              <a:t>7/15/2025</a:t>
+              <a:t>7/16/2025</a:t>
             </a:fld>
             <a:endParaRPr lang="en-US"/>
           </a:p>
@@ -1769,7 +4722,7 @@
           <a:p>
             <a:fld id="{5BCAD085-E8A6-8845-BD4E-CB4CCA059FC4}" type="datetimeFigureOut">
               <a:rPr lang="en-US" smtClean="0"/>
-              <a:t>7/15/2025</a:t>
+              <a:t>7/16/2025</a:t>
             </a:fld>
             <a:endParaRPr lang="en-US"/>
           </a:p>
@@ -1886,7 +4839,7 @@
           <a:p>
             <a:fld id="{5BCAD085-E8A6-8845-BD4E-CB4CCA059FC4}" type="datetimeFigureOut">
               <a:rPr lang="en-US" smtClean="0"/>
-              <a:t>7/15/2025</a:t>
+              <a:t>7/16/2025</a:t>
             </a:fld>
             <a:endParaRPr lang="en-US"/>
           </a:p>
@@ -1981,7 +4934,7 @@
           <a:p>
             <a:fld id="{5BCAD085-E8A6-8845-BD4E-CB4CCA059FC4}" type="datetimeFigureOut">
               <a:rPr lang="en-US" smtClean="0"/>
-              <a:t>7/15/2025</a:t>
+              <a:t>7/16/2025</a:t>
             </a:fld>
             <a:endParaRPr lang="en-US"/>
           </a:p>
@@ -2256,7 +5209,7 @@
           <a:p>
             <a:fld id="{5BCAD085-E8A6-8845-BD4E-CB4CCA059FC4}" type="datetimeFigureOut">
               <a:rPr lang="en-US" smtClean="0"/>
-              <a:t>7/15/2025</a:t>
+              <a:t>7/16/2025</a:t>
             </a:fld>
             <a:endParaRPr lang="en-US"/>
           </a:p>
@@ -2508,7 +5461,7 @@
           <a:p>
             <a:fld id="{5BCAD085-E8A6-8845-BD4E-CB4CCA059FC4}" type="datetimeFigureOut">
               <a:rPr lang="en-US" smtClean="0"/>
-              <a:t>7/15/2025</a:t>
+              <a:t>7/16/2025</a:t>
             </a:fld>
             <a:endParaRPr lang="en-US"/>
           </a:p>
@@ -2719,7 +5672,7 @@
           <a:p>
             <a:fld id="{5BCAD085-E8A6-8845-BD4E-CB4CCA059FC4}" type="datetimeFigureOut">
               <a:rPr lang="en-US" smtClean="0"/>
-              <a:t>7/15/2025</a:t>
+              <a:t>7/16/2025</a:t>
             </a:fld>
             <a:endParaRPr lang="en-US"/>
           </a:p>
@@ -3150,7 +6103,7 @@
         </p:nvSpPr>
         <p:spPr>
           <a:xfrm>
-            <a:off x="365760" y="1369951"/>
+            <a:off x="365760" y="1407828"/>
             <a:ext cx="8321040" cy="584775"/>
           </a:xfrm>
           <a:prstGeom prst="rect">
@@ -3169,7 +6122,14 @@
             </a:pPr>
             <a:r>
               <a:rPr lang="en-US" sz="1600" dirty="0"/>
-              <a:t>Securing top software talent is vital for our Software-Defined Vehicle (SDV) strategy. Analysis reveals five key insights.</a:t>
+              <a:t>Securing top software talent is vital for our Software-Defined Vehicle (SDV) strategy. </a:t>
+            </a:r>
+            <a:br>
+              <a:rPr lang="en-US" sz="1600" dirty="0"/>
+            </a:br>
+            <a:r>
+              <a:rPr lang="en-US" sz="1600" dirty="0"/>
+              <a:t>Analysis reveals five key insights.</a:t>
             </a:r>
           </a:p>
         </p:txBody>
@@ -3589,7 +6549,13 @@
           <a:prstGeom prst="line">
             <a:avLst/>
           </a:prstGeom>
-          <a:ln/>
+          <a:ln>
+            <a:solidFill>
+              <a:schemeClr val="bg1">
+                <a:lumMod val="65000"/>
+              </a:schemeClr>
+            </a:solidFill>
+          </a:ln>
         </p:spPr>
         <p:style>
           <a:lnRef idx="1">
@@ -3628,7 +6594,13 @@
           <a:prstGeom prst="line">
             <a:avLst/>
           </a:prstGeom>
-          <a:ln/>
+          <a:ln>
+            <a:solidFill>
+              <a:schemeClr val="bg1">
+                <a:lumMod val="65000"/>
+              </a:schemeClr>
+            </a:solidFill>
+          </a:ln>
         </p:spPr>
         <p:style>
           <a:lnRef idx="1">
@@ -3667,7 +6639,13 @@
           <a:prstGeom prst="line">
             <a:avLst/>
           </a:prstGeom>
-          <a:ln/>
+          <a:ln>
+            <a:solidFill>
+              <a:schemeClr val="bg1">
+                <a:lumMod val="65000"/>
+              </a:schemeClr>
+            </a:solidFill>
+          </a:ln>
         </p:spPr>
         <p:style>
           <a:lnRef idx="1">
@@ -3768,6 +6746,64 @@
       </p:grpSpPr>
       <p:sp>
         <p:nvSpPr>
+          <p:cNvPr id="16" name="Rectangle 15">
+            <a:extLst>
+              <a:ext uri="{FF2B5EF4-FFF2-40B4-BE49-F238E27FC236}">
+                <a16:creationId xmlns:a16="http://schemas.microsoft.com/office/drawing/2014/main" id="{38BC7626-ADCA-AF06-9699-2371C50F02E1}"/>
+              </a:ext>
+            </a:extLst>
+          </p:cNvPr>
+          <p:cNvSpPr/>
+          <p:nvPr/>
+        </p:nvSpPr>
+        <p:spPr>
+          <a:xfrm>
+            <a:off x="457200" y="1032100"/>
+            <a:ext cx="3516086" cy="2501321"/>
+          </a:xfrm>
+          <a:prstGeom prst="rect">
+            <a:avLst/>
+          </a:prstGeom>
+          <a:solidFill>
+            <a:schemeClr val="accent1">
+              <a:alpha val="30000"/>
+            </a:schemeClr>
+          </a:solidFill>
+          <a:ln>
+            <a:noFill/>
+          </a:ln>
+        </p:spPr>
+        <p:style>
+          <a:lnRef idx="0">
+            <a:scrgbClr r="0" g="0" b="0"/>
+          </a:lnRef>
+          <a:fillRef idx="0">
+            <a:scrgbClr r="0" g="0" b="0"/>
+          </a:fillRef>
+          <a:effectRef idx="0">
+            <a:scrgbClr r="0" g="0" b="0"/>
+          </a:effectRef>
+          <a:fontRef idx="minor">
+            <a:schemeClr val="lt1"/>
+          </a:fontRef>
+        </p:style>
+        <p:txBody>
+          <a:bodyPr rtlCol="0" anchor="ctr"/>
+          <a:lstStyle/>
+          <a:p>
+            <a:r>
+              <a:rPr lang="en-US" sz="1600" dirty="0">
+                <a:solidFill>
+                  <a:schemeClr val="tx1"/>
+                </a:solidFill>
+              </a:rPr>
+              <a:t>Hiring steadily increased from 2018 to 2022 but sharply declined in 2023 due to a hiring freeze caused by a semiconductor shortage in the industry</a:t>
+            </a:r>
+          </a:p>
+        </p:txBody>
+      </p:sp>
+      <p:sp>
+        <p:nvSpPr>
           <p:cNvPr id="2" name="Title 1">
             <a:extLst>
               <a:ext uri="{FF2B5EF4-FFF2-40B4-BE49-F238E27FC236}">
@@ -3795,87 +6831,9 @@
           <a:lstStyle/>
           <a:p>
             <a:r>
-              <a:rPr lang="en-US" sz="3600" dirty="0"/>
-              <a:t>SDV Talent Gap Analysis (1/4)</a:t>
-            </a:r>
-          </a:p>
-        </p:txBody>
-      </p:sp>
-      <p:sp>
-        <p:nvSpPr>
-          <p:cNvPr id="8" name="TextBox 7">
-            <a:extLst>
-              <a:ext uri="{FF2B5EF4-FFF2-40B4-BE49-F238E27FC236}">
-                <a16:creationId xmlns:a16="http://schemas.microsoft.com/office/drawing/2014/main" id="{F151F180-CC61-262B-8919-DCE7E422D611}"/>
-              </a:ext>
-            </a:extLst>
-          </p:cNvPr>
-          <p:cNvSpPr txBox="1"/>
-          <p:nvPr/>
-        </p:nvSpPr>
-        <p:spPr>
-          <a:xfrm>
-            <a:off x="381450" y="1166842"/>
-            <a:ext cx="4699150" cy="4524315"/>
-          </a:xfrm>
-          <a:prstGeom prst="rect">
-            <a:avLst/>
-          </a:prstGeom>
-          <a:noFill/>
-        </p:spPr>
-        <p:txBody>
-          <a:bodyPr wrap="square">
-            <a:spAutoFit/>
-          </a:bodyPr>
-          <a:lstStyle/>
-          <a:p>
-            <a:r>
-              <a:rPr lang="en-US" dirty="0"/>
-              <a:t>1️⃣ Hiring &amp; Attrition Trends</a:t>
-            </a:r>
-          </a:p>
-          <a:p>
-            <a:pPr marL="285750" indent="-285750">
-              <a:buFont typeface="Arial" panose="020B0604020202020204" pitchFamily="34" charset="0"/>
-              <a:buChar char="•"/>
-            </a:pPr>
-            <a:r>
-              <a:rPr lang="en-US" dirty="0"/>
-              <a:t>Hiring steadily increased from 2018 to 2022 (from ~77 to 111 hires annually) but sharply declined in 2023 due to a semiconductor shortage resulting in a hiring freeze.</a:t>
-            </a:r>
-          </a:p>
-          <a:p>
-            <a:pPr marL="285750" indent="-285750">
-              <a:buFont typeface="Arial" panose="020B0604020202020204" pitchFamily="34" charset="0"/>
-              <a:buChar char="•"/>
-            </a:pPr>
-            <a:r>
-              <a:rPr lang="en-US" dirty="0"/>
-              <a:t>Attrition stands at 26% over 5.5 years — well above the 15% company target.</a:t>
-            </a:r>
-          </a:p>
-          <a:p>
-            <a:pPr marL="285750" indent="-285750">
-              <a:buFont typeface="Arial" panose="020B0604020202020204" pitchFamily="34" charset="0"/>
-              <a:buChar char="•"/>
-            </a:pPr>
-            <a:r>
-              <a:rPr lang="en-US" dirty="0"/>
-              <a:t>Attrition is highest in North America (30%), lowest in Asia-Pacific (22%), with Europe in between (25%).</a:t>
-            </a:r>
-          </a:p>
-          <a:p>
-            <a:pPr marL="285750" indent="-285750">
-              <a:buFont typeface="Arial" panose="020B0604020202020204" pitchFamily="34" charset="0"/>
-              <a:buChar char="•"/>
-            </a:pPr>
-            <a:r>
-              <a:rPr lang="en-US" dirty="0"/>
-              <a:t>High attrition is concentrated in Embedded Systems, Cloud Engineering, and Infotainment, mainly driven by lack of growth opportunities, better external offers, and personal reasons.</a:t>
-            </a:r>
-          </a:p>
-          <a:p>
-            <a:endParaRPr lang="en-US" dirty="0"/>
+              <a:rPr lang="en-US" sz="2400" dirty="0"/>
+              <a:t>Hiring sufficient SDV Talent has been challenging since COVID</a:t>
+            </a:r>
           </a:p>
         </p:txBody>
       </p:sp>
@@ -3893,8 +6851,499 @@
         </p:nvSpPr>
         <p:spPr>
           <a:xfrm>
-            <a:off x="381450" y="5931379"/>
-            <a:ext cx="8305350" cy="646331"/>
+            <a:off x="381450" y="6331743"/>
+            <a:ext cx="8563126" cy="338554"/>
+          </a:xfrm>
+          <a:prstGeom prst="rect">
+            <a:avLst/>
+          </a:prstGeom>
+          <a:noFill/>
+          <a:ln w="12700">
+            <a:solidFill>
+              <a:schemeClr val="tx2">
+                <a:lumMod val="75000"/>
+              </a:schemeClr>
+            </a:solidFill>
+          </a:ln>
+        </p:spPr>
+        <p:txBody>
+          <a:bodyPr wrap="square">
+            <a:spAutoFit/>
+          </a:bodyPr>
+          <a:lstStyle/>
+          <a:p>
+            <a:pPr algn="ctr"/>
+            <a:r>
+              <a:rPr lang="en-US" sz="1600" dirty="0"/>
+              <a:t>Recommendation: Shift resources from Career Fairs to LinkedIn, Recruiters &amp; Referral Program</a:t>
+            </a:r>
+          </a:p>
+        </p:txBody>
+      </p:sp>
+      <p:grpSp>
+        <p:nvGrpSpPr>
+          <p:cNvPr id="9" name="Group 8">
+            <a:extLst>
+              <a:ext uri="{FF2B5EF4-FFF2-40B4-BE49-F238E27FC236}">
+                <a16:creationId xmlns:a16="http://schemas.microsoft.com/office/drawing/2014/main" id="{045C4278-AB0E-698E-7CD3-E60896901F1E}"/>
+              </a:ext>
+            </a:extLst>
+          </p:cNvPr>
+          <p:cNvGrpSpPr/>
+          <p:nvPr/>
+        </p:nvGrpSpPr>
+        <p:grpSpPr>
+          <a:xfrm>
+            <a:off x="4012576" y="1032102"/>
+            <a:ext cx="4932000" cy="2556000"/>
+            <a:chOff x="0" y="0"/>
+            <a:chExt cx="4469020" cy="2771913"/>
+          </a:xfrm>
+        </p:grpSpPr>
+        <p:graphicFrame>
+          <p:nvGraphicFramePr>
+            <p:cNvPr id="12" name="Chart 11">
+              <a:extLst>
+                <a:ext uri="{FF2B5EF4-FFF2-40B4-BE49-F238E27FC236}">
+                  <a16:creationId xmlns:a16="http://schemas.microsoft.com/office/drawing/2014/main" id="{48AA6E54-6514-8777-65DF-2E6792754B7F}"/>
+                </a:ext>
+              </a:extLst>
+            </p:cNvPr>
+            <p:cNvGraphicFramePr/>
+            <p:nvPr>
+              <p:extLst>
+                <p:ext uri="{D42A27DB-BD31-4B8C-83A1-F6EECF244321}">
+                  <p14:modId xmlns:p14="http://schemas.microsoft.com/office/powerpoint/2010/main" val="1773273451"/>
+                </p:ext>
+              </p:extLst>
+            </p:nvPr>
+          </p:nvGraphicFramePr>
+          <p:xfrm>
+            <a:off x="0" y="0"/>
+            <a:ext cx="4469020" cy="2771913"/>
+          </p:xfrm>
+          <a:graphic>
+            <a:graphicData uri="http://schemas.openxmlformats.org/drawingml/2006/chart">
+              <c:chart xmlns:c="http://schemas.openxmlformats.org/drawingml/2006/chart" xmlns:r="http://schemas.openxmlformats.org/officeDocument/2006/relationships" r:id="rId2"/>
+            </a:graphicData>
+          </a:graphic>
+        </p:graphicFrame>
+        <p:sp>
+          <p:nvSpPr>
+            <p:cNvPr id="13" name="Rectangle 12">
+              <a:extLst>
+                <a:ext uri="{FF2B5EF4-FFF2-40B4-BE49-F238E27FC236}">
+                  <a16:creationId xmlns:a16="http://schemas.microsoft.com/office/drawing/2014/main" id="{B13E5703-6BAD-0C27-04CB-5F0631C0EB47}"/>
+                </a:ext>
+              </a:extLst>
+            </p:cNvPr>
+            <p:cNvSpPr/>
+            <p:nvPr/>
+          </p:nvSpPr>
+          <p:spPr>
+            <a:xfrm>
+              <a:off x="2805927" y="554558"/>
+              <a:ext cx="578126" cy="447539"/>
+            </a:xfrm>
+            <a:prstGeom prst="rect">
+              <a:avLst/>
+            </a:prstGeom>
+            <a:noFill/>
+            <a:ln w="3175">
+              <a:solidFill>
+                <a:sysClr val="windowText" lastClr="000000"/>
+              </a:solidFill>
+            </a:ln>
+          </p:spPr>
+          <p:style>
+            <a:lnRef idx="2">
+              <a:schemeClr val="accent1">
+                <a:shade val="15000"/>
+              </a:schemeClr>
+            </a:lnRef>
+            <a:fillRef idx="1">
+              <a:schemeClr val="accent1"/>
+            </a:fillRef>
+            <a:effectRef idx="0">
+              <a:schemeClr val="accent1"/>
+            </a:effectRef>
+            <a:fontRef idx="minor">
+              <a:schemeClr val="lt1"/>
+            </a:fontRef>
+          </p:style>
+          <p:txBody>
+            <a:bodyPr rtlCol="0" anchor="ctr"/>
+            <a:lstStyle>
+              <a:lvl1pPr marL="0" indent="0">
+                <a:defRPr sz="1100">
+                  <a:solidFill>
+                    <a:schemeClr val="lt1"/>
+                  </a:solidFill>
+                  <a:latin typeface="+mn-lt"/>
+                  <a:ea typeface="+mn-ea"/>
+                  <a:cs typeface="+mn-cs"/>
+                </a:defRPr>
+              </a:lvl1pPr>
+              <a:lvl2pPr marL="457200" indent="0">
+                <a:defRPr sz="1100">
+                  <a:solidFill>
+                    <a:schemeClr val="lt1"/>
+                  </a:solidFill>
+                  <a:latin typeface="+mn-lt"/>
+                  <a:ea typeface="+mn-ea"/>
+                  <a:cs typeface="+mn-cs"/>
+                </a:defRPr>
+              </a:lvl2pPr>
+              <a:lvl3pPr marL="914400" indent="0">
+                <a:defRPr sz="1100">
+                  <a:solidFill>
+                    <a:schemeClr val="lt1"/>
+                  </a:solidFill>
+                  <a:latin typeface="+mn-lt"/>
+                  <a:ea typeface="+mn-ea"/>
+                  <a:cs typeface="+mn-cs"/>
+                </a:defRPr>
+              </a:lvl3pPr>
+              <a:lvl4pPr marL="1371600" indent="0">
+                <a:defRPr sz="1100">
+                  <a:solidFill>
+                    <a:schemeClr val="lt1"/>
+                  </a:solidFill>
+                  <a:latin typeface="+mn-lt"/>
+                  <a:ea typeface="+mn-ea"/>
+                  <a:cs typeface="+mn-cs"/>
+                </a:defRPr>
+              </a:lvl4pPr>
+              <a:lvl5pPr marL="1828800" indent="0">
+                <a:defRPr sz="1100">
+                  <a:solidFill>
+                    <a:schemeClr val="lt1"/>
+                  </a:solidFill>
+                  <a:latin typeface="+mn-lt"/>
+                  <a:ea typeface="+mn-ea"/>
+                  <a:cs typeface="+mn-cs"/>
+                </a:defRPr>
+              </a:lvl5pPr>
+              <a:lvl6pPr marL="2286000" indent="0">
+                <a:defRPr sz="1100">
+                  <a:solidFill>
+                    <a:schemeClr val="lt1"/>
+                  </a:solidFill>
+                  <a:latin typeface="+mn-lt"/>
+                  <a:ea typeface="+mn-ea"/>
+                  <a:cs typeface="+mn-cs"/>
+                </a:defRPr>
+              </a:lvl6pPr>
+              <a:lvl7pPr marL="2743200" indent="0">
+                <a:defRPr sz="1100">
+                  <a:solidFill>
+                    <a:schemeClr val="lt1"/>
+                  </a:solidFill>
+                  <a:latin typeface="+mn-lt"/>
+                  <a:ea typeface="+mn-ea"/>
+                  <a:cs typeface="+mn-cs"/>
+                </a:defRPr>
+              </a:lvl7pPr>
+              <a:lvl8pPr marL="3200400" indent="0">
+                <a:defRPr sz="1100">
+                  <a:solidFill>
+                    <a:schemeClr val="lt1"/>
+                  </a:solidFill>
+                  <a:latin typeface="+mn-lt"/>
+                  <a:ea typeface="+mn-ea"/>
+                  <a:cs typeface="+mn-cs"/>
+                </a:defRPr>
+              </a:lvl8pPr>
+              <a:lvl9pPr marL="3657600" indent="0">
+                <a:defRPr sz="1100">
+                  <a:solidFill>
+                    <a:schemeClr val="lt1"/>
+                  </a:solidFill>
+                  <a:latin typeface="+mn-lt"/>
+                  <a:ea typeface="+mn-ea"/>
+                  <a:cs typeface="+mn-cs"/>
+                </a:defRPr>
+              </a:lvl9pPr>
+            </a:lstStyle>
+            <a:p>
+              <a:pPr algn="ctr"/>
+              <a:r>
+                <a:rPr lang="en-US" sz="1100" b="0">
+                  <a:solidFill>
+                    <a:sysClr val="windowText" lastClr="000000"/>
+                  </a:solidFill>
+                </a:rPr>
+                <a:t>Hiring</a:t>
+              </a:r>
+              <a:r>
+                <a:rPr lang="en-US" sz="1100" b="0" baseline="0">
+                  <a:solidFill>
+                    <a:sysClr val="windowText" lastClr="000000"/>
+                  </a:solidFill>
+                </a:rPr>
+                <a:t> freeze</a:t>
+              </a:r>
+              <a:endParaRPr lang="en-US" sz="1100" b="0">
+                <a:solidFill>
+                  <a:sysClr val="windowText" lastClr="000000"/>
+                </a:solidFill>
+              </a:endParaRPr>
+            </a:p>
+          </p:txBody>
+        </p:sp>
+        <p:cxnSp>
+          <p:nvCxnSpPr>
+            <p:cNvPr id="14" name="Straight Connector 13">
+              <a:extLst>
+                <a:ext uri="{FF2B5EF4-FFF2-40B4-BE49-F238E27FC236}">
+                  <a16:creationId xmlns:a16="http://schemas.microsoft.com/office/drawing/2014/main" id="{3E42C358-C2BA-C45E-36D5-79E34B032CFC}"/>
+                </a:ext>
+              </a:extLst>
+            </p:cNvPr>
+            <p:cNvCxnSpPr>
+              <a:endCxn id="13" idx="1"/>
+            </p:cNvCxnSpPr>
+            <p:nvPr/>
+          </p:nvCxnSpPr>
+          <p:spPr>
+            <a:xfrm flipV="1">
+              <a:off x="2590337" y="778531"/>
+              <a:ext cx="215590" cy="527"/>
+            </a:xfrm>
+            <a:prstGeom prst="line">
+              <a:avLst/>
+            </a:prstGeom>
+            <a:ln>
+              <a:solidFill>
+                <a:schemeClr val="tx1"/>
+              </a:solidFill>
+              <a:prstDash val="dash"/>
+            </a:ln>
+          </p:spPr>
+          <p:style>
+            <a:lnRef idx="1">
+              <a:schemeClr val="accent1"/>
+            </a:lnRef>
+            <a:fillRef idx="0">
+              <a:schemeClr val="accent1"/>
+            </a:fillRef>
+            <a:effectRef idx="0">
+              <a:schemeClr val="accent1"/>
+            </a:effectRef>
+            <a:fontRef idx="minor">
+              <a:schemeClr val="tx1"/>
+            </a:fontRef>
+          </p:style>
+        </p:cxnSp>
+        <p:cxnSp>
+          <p:nvCxnSpPr>
+            <p:cNvPr id="15" name="Straight Connector 14">
+              <a:extLst>
+                <a:ext uri="{FF2B5EF4-FFF2-40B4-BE49-F238E27FC236}">
+                  <a16:creationId xmlns:a16="http://schemas.microsoft.com/office/drawing/2014/main" id="{AC1ADBD8-0B5E-4321-A060-B965A36FC78D}"/>
+                </a:ext>
+              </a:extLst>
+            </p:cNvPr>
+            <p:cNvCxnSpPr>
+              <a:endCxn id="13" idx="2"/>
+            </p:cNvCxnSpPr>
+            <p:nvPr/>
+          </p:nvCxnSpPr>
+          <p:spPr>
+            <a:xfrm flipV="1">
+              <a:off x="3091041" y="1002097"/>
+              <a:ext cx="4354" cy="1101139"/>
+            </a:xfrm>
+            <a:prstGeom prst="line">
+              <a:avLst/>
+            </a:prstGeom>
+            <a:ln>
+              <a:solidFill>
+                <a:schemeClr val="tx1"/>
+              </a:solidFill>
+              <a:prstDash val="dash"/>
+            </a:ln>
+          </p:spPr>
+          <p:style>
+            <a:lnRef idx="1">
+              <a:schemeClr val="accent1"/>
+            </a:lnRef>
+            <a:fillRef idx="0">
+              <a:schemeClr val="accent1"/>
+            </a:fillRef>
+            <a:effectRef idx="0">
+              <a:schemeClr val="accent1"/>
+            </a:effectRef>
+            <a:fontRef idx="minor">
+              <a:schemeClr val="tx1"/>
+            </a:fontRef>
+          </p:style>
+        </p:cxnSp>
+      </p:grpSp>
+      <p:graphicFrame>
+        <p:nvGraphicFramePr>
+          <p:cNvPr id="19" name="Chart 18">
+            <a:extLst>
+              <a:ext uri="{FF2B5EF4-FFF2-40B4-BE49-F238E27FC236}">
+                <a16:creationId xmlns:a16="http://schemas.microsoft.com/office/drawing/2014/main" id="{8C1105C0-287A-C1F2-75BA-E8F765A5B271}"/>
+              </a:ext>
+            </a:extLst>
+          </p:cNvPr>
+          <p:cNvGraphicFramePr>
+            <a:graphicFrameLocks/>
+          </p:cNvGraphicFramePr>
+          <p:nvPr>
+            <p:extLst>
+              <p:ext uri="{D42A27DB-BD31-4B8C-83A1-F6EECF244321}">
+                <p14:modId xmlns:p14="http://schemas.microsoft.com/office/powerpoint/2010/main" val="1291051380"/>
+              </p:ext>
+            </p:extLst>
+          </p:nvPr>
+        </p:nvGraphicFramePr>
+        <p:xfrm>
+          <a:off x="4109764" y="3825150"/>
+          <a:ext cx="4702222" cy="2385672"/>
+        </p:xfrm>
+        <a:graphic>
+          <a:graphicData uri="http://schemas.openxmlformats.org/drawingml/2006/chart">
+            <c:chart xmlns:c="http://schemas.openxmlformats.org/drawingml/2006/chart" xmlns:r="http://schemas.openxmlformats.org/officeDocument/2006/relationships" r:id="rId3"/>
+          </a:graphicData>
+        </a:graphic>
+      </p:graphicFrame>
+      <p:sp>
+        <p:nvSpPr>
+          <p:cNvPr id="22" name="Rectangle 21">
+            <a:extLst>
+              <a:ext uri="{FF2B5EF4-FFF2-40B4-BE49-F238E27FC236}">
+                <a16:creationId xmlns:a16="http://schemas.microsoft.com/office/drawing/2014/main" id="{4AEC25CB-42BC-1715-8727-E660C0EB24D6}"/>
+              </a:ext>
+            </a:extLst>
+          </p:cNvPr>
+          <p:cNvSpPr/>
+          <p:nvPr/>
+        </p:nvSpPr>
+        <p:spPr>
+          <a:xfrm>
+            <a:off x="457200" y="3825150"/>
+            <a:ext cx="3516086" cy="2385672"/>
+          </a:xfrm>
+          <a:prstGeom prst="rect">
+            <a:avLst/>
+          </a:prstGeom>
+          <a:solidFill>
+            <a:schemeClr val="accent1">
+              <a:alpha val="30000"/>
+            </a:schemeClr>
+          </a:solidFill>
+          <a:ln>
+            <a:noFill/>
+          </a:ln>
+        </p:spPr>
+        <p:style>
+          <a:lnRef idx="0">
+            <a:scrgbClr r="0" g="0" b="0"/>
+          </a:lnRef>
+          <a:fillRef idx="0">
+            <a:scrgbClr r="0" g="0" b="0"/>
+          </a:fillRef>
+          <a:effectRef idx="0">
+            <a:scrgbClr r="0" g="0" b="0"/>
+          </a:effectRef>
+          <a:fontRef idx="minor">
+            <a:schemeClr val="lt1"/>
+          </a:fontRef>
+        </p:style>
+        <p:txBody>
+          <a:bodyPr rtlCol="0" anchor="ctr"/>
+          <a:lstStyle/>
+          <a:p>
+            <a:r>
+              <a:rPr lang="en-US" sz="1600" dirty="0">
+                <a:solidFill>
+                  <a:schemeClr val="tx1"/>
+                </a:solidFill>
+              </a:rPr>
+              <a:t>LinkedIn drives ~40% of all hires, with Recruiters contributing ~27% and the Referral Program ~20%.</a:t>
+            </a:r>
+          </a:p>
+          <a:p>
+            <a:endParaRPr lang="en-US" sz="1600" dirty="0">
+              <a:solidFill>
+                <a:schemeClr val="tx1"/>
+              </a:solidFill>
+            </a:endParaRPr>
+          </a:p>
+          <a:p>
+            <a:r>
+              <a:rPr lang="en-US" sz="1600" dirty="0">
+                <a:solidFill>
+                  <a:schemeClr val="tx1"/>
+                </a:solidFill>
+              </a:rPr>
+              <a:t>Career Fairs contribute only ~14% overall and have underperformed post-COVID, particularly in Asia-Pacific.</a:t>
+            </a:r>
+          </a:p>
+          <a:p>
+            <a:endParaRPr lang="en-US" sz="1600" dirty="0">
+              <a:solidFill>
+                <a:schemeClr val="tx1"/>
+              </a:solidFill>
+            </a:endParaRPr>
+          </a:p>
+        </p:txBody>
+      </p:sp>
+    </p:spTree>
+    <p:extLst>
+      <p:ext uri="{BB962C8B-B14F-4D97-AF65-F5344CB8AC3E}">
+        <p14:creationId xmlns:p14="http://schemas.microsoft.com/office/powerpoint/2010/main" val="3286308728"/>
+      </p:ext>
+    </p:extLst>
+  </p:cSld>
+  <p:clrMapOvr>
+    <a:masterClrMapping/>
+  </p:clrMapOvr>
+</p:sld>
+</file>
+
+<file path=ppt/slides/slide3.xml><?xml version="1.0" encoding="utf-8"?>
+<p:sld xmlns:a="http://schemas.openxmlformats.org/drawingml/2006/main" xmlns:r="http://schemas.openxmlformats.org/officeDocument/2006/relationships" xmlns:p="http://schemas.openxmlformats.org/presentationml/2006/main">
+  <p:cSld>
+    <p:spTree>
+      <p:nvGrpSpPr>
+        <p:cNvPr id="1" name="">
+          <a:extLst>
+            <a:ext uri="{FF2B5EF4-FFF2-40B4-BE49-F238E27FC236}">
+              <a16:creationId xmlns:a16="http://schemas.microsoft.com/office/drawing/2014/main" id="{EF4025F0-84A4-F601-ADBC-F845FC9BA88B}"/>
+            </a:ext>
+          </a:extLst>
+        </p:cNvPr>
+        <p:cNvGrpSpPr/>
+        <p:nvPr/>
+      </p:nvGrpSpPr>
+      <p:grpSpPr>
+        <a:xfrm>
+          <a:off x="0" y="0"/>
+          <a:ext cx="0" cy="0"/>
+          <a:chOff x="0" y="0"/>
+          <a:chExt cx="0" cy="0"/>
+        </a:xfrm>
+      </p:grpSpPr>
+      <p:sp>
+        <p:nvSpPr>
+          <p:cNvPr id="5" name="TextBox 4">
+            <a:extLst>
+              <a:ext uri="{FF2B5EF4-FFF2-40B4-BE49-F238E27FC236}">
+                <a16:creationId xmlns:a16="http://schemas.microsoft.com/office/drawing/2014/main" id="{9011B38F-9672-302A-8817-64477707B654}"/>
+              </a:ext>
+            </a:extLst>
+          </p:cNvPr>
+          <p:cNvSpPr txBox="1"/>
+          <p:nvPr/>
+        </p:nvSpPr>
+        <p:spPr>
+          <a:xfrm>
+            <a:off x="370629" y="1762245"/>
+            <a:ext cx="4011998" cy="4247317"/>
           </a:xfrm>
           <a:prstGeom prst="rect">
             <a:avLst/>
@@ -3909,7 +7358,82 @@
           <a:p>
             <a:r>
               <a:rPr lang="en-US" dirty="0"/>
-              <a:t>Implication: Retention strategies must focus on SDV-critical roles and growth pathways.</a:t>
+              <a:t>Hiring-to-Attrition Ratio</a:t>
+            </a:r>
+          </a:p>
+          <a:p>
+            <a:pPr marL="285750" indent="-285750">
+              <a:buFont typeface="Arial" panose="020B0604020202020204" pitchFamily="34" charset="0"/>
+              <a:buChar char="•"/>
+            </a:pPr>
+            <a:r>
+              <a:rPr lang="en-US" dirty="0"/>
+              <a:t>Attrition stands at 26% over 5.5 years — well above the 15% company target.</a:t>
+            </a:r>
+          </a:p>
+          <a:p>
+            <a:pPr marL="285750" indent="-285750">
+              <a:buFont typeface="Arial" panose="020B0604020202020204" pitchFamily="34" charset="0"/>
+              <a:buChar char="•"/>
+            </a:pPr>
+            <a:r>
+              <a:rPr lang="en-US" dirty="0"/>
+              <a:t>Attrition is highest in NA (30%), lowest in APAC (22%), with EU in between (25%).</a:t>
+            </a:r>
+          </a:p>
+          <a:p>
+            <a:pPr marL="285750" indent="-285750">
+              <a:buFont typeface="Arial" panose="020B0604020202020204" pitchFamily="34" charset="0"/>
+              <a:buChar char="•"/>
+            </a:pPr>
+            <a:r>
+              <a:rPr lang="en-US" dirty="0"/>
+              <a:t>High attrition is seen in Embedded Systems, Cloud Engineering, and Infotainment, mainly driven by lack of growth opportunities, better external offers, and personal reasons.</a:t>
+            </a:r>
+          </a:p>
+          <a:p>
+            <a:pPr marL="285750" indent="-285750">
+              <a:buFont typeface="Arial" panose="020B0604020202020204" pitchFamily="34" charset="0"/>
+              <a:buChar char="•"/>
+            </a:pPr>
+            <a:r>
+              <a:rPr lang="en-US" dirty="0"/>
+              <a:t>&gt;50% of Attrition were in an onsite work arrangement followed by remote (40) and hybrid (25) </a:t>
+            </a:r>
+          </a:p>
+        </p:txBody>
+      </p:sp>
+      <p:sp>
+        <p:nvSpPr>
+          <p:cNvPr id="8" name="Title 1">
+            <a:extLst>
+              <a:ext uri="{FF2B5EF4-FFF2-40B4-BE49-F238E27FC236}">
+                <a16:creationId xmlns:a16="http://schemas.microsoft.com/office/drawing/2014/main" id="{B5A88092-72A2-35D8-D71D-60533FC70697}"/>
+              </a:ext>
+            </a:extLst>
+          </p:cNvPr>
+          <p:cNvSpPr>
+            <a:spLocks noGrp="1"/>
+          </p:cNvSpPr>
+          <p:nvPr>
+            <p:ph type="title"/>
+          </p:nvPr>
+        </p:nvSpPr>
+        <p:spPr>
+          <a:xfrm>
+            <a:off x="457200" y="274638"/>
+            <a:ext cx="8229600" cy="650583"/>
+          </a:xfrm>
+        </p:spPr>
+        <p:txBody>
+          <a:bodyPr>
+            <a:noAutofit/>
+          </a:bodyPr>
+          <a:lstStyle/>
+          <a:p>
+            <a:r>
+              <a:rPr lang="en-US" sz="2400" dirty="0"/>
+              <a:t>Attrition is at a critical high across regions and departments resulting in a shrinking work force globally</a:t>
             </a:r>
           </a:p>
         </p:txBody>
@@ -3919,7 +7443,7 @@
           <p:cNvPr id="11" name="Rectangle 10">
             <a:extLst>
               <a:ext uri="{FF2B5EF4-FFF2-40B4-BE49-F238E27FC236}">
-                <a16:creationId xmlns:a16="http://schemas.microsoft.com/office/drawing/2014/main" id="{0C70A0E0-4940-0E12-3B83-AE6DCED964D3}"/>
+                <a16:creationId xmlns:a16="http://schemas.microsoft.com/office/drawing/2014/main" id="{55DBBD23-7062-090F-AD79-15F0AA929900}"/>
               </a:ext>
             </a:extLst>
           </p:cNvPr>
@@ -3928,7 +7452,7 @@
         </p:nvSpPr>
         <p:spPr>
           <a:xfrm>
-            <a:off x="5232099" y="1165443"/>
+            <a:off x="5269973" y="1533367"/>
             <a:ext cx="3598083" cy="4290646"/>
           </a:xfrm>
           <a:prstGeom prst="rect">
@@ -3961,42 +7485,12 @@
           </a:p>
         </p:txBody>
       </p:sp>
-    </p:spTree>
-    <p:extLst>
-      <p:ext uri="{BB962C8B-B14F-4D97-AF65-F5344CB8AC3E}">
-        <p14:creationId xmlns:p14="http://schemas.microsoft.com/office/powerpoint/2010/main" val="3286308728"/>
-      </p:ext>
-    </p:extLst>
-  </p:cSld>
-  <p:clrMapOvr>
-    <a:masterClrMapping/>
-  </p:clrMapOvr>
-</p:sld>
-</file>
-
-<file path=ppt/slides/slide3.xml><?xml version="1.0" encoding="utf-8"?>
-<p:sld xmlns:a="http://schemas.openxmlformats.org/drawingml/2006/main" xmlns:r="http://schemas.openxmlformats.org/officeDocument/2006/relationships" xmlns:p="http://schemas.openxmlformats.org/presentationml/2006/main">
-  <p:cSld>
-    <p:spTree>
-      <p:nvGrpSpPr>
-        <p:cNvPr id="1" name=""/>
-        <p:cNvGrpSpPr/>
-        <p:nvPr/>
-      </p:nvGrpSpPr>
-      <p:grpSpPr>
-        <a:xfrm>
-          <a:off x="0" y="0"/>
-          <a:ext cx="0" cy="0"/>
-          <a:chOff x="0" y="0"/>
-          <a:chExt cx="0" cy="0"/>
-        </a:xfrm>
-      </p:grpSpPr>
-      <p:sp>
-        <p:nvSpPr>
-          <p:cNvPr id="5" name="TextBox 4">
+      <p:sp>
+        <p:nvSpPr>
+          <p:cNvPr id="2" name="TextBox 1">
             <a:extLst>
               <a:ext uri="{FF2B5EF4-FFF2-40B4-BE49-F238E27FC236}">
-                <a16:creationId xmlns:a16="http://schemas.microsoft.com/office/drawing/2014/main" id="{1BBE0C15-9137-D29B-D9A5-ED2F0129CA95}"/>
+                <a16:creationId xmlns:a16="http://schemas.microsoft.com/office/drawing/2014/main" id="{650CA5C4-95AD-DCB1-BA08-36BEFD96B0A8}"/>
               </a:ext>
             </a:extLst>
           </p:cNvPr>
@@ -4005,13 +7499,20 @@
         </p:nvSpPr>
         <p:spPr>
           <a:xfrm>
-            <a:off x="457200" y="1614045"/>
-            <a:ext cx="4572000" cy="2862322"/>
+            <a:off x="381450" y="6139771"/>
+            <a:ext cx="8563126" cy="584775"/>
           </a:xfrm>
           <a:prstGeom prst="rect">
             <a:avLst/>
           </a:prstGeom>
           <a:noFill/>
+          <a:ln w="12700">
+            <a:solidFill>
+              <a:schemeClr val="tx2">
+                <a:lumMod val="75000"/>
+              </a:schemeClr>
+            </a:solidFill>
+          </a:ln>
         </p:spPr>
         <p:txBody>
           <a:bodyPr wrap="square">
@@ -4020,155 +7521,8 @@
           <a:lstStyle/>
           <a:p>
             <a:r>
-              <a:rPr lang="en-US" dirty="0"/>
-              <a:t>4️⃣ Hiring Channel Effectiveness</a:t>
-            </a:r>
-          </a:p>
-          <a:p>
-            <a:pPr marL="285750" indent="-285750">
-              <a:buFont typeface="Arial" panose="020B0604020202020204" pitchFamily="34" charset="0"/>
-              <a:buChar char="•"/>
-            </a:pPr>
-            <a:r>
-              <a:rPr lang="en-US" dirty="0"/>
-              <a:t>LinkedIn drives ~40% of all hires, with Recruiters contributing ~27% and the Referral Program ~20%.</a:t>
-            </a:r>
-          </a:p>
-          <a:p>
-            <a:pPr marL="285750" indent="-285750">
-              <a:buFont typeface="Arial" panose="020B0604020202020204" pitchFamily="34" charset="0"/>
-              <a:buChar char="•"/>
-            </a:pPr>
-            <a:r>
-              <a:rPr lang="en-US" dirty="0"/>
-              <a:t>Career Fairs contribute only ~14% overall and have underperformed post-COVID, particularly in Asia-Pacific.</a:t>
-            </a:r>
-          </a:p>
-          <a:p>
-            <a:pPr marL="285750" indent="-285750">
-              <a:buFont typeface="Arial" panose="020B0604020202020204" pitchFamily="34" charset="0"/>
-              <a:buChar char="•"/>
-            </a:pPr>
-            <a:r>
-              <a:rPr lang="en-US" dirty="0"/>
-              <a:t>Preliminary analysis suggests opportunities to improve channel ROI by strengthening digital sourcing and referrals.</a:t>
-            </a:r>
-          </a:p>
-        </p:txBody>
-      </p:sp>
-      <p:sp>
-        <p:nvSpPr>
-          <p:cNvPr id="8" name="Title 1">
-            <a:extLst>
-              <a:ext uri="{FF2B5EF4-FFF2-40B4-BE49-F238E27FC236}">
-                <a16:creationId xmlns:a16="http://schemas.microsoft.com/office/drawing/2014/main" id="{E172482D-06C9-7E59-1A6D-E2AE356FD66F}"/>
-              </a:ext>
-            </a:extLst>
-          </p:cNvPr>
-          <p:cNvSpPr>
-            <a:spLocks noGrp="1"/>
-          </p:cNvSpPr>
-          <p:nvPr>
-            <p:ph type="title"/>
-          </p:nvPr>
-        </p:nvSpPr>
-        <p:spPr>
-          <a:xfrm>
-            <a:off x="457200" y="274638"/>
-            <a:ext cx="8229600" cy="650583"/>
-          </a:xfrm>
-        </p:spPr>
-        <p:txBody>
-          <a:bodyPr>
-            <a:noAutofit/>
-          </a:bodyPr>
-          <a:lstStyle/>
-          <a:p>
-            <a:r>
-              <a:rPr lang="en-US" sz="3600" dirty="0"/>
-              <a:t>SDV Talent Gap Analysis (2/4)</a:t>
-            </a:r>
-          </a:p>
-        </p:txBody>
-      </p:sp>
-      <p:sp>
-        <p:nvSpPr>
-          <p:cNvPr id="10" name="TextBox 9">
-            <a:extLst>
-              <a:ext uri="{FF2B5EF4-FFF2-40B4-BE49-F238E27FC236}">
-                <a16:creationId xmlns:a16="http://schemas.microsoft.com/office/drawing/2014/main" id="{C6FAD5AF-FDF1-CF8B-572A-67A254DBD21B}"/>
-              </a:ext>
-            </a:extLst>
-          </p:cNvPr>
-          <p:cNvSpPr txBox="1"/>
-          <p:nvPr/>
-        </p:nvSpPr>
-        <p:spPr>
-          <a:xfrm>
-            <a:off x="457199" y="5660032"/>
-            <a:ext cx="8313465" cy="646331"/>
-          </a:xfrm>
-          <a:prstGeom prst="rect">
-            <a:avLst/>
-          </a:prstGeom>
-          <a:noFill/>
-        </p:spPr>
-        <p:txBody>
-          <a:bodyPr wrap="square">
-            <a:spAutoFit/>
-          </a:bodyPr>
-          <a:lstStyle/>
-          <a:p>
-            <a:r>
-              <a:rPr lang="en-US" dirty="0"/>
-              <a:t>Implication: Reallocate budget and effort to high-yield channels and optimize underperforming sources.</a:t>
-            </a:r>
-          </a:p>
-        </p:txBody>
-      </p:sp>
-      <p:sp>
-        <p:nvSpPr>
-          <p:cNvPr id="11" name="Rectangle 10">
-            <a:extLst>
-              <a:ext uri="{FF2B5EF4-FFF2-40B4-BE49-F238E27FC236}">
-                <a16:creationId xmlns:a16="http://schemas.microsoft.com/office/drawing/2014/main" id="{8AB3CFE1-27A8-36AA-8985-D68148651910}"/>
-              </a:ext>
-            </a:extLst>
-          </p:cNvPr>
-          <p:cNvSpPr/>
-          <p:nvPr/>
-        </p:nvSpPr>
-        <p:spPr>
-          <a:xfrm>
-            <a:off x="5232099" y="1165443"/>
-            <a:ext cx="3598083" cy="4290646"/>
-          </a:xfrm>
-          <a:prstGeom prst="rect">
-            <a:avLst/>
-          </a:prstGeom>
-        </p:spPr>
-        <p:style>
-          <a:lnRef idx="1">
-            <a:schemeClr val="accent1"/>
-          </a:lnRef>
-          <a:fillRef idx="3">
-            <a:schemeClr val="accent1"/>
-          </a:fillRef>
-          <a:effectRef idx="2">
-            <a:schemeClr val="accent1"/>
-          </a:effectRef>
-          <a:fontRef idx="minor">
-            <a:schemeClr val="lt1"/>
-          </a:fontRef>
-        </p:style>
-        <p:txBody>
-          <a:bodyPr rtlCol="0" anchor="ctr"/>
-          <a:lstStyle/>
-          <a:p>
-            <a:pPr algn="ctr"/>
-            <a:r>
-              <a:rPr lang="en-US" dirty="0"/>
-              <a:t>Chart</a:t>
+              <a:rPr lang="en-US" sz="1600" dirty="0"/>
+              <a:t>Implication: Scenario plan for proactive hiring once market conditions stabilize to close emerging talent gaps.</a:t>
             </a:r>
           </a:p>
         </p:txBody>
@@ -4176,7 +7530,7 @@
     </p:spTree>
     <p:extLst>
       <p:ext uri="{BB962C8B-B14F-4D97-AF65-F5344CB8AC3E}">
-        <p14:creationId xmlns:p14="http://schemas.microsoft.com/office/powerpoint/2010/main" val="2573616461"/>
+        <p14:creationId xmlns:p14="http://schemas.microsoft.com/office/powerpoint/2010/main" val="203345415"/>
       </p:ext>
     </p:extLst>
   </p:cSld>
@@ -4208,7 +7562,7 @@
           <p:cNvPr id="5" name="TextBox 4">
             <a:extLst>
               <a:ext uri="{FF2B5EF4-FFF2-40B4-BE49-F238E27FC236}">
-                <a16:creationId xmlns:a16="http://schemas.microsoft.com/office/drawing/2014/main" id="{A338DE63-17E2-4F9D-5DAD-71F4933850F0}"/>
+                <a16:creationId xmlns:a16="http://schemas.microsoft.com/office/drawing/2014/main" id="{28EFEA92-B0BC-F21F-25FF-D348C079300A}"/>
               </a:ext>
             </a:extLst>
           </p:cNvPr>
@@ -4217,8 +7571,8 @@
         </p:nvSpPr>
         <p:spPr>
           <a:xfrm>
-            <a:off x="370629" y="1762245"/>
-            <a:ext cx="4011998" cy="2585323"/>
+            <a:off x="427441" y="1799064"/>
+            <a:ext cx="4572000" cy="2862322"/>
           </a:xfrm>
           <a:prstGeom prst="rect">
             <a:avLst/>
@@ -4233,7 +7587,7 @@
           <a:p>
             <a:r>
               <a:rPr lang="en-US" dirty="0"/>
-              <a:t>3️⃣ Hiring-to-Attrition Ratio</a:t>
+              <a:t>2️⃣ Upskilling &amp; Training Effectiveness</a:t>
             </a:r>
           </a:p>
           <a:p>
@@ -4243,7 +7597,7 @@
             </a:pPr>
             <a:r>
               <a:rPr lang="en-US" dirty="0"/>
-              <a:t>Current hiring levels do not sufficiently offset attrition in key roles.</a:t>
+              <a:t>65% of employees have completed or are in progress with upskilling programs.</a:t>
             </a:r>
           </a:p>
           <a:p>
@@ -4253,7 +7607,17 @@
             </a:pPr>
             <a:r>
               <a:rPr lang="en-US" dirty="0"/>
-              <a:t>The hiring-to-attrition ratio has worsened due to the 2023 hiring freeze, creating risks of critical talent shortfalls in SDV development functions.</a:t>
+              <a:t>However, current tracking does not confirm if newly acquired skills match SDV-critical needs.</a:t>
+            </a:r>
+          </a:p>
+          <a:p>
+            <a:pPr marL="285750" indent="-285750">
+              <a:buFont typeface="Arial" panose="020B0604020202020204" pitchFamily="34" charset="0"/>
+              <a:buChar char="•"/>
+            </a:pPr>
+            <a:r>
+              <a:rPr lang="en-US" dirty="0"/>
+              <a:t>Next step: A deeper fit-gap analysis with the skills database is required to measure upskilling ROI and coverage of critical skill areas.</a:t>
             </a:r>
           </a:p>
         </p:txBody>
@@ -4263,67 +7627,48 @@
           <p:cNvPr id="8" name="Title 1">
             <a:extLst>
               <a:ext uri="{FF2B5EF4-FFF2-40B4-BE49-F238E27FC236}">
-                <a16:creationId xmlns:a16="http://schemas.microsoft.com/office/drawing/2014/main" id="{AF40D974-DB05-67C2-8239-83266E465C76}"/>
+                <a16:creationId xmlns:a16="http://schemas.microsoft.com/office/drawing/2014/main" id="{7F5074A6-FF71-1B0F-A4E5-870F98D997B1}"/>
               </a:ext>
             </a:extLst>
           </p:cNvPr>
-          <p:cNvSpPr>
-            <a:spLocks noGrp="1"/>
+          <p:cNvSpPr txBox="1">
+            <a:spLocks/>
           </p:cNvSpPr>
-          <p:nvPr>
-            <p:ph type="title"/>
-          </p:nvPr>
+          <p:nvPr/>
         </p:nvSpPr>
         <p:spPr>
           <a:xfrm>
             <a:off x="457200" y="274638"/>
             <a:ext cx="8229600" cy="650583"/>
           </a:xfrm>
-        </p:spPr>
-        <p:txBody>
-          <a:bodyPr>
-            <a:noAutofit/>
-          </a:bodyPr>
-          <a:lstStyle/>
-          <a:p>
-            <a:r>
-              <a:rPr lang="en-US" sz="3600" dirty="0"/>
-              <a:t>SDV Talent Gap Analysis (3/4)</a:t>
-            </a:r>
-          </a:p>
-        </p:txBody>
-      </p:sp>
-      <p:sp>
-        <p:nvSpPr>
-          <p:cNvPr id="10" name="TextBox 9">
-            <a:extLst>
-              <a:ext uri="{FF2B5EF4-FFF2-40B4-BE49-F238E27FC236}">
-                <a16:creationId xmlns:a16="http://schemas.microsoft.com/office/drawing/2014/main" id="{12EE5DB4-4DC3-6BD1-DCE6-11AA9E222A58}"/>
-              </a:ext>
-            </a:extLst>
-          </p:cNvPr>
-          <p:cNvSpPr txBox="1"/>
-          <p:nvPr/>
-        </p:nvSpPr>
-        <p:spPr>
-          <a:xfrm>
-            <a:off x="457200" y="5937031"/>
-            <a:ext cx="8229600" cy="646331"/>
-          </a:xfrm>
           <a:prstGeom prst="rect">
             <a:avLst/>
           </a:prstGeom>
-          <a:noFill/>
         </p:spPr>
         <p:txBody>
-          <a:bodyPr wrap="square">
-            <a:spAutoFit/>
+          <a:bodyPr vert="horz" lIns="91440" tIns="45720" rIns="91440" bIns="45720" rtlCol="0" anchor="ctr">
+            <a:noAutofit/>
           </a:bodyPr>
-          <a:lstStyle/>
-          <a:p>
-            <a:r>
-              <a:rPr lang="en-US" dirty="0"/>
-              <a:t>Implication: Scenario plan for proactive hiring once market conditions stabilize to close emerging talent gaps.</a:t>
+          <a:lstStyle>
+            <a:lvl1pPr algn="ctr" defTabSz="457200" rtl="0" eaLnBrk="1" latinLnBrk="0" hangingPunct="1">
+              <a:spcBef>
+                <a:spcPct val="0"/>
+              </a:spcBef>
+              <a:buNone/>
+              <a:defRPr sz="4400" kern="1200">
+                <a:solidFill>
+                  <a:schemeClr val="tx1"/>
+                </a:solidFill>
+                <a:latin typeface="+mj-lt"/>
+                <a:ea typeface="+mj-ea"/>
+                <a:cs typeface="+mj-cs"/>
+              </a:defRPr>
+            </a:lvl1pPr>
+          </a:lstStyle>
+          <a:p>
+            <a:r>
+              <a:rPr lang="en-US" sz="2400" dirty="0"/>
+              <a:t>Re- &amp; upskilling programs are utilized by the majority however it remains unclear the skills match the gap</a:t>
             </a:r>
           </a:p>
         </p:txBody>
@@ -4333,7 +7678,7 @@
           <p:cNvPr id="11" name="Rectangle 10">
             <a:extLst>
               <a:ext uri="{FF2B5EF4-FFF2-40B4-BE49-F238E27FC236}">
-                <a16:creationId xmlns:a16="http://schemas.microsoft.com/office/drawing/2014/main" id="{515801C6-872E-67CE-03B9-F0F37BBD7B35}"/>
+                <a16:creationId xmlns:a16="http://schemas.microsoft.com/office/drawing/2014/main" id="{3AB01521-C2C7-C364-44F3-84C048872A45}"/>
               </a:ext>
             </a:extLst>
           </p:cNvPr>
@@ -4375,10 +7720,52 @@
           </a:p>
         </p:txBody>
       </p:sp>
+      <p:sp>
+        <p:nvSpPr>
+          <p:cNvPr id="2" name="TextBox 1">
+            <a:extLst>
+              <a:ext uri="{FF2B5EF4-FFF2-40B4-BE49-F238E27FC236}">
+                <a16:creationId xmlns:a16="http://schemas.microsoft.com/office/drawing/2014/main" id="{9C3E8682-77BA-3E08-CE08-E46B6C4C0E75}"/>
+              </a:ext>
+            </a:extLst>
+          </p:cNvPr>
+          <p:cNvSpPr txBox="1"/>
+          <p:nvPr/>
+        </p:nvSpPr>
+        <p:spPr>
+          <a:xfrm>
+            <a:off x="381450" y="6331743"/>
+            <a:ext cx="8563126" cy="338554"/>
+          </a:xfrm>
+          <a:prstGeom prst="rect">
+            <a:avLst/>
+          </a:prstGeom>
+          <a:noFill/>
+          <a:ln w="12700">
+            <a:solidFill>
+              <a:schemeClr val="tx2">
+                <a:lumMod val="75000"/>
+              </a:schemeClr>
+            </a:solidFill>
+          </a:ln>
+        </p:spPr>
+        <p:txBody>
+          <a:bodyPr wrap="square">
+            <a:spAutoFit/>
+          </a:bodyPr>
+          <a:lstStyle/>
+          <a:p>
+            <a:r>
+              <a:rPr lang="en-US" sz="1600" dirty="0"/>
+              <a:t>Implication: Align upskilling investments with actual SDV skill gaps and role requirements.</a:t>
+            </a:r>
+          </a:p>
+        </p:txBody>
+      </p:sp>
     </p:spTree>
     <p:extLst>
       <p:ext uri="{BB962C8B-B14F-4D97-AF65-F5344CB8AC3E}">
-        <p14:creationId xmlns:p14="http://schemas.microsoft.com/office/powerpoint/2010/main" val="1481763465"/>
+        <p14:creationId xmlns:p14="http://schemas.microsoft.com/office/powerpoint/2010/main" val="4119011201"/>
       </p:ext>
     </p:extLst>
   </p:cSld>
@@ -4410,7 +7797,7 @@
           <p:cNvPr id="5" name="TextBox 4">
             <a:extLst>
               <a:ext uri="{FF2B5EF4-FFF2-40B4-BE49-F238E27FC236}">
-                <a16:creationId xmlns:a16="http://schemas.microsoft.com/office/drawing/2014/main" id="{28EFEA92-B0BC-F21F-25FF-D348C079300A}"/>
+                <a16:creationId xmlns:a16="http://schemas.microsoft.com/office/drawing/2014/main" id="{A338DE63-17E2-4F9D-5DAD-71F4933850F0}"/>
               </a:ext>
             </a:extLst>
           </p:cNvPr>
@@ -4419,8 +7806,8 @@
         </p:nvSpPr>
         <p:spPr>
           <a:xfrm>
-            <a:off x="427441" y="1799064"/>
-            <a:ext cx="4572000" cy="2862322"/>
+            <a:off x="370629" y="1762245"/>
+            <a:ext cx="4011998" cy="2585323"/>
           </a:xfrm>
           <a:prstGeom prst="rect">
             <a:avLst/>
@@ -4435,7 +7822,7 @@
           <a:p>
             <a:r>
               <a:rPr lang="en-US" dirty="0"/>
-              <a:t>2️⃣ Upskilling &amp; Training Effectiveness</a:t>
+              <a:t>3️⃣ Hiring-to-Attrition Ratio</a:t>
             </a:r>
           </a:p>
           <a:p>
@@ -4445,7 +7832,7 @@
             </a:pPr>
             <a:r>
               <a:rPr lang="en-US" dirty="0"/>
-              <a:t>65% of employees have completed or are in progress with upskilling programs.</a:t>
+              <a:t>Current hiring levels do not sufficiently offset attrition in key roles.</a:t>
             </a:r>
           </a:p>
           <a:p>
@@ -4455,17 +7842,7 @@
             </a:pPr>
             <a:r>
               <a:rPr lang="en-US" dirty="0"/>
-              <a:t>However, current tracking does not confirm if newly acquired skills match SDV-critical needs.</a:t>
-            </a:r>
-          </a:p>
-          <a:p>
-            <a:pPr marL="285750" indent="-285750">
-              <a:buFont typeface="Arial" panose="020B0604020202020204" pitchFamily="34" charset="0"/>
-              <a:buChar char="•"/>
-            </a:pPr>
-            <a:r>
-              <a:rPr lang="en-US" dirty="0"/>
-              <a:t>Next step: A deeper fit-gap analysis with the skills database is required to measure upskilling ROI and coverage of critical skill areas.</a:t>
+              <a:t>The hiring-to-attrition ratio has worsened due to the 2023 hiring freeze, creating risks of critical talent shortfalls in SDV development functions.</a:t>
             </a:r>
           </a:p>
         </p:txBody>
@@ -4475,48 +7852,32 @@
           <p:cNvPr id="8" name="Title 1">
             <a:extLst>
               <a:ext uri="{FF2B5EF4-FFF2-40B4-BE49-F238E27FC236}">
-                <a16:creationId xmlns:a16="http://schemas.microsoft.com/office/drawing/2014/main" id="{7F5074A6-FF71-1B0F-A4E5-870F98D997B1}"/>
+                <a16:creationId xmlns:a16="http://schemas.microsoft.com/office/drawing/2014/main" id="{AF40D974-DB05-67C2-8239-83266E465C76}"/>
               </a:ext>
             </a:extLst>
           </p:cNvPr>
-          <p:cNvSpPr txBox="1">
-            <a:spLocks/>
+          <p:cNvSpPr>
+            <a:spLocks noGrp="1"/>
           </p:cNvSpPr>
-          <p:nvPr/>
+          <p:nvPr>
+            <p:ph type="title"/>
+          </p:nvPr>
         </p:nvSpPr>
         <p:spPr>
           <a:xfrm>
             <a:off x="457200" y="274638"/>
             <a:ext cx="8229600" cy="650583"/>
           </a:xfrm>
-          <a:prstGeom prst="rect">
-            <a:avLst/>
-          </a:prstGeom>
         </p:spPr>
         <p:txBody>
-          <a:bodyPr vert="horz" lIns="91440" tIns="45720" rIns="91440" bIns="45720" rtlCol="0" anchor="ctr">
+          <a:bodyPr>
             <a:noAutofit/>
           </a:bodyPr>
-          <a:lstStyle>
-            <a:lvl1pPr algn="ctr" defTabSz="457200" rtl="0" eaLnBrk="1" latinLnBrk="0" hangingPunct="1">
-              <a:spcBef>
-                <a:spcPct val="0"/>
-              </a:spcBef>
-              <a:buNone/>
-              <a:defRPr sz="4400" kern="1200">
-                <a:solidFill>
-                  <a:schemeClr val="tx1"/>
-                </a:solidFill>
-                <a:latin typeface="+mj-lt"/>
-                <a:ea typeface="+mj-ea"/>
-                <a:cs typeface="+mj-cs"/>
-              </a:defRPr>
-            </a:lvl1pPr>
-          </a:lstStyle>
+          <a:lstStyle/>
           <a:p>
             <a:r>
               <a:rPr lang="en-US" sz="3600" dirty="0"/>
-              <a:t>SDV Talent Gap Analysis (4/4)</a:t>
+              <a:t>SDV Talent Gap Analysis (3/4)</a:t>
             </a:r>
           </a:p>
         </p:txBody>
@@ -4526,7 +7887,7 @@
           <p:cNvPr id="10" name="TextBox 9">
             <a:extLst>
               <a:ext uri="{FF2B5EF4-FFF2-40B4-BE49-F238E27FC236}">
-                <a16:creationId xmlns:a16="http://schemas.microsoft.com/office/drawing/2014/main" id="{119030DC-76EF-05EC-1B1F-D71D735774CF}"/>
+                <a16:creationId xmlns:a16="http://schemas.microsoft.com/office/drawing/2014/main" id="{12EE5DB4-4DC3-6BD1-DCE6-11AA9E222A58}"/>
               </a:ext>
             </a:extLst>
           </p:cNvPr>
@@ -4535,8 +7896,8 @@
         </p:nvSpPr>
         <p:spPr>
           <a:xfrm>
-            <a:off x="457199" y="5937031"/>
-            <a:ext cx="8410857" cy="646331"/>
+            <a:off x="457200" y="5937031"/>
+            <a:ext cx="8229600" cy="646331"/>
           </a:xfrm>
           <a:prstGeom prst="rect">
             <a:avLst/>
@@ -4551,7 +7912,7 @@
           <a:p>
             <a:r>
               <a:rPr lang="en-US" dirty="0"/>
-              <a:t>Implication: Align upskilling investments with actual SDV skill gaps and role requirements.</a:t>
+              <a:t>Implication: Scenario plan for proactive hiring once market conditions stabilize to close emerging talent gaps.</a:t>
             </a:r>
           </a:p>
         </p:txBody>
@@ -4561,7 +7922,7 @@
           <p:cNvPr id="11" name="Rectangle 10">
             <a:extLst>
               <a:ext uri="{FF2B5EF4-FFF2-40B4-BE49-F238E27FC236}">
-                <a16:creationId xmlns:a16="http://schemas.microsoft.com/office/drawing/2014/main" id="{3AB01521-C2C7-C364-44F3-84C048872A45}"/>
+                <a16:creationId xmlns:a16="http://schemas.microsoft.com/office/drawing/2014/main" id="{515801C6-872E-67CE-03B9-F0F37BBD7B35}"/>
               </a:ext>
             </a:extLst>
           </p:cNvPr>
@@ -4606,7 +7967,7 @@
     </p:spTree>
     <p:extLst>
       <p:ext uri="{BB962C8B-B14F-4D97-AF65-F5344CB8AC3E}">
-        <p14:creationId xmlns:p14="http://schemas.microsoft.com/office/powerpoint/2010/main" val="4119011201"/>
+        <p14:creationId xmlns:p14="http://schemas.microsoft.com/office/powerpoint/2010/main" val="1481763465"/>
       </p:ext>
     </p:extLst>
   </p:cSld>

</xml_diff>

<commit_message>
further updates on Slide 2-4; added some charts to excel
</commit_message>
<xml_diff>
--- a/SDV_Talent_Report.pptx
+++ b/SDV_Talent_Report.pptx
@@ -8,17 +8,18 @@
     <p:sldId id="257" r:id="rId2"/>
     <p:sldId id="258" r:id="rId3"/>
     <p:sldId id="262" r:id="rId4"/>
-    <p:sldId id="259" r:id="rId5"/>
-    <p:sldId id="260" r:id="rId6"/>
+    <p:sldId id="263" r:id="rId5"/>
+    <p:sldId id="259" r:id="rId6"/>
+    <p:sldId id="260" r:id="rId7"/>
   </p:sldIdLst>
-  <p:sldSz cx="9144000" cy="6858000" type="screen4x3"/>
+  <p:sldSz cx="9144000" cy="5143500" type="screen16x9"/>
   <p:notesSz cx="6858000" cy="9144000"/>
   <p:defaultTextStyle>
     <a:defPPr>
       <a:defRPr lang="en-US"/>
     </a:defPPr>
-    <a:lvl1pPr marL="0" algn="l" defTabSz="457200" rtl="0" eaLnBrk="1" latinLnBrk="0" hangingPunct="1">
-      <a:defRPr sz="1800" kern="1200">
+    <a:lvl1pPr marL="0" algn="l" defTabSz="342900" rtl="0" eaLnBrk="1" latinLnBrk="0" hangingPunct="1">
+      <a:defRPr sz="1350" kern="1200">
         <a:solidFill>
           <a:schemeClr val="tx1"/>
         </a:solidFill>
@@ -27,8 +28,8 @@
         <a:cs typeface="+mn-cs"/>
       </a:defRPr>
     </a:lvl1pPr>
-    <a:lvl2pPr marL="457200" algn="l" defTabSz="457200" rtl="0" eaLnBrk="1" latinLnBrk="0" hangingPunct="1">
-      <a:defRPr sz="1800" kern="1200">
+    <a:lvl2pPr marL="342900" algn="l" defTabSz="342900" rtl="0" eaLnBrk="1" latinLnBrk="0" hangingPunct="1">
+      <a:defRPr sz="1350" kern="1200">
         <a:solidFill>
           <a:schemeClr val="tx1"/>
         </a:solidFill>
@@ -37,8 +38,8 @@
         <a:cs typeface="+mn-cs"/>
       </a:defRPr>
     </a:lvl2pPr>
-    <a:lvl3pPr marL="914400" algn="l" defTabSz="457200" rtl="0" eaLnBrk="1" latinLnBrk="0" hangingPunct="1">
-      <a:defRPr sz="1800" kern="1200">
+    <a:lvl3pPr marL="685800" algn="l" defTabSz="342900" rtl="0" eaLnBrk="1" latinLnBrk="0" hangingPunct="1">
+      <a:defRPr sz="1350" kern="1200">
         <a:solidFill>
           <a:schemeClr val="tx1"/>
         </a:solidFill>
@@ -47,8 +48,8 @@
         <a:cs typeface="+mn-cs"/>
       </a:defRPr>
     </a:lvl3pPr>
-    <a:lvl4pPr marL="1371600" algn="l" defTabSz="457200" rtl="0" eaLnBrk="1" latinLnBrk="0" hangingPunct="1">
-      <a:defRPr sz="1800" kern="1200">
+    <a:lvl4pPr marL="1028700" algn="l" defTabSz="342900" rtl="0" eaLnBrk="1" latinLnBrk="0" hangingPunct="1">
+      <a:defRPr sz="1350" kern="1200">
         <a:solidFill>
           <a:schemeClr val="tx1"/>
         </a:solidFill>
@@ -57,8 +58,8 @@
         <a:cs typeface="+mn-cs"/>
       </a:defRPr>
     </a:lvl4pPr>
-    <a:lvl5pPr marL="1828800" algn="l" defTabSz="457200" rtl="0" eaLnBrk="1" latinLnBrk="0" hangingPunct="1">
-      <a:defRPr sz="1800" kern="1200">
+    <a:lvl5pPr marL="1371600" algn="l" defTabSz="342900" rtl="0" eaLnBrk="1" latinLnBrk="0" hangingPunct="1">
+      <a:defRPr sz="1350" kern="1200">
         <a:solidFill>
           <a:schemeClr val="tx1"/>
         </a:solidFill>
@@ -67,8 +68,8 @@
         <a:cs typeface="+mn-cs"/>
       </a:defRPr>
     </a:lvl5pPr>
-    <a:lvl6pPr marL="2286000" algn="l" defTabSz="457200" rtl="0" eaLnBrk="1" latinLnBrk="0" hangingPunct="1">
-      <a:defRPr sz="1800" kern="1200">
+    <a:lvl6pPr marL="1714500" algn="l" defTabSz="342900" rtl="0" eaLnBrk="1" latinLnBrk="0" hangingPunct="1">
+      <a:defRPr sz="1350" kern="1200">
         <a:solidFill>
           <a:schemeClr val="tx1"/>
         </a:solidFill>
@@ -77,8 +78,8 @@
         <a:cs typeface="+mn-cs"/>
       </a:defRPr>
     </a:lvl6pPr>
-    <a:lvl7pPr marL="2743200" algn="l" defTabSz="457200" rtl="0" eaLnBrk="1" latinLnBrk="0" hangingPunct="1">
-      <a:defRPr sz="1800" kern="1200">
+    <a:lvl7pPr marL="2057400" algn="l" defTabSz="342900" rtl="0" eaLnBrk="1" latinLnBrk="0" hangingPunct="1">
+      <a:defRPr sz="1350" kern="1200">
         <a:solidFill>
           <a:schemeClr val="tx1"/>
         </a:solidFill>
@@ -87,8 +88,8 @@
         <a:cs typeface="+mn-cs"/>
       </a:defRPr>
     </a:lvl7pPr>
-    <a:lvl8pPr marL="3200400" algn="l" defTabSz="457200" rtl="0" eaLnBrk="1" latinLnBrk="0" hangingPunct="1">
-      <a:defRPr sz="1800" kern="1200">
+    <a:lvl8pPr marL="2400300" algn="l" defTabSz="342900" rtl="0" eaLnBrk="1" latinLnBrk="0" hangingPunct="1">
+      <a:defRPr sz="1350" kern="1200">
         <a:solidFill>
           <a:schemeClr val="tx1"/>
         </a:solidFill>
@@ -97,8 +98,8 @@
         <a:cs typeface="+mn-cs"/>
       </a:defRPr>
     </a:lvl8pPr>
-    <a:lvl9pPr marL="3657600" algn="l" defTabSz="457200" rtl="0" eaLnBrk="1" latinLnBrk="0" hangingPunct="1">
-      <a:defRPr sz="1800" kern="1200">
+    <a:lvl9pPr marL="2743200" algn="l" defTabSz="342900" rtl="0" eaLnBrk="1" latinLnBrk="0" hangingPunct="1">
+      <a:defRPr sz="1350" kern="1200">
         <a:solidFill>
           <a:schemeClr val="tx1"/>
         </a:solidFill>
@@ -111,12 +112,12 @@
   <p:extLst>
     <p:ext uri="{EFAFB233-063F-42B5-8137-9DF3F51BA10A}">
       <p15:sldGuideLst xmlns:p15="http://schemas.microsoft.com/office/powerpoint/2012/main">
-        <p15:guide id="1" orient="horz" pos="2160">
+        <p15:guide id="1" orient="horz" pos="1620" userDrawn="1">
           <p15:clr>
             <a:srgbClr val="A4A3A4"/>
           </p15:clr>
         </p15:guide>
-        <p15:guide id="2" pos="2880">
+        <p15:guide id="2" pos="2880" userDrawn="1">
           <p15:clr>
             <a:srgbClr val="A4A3A4"/>
           </p15:clr>
@@ -1099,7 +1100,9 @@
           <c:spPr>
             <a:ln w="28575" cap="rnd">
               <a:solidFill>
-                <a:schemeClr val="accent1"/>
+                <a:schemeClr val="bg1">
+                  <a:lumMod val="50000"/>
+                </a:schemeClr>
               </a:solidFill>
               <a:round/>
             </a:ln>
@@ -1117,7 +1120,9 @@
             <c:spPr>
               <a:ln w="28575" cap="rnd">
                 <a:solidFill>
-                  <a:schemeClr val="accent1"/>
+                  <a:schemeClr val="bg1">
+                    <a:lumMod val="50000"/>
+                  </a:schemeClr>
                 </a:solidFill>
                 <a:round/>
               </a:ln>
@@ -1138,7 +1143,7 @@
             <c:spPr>
               <a:ln w="28575" cap="rnd">
                 <a:solidFill>
-                  <a:schemeClr val="accent1"/>
+                  <a:srgbClr val="4F81BD"/>
                 </a:solidFill>
                 <a:round/>
               </a:ln>
@@ -1776,6 +1781,27 @@
             <a:effectLst/>
           </c:spPr>
           <c:invertIfNegative val="0"/>
+          <c:dPt>
+            <c:idx val="0"/>
+            <c:invertIfNegative val="0"/>
+            <c:bubble3D val="0"/>
+            <c:spPr>
+              <a:solidFill>
+                <a:schemeClr val="bg1">
+                  <a:lumMod val="50000"/>
+                </a:schemeClr>
+              </a:solidFill>
+              <a:ln>
+                <a:noFill/>
+              </a:ln>
+              <a:effectLst/>
+            </c:spPr>
+            <c:extLst>
+              <c:ext xmlns:c16="http://schemas.microsoft.com/office/drawing/2014/chart" uri="{C3380CC4-5D6E-409C-BE32-E72D297353CC}">
+                <c16:uniqueId val="{00000000-3889-40E5-BEF8-008755560ACE}"/>
+              </c:ext>
+            </c:extLst>
+          </c:dPt>
           <c:cat>
             <c:strRef>
               <c:f>'Key_Question _4'!$A$129:$A$133</c:f>
@@ -1994,6 +2020,504 @@
 </c:chartSpace>
 </file>
 
+<file path=ppt/charts/chart3.xml><?xml version="1.0" encoding="utf-8"?>
+<c:chartSpace xmlns:c="http://schemas.openxmlformats.org/drawingml/2006/chart" xmlns:a="http://schemas.openxmlformats.org/drawingml/2006/main" xmlns:r="http://schemas.openxmlformats.org/officeDocument/2006/relationships" xmlns:c16r2="http://schemas.microsoft.com/office/drawing/2015/06/chart">
+  <c:date1904 val="0"/>
+  <c:lang val="en-US"/>
+  <c:roundedCorners val="0"/>
+  <mc:AlternateContent xmlns:mc="http://schemas.openxmlformats.org/markup-compatibility/2006">
+    <mc:Choice xmlns:c14="http://schemas.microsoft.com/office/drawing/2007/8/2/chart" Requires="c14">
+      <c14:style val="102"/>
+    </mc:Choice>
+    <mc:Fallback>
+      <c:style val="2"/>
+    </mc:Fallback>
+  </mc:AlternateContent>
+  <c:chart>
+    <c:title>
+      <c:tx>
+        <c:rich>
+          <a:bodyPr rot="0" spcFirstLastPara="1" vertOverflow="ellipsis" vert="horz" wrap="square" anchor="ctr" anchorCtr="1"/>
+          <a:lstStyle/>
+          <a:p>
+            <a:pPr>
+              <a:defRPr sz="1400" b="0" i="0" u="none" strike="noStrike" kern="1200" spc="0" baseline="0">
+                <a:solidFill>
+                  <a:schemeClr val="tx1">
+                    <a:lumMod val="65000"/>
+                    <a:lumOff val="35000"/>
+                  </a:schemeClr>
+                </a:solidFill>
+                <a:latin typeface="+mn-lt"/>
+                <a:ea typeface="+mn-ea"/>
+                <a:cs typeface="+mn-cs"/>
+              </a:defRPr>
+            </a:pPr>
+            <a:r>
+              <a:rPr lang="en-US">
+                <a:solidFill>
+                  <a:srgbClr val="4F81BD"/>
+                </a:solidFill>
+              </a:rPr>
+              <a:t>Hiring</a:t>
+            </a:r>
+            <a:r>
+              <a:rPr lang="en-US"/>
+              <a:t> vs. </a:t>
+            </a:r>
+            <a:r>
+              <a:rPr lang="en-US">
+                <a:solidFill>
+                  <a:srgbClr val="C0504D"/>
+                </a:solidFill>
+              </a:rPr>
+              <a:t>Attrition</a:t>
+            </a:r>
+          </a:p>
+        </c:rich>
+      </c:tx>
+      <c:overlay val="0"/>
+      <c:spPr>
+        <a:noFill/>
+        <a:ln>
+          <a:noFill/>
+        </a:ln>
+        <a:effectLst/>
+      </c:spPr>
+      <c:txPr>
+        <a:bodyPr rot="0" spcFirstLastPara="1" vertOverflow="ellipsis" vert="horz" wrap="square" anchor="ctr" anchorCtr="1"/>
+        <a:lstStyle/>
+        <a:p>
+          <a:pPr>
+            <a:defRPr sz="1400" b="0" i="0" u="none" strike="noStrike" kern="1200" spc="0" baseline="0">
+              <a:solidFill>
+                <a:schemeClr val="tx1">
+                  <a:lumMod val="65000"/>
+                  <a:lumOff val="35000"/>
+                </a:schemeClr>
+              </a:solidFill>
+              <a:latin typeface="+mn-lt"/>
+              <a:ea typeface="+mn-ea"/>
+              <a:cs typeface="+mn-cs"/>
+            </a:defRPr>
+          </a:pPr>
+          <a:endParaRPr lang="en-US"/>
+        </a:p>
+      </c:txPr>
+    </c:title>
+    <c:autoTitleDeleted val="0"/>
+    <c:plotArea>
+      <c:layout/>
+      <c:barChart>
+        <c:barDir val="bar"/>
+        <c:grouping val="clustered"/>
+        <c:varyColors val="0"/>
+        <c:ser>
+          <c:idx val="0"/>
+          <c:order val="0"/>
+          <c:spPr>
+            <a:solidFill>
+              <a:srgbClr val="4F81BD"/>
+            </a:solidFill>
+            <a:ln>
+              <a:noFill/>
+            </a:ln>
+            <a:effectLst/>
+          </c:spPr>
+          <c:invertIfNegative val="0"/>
+          <c:cat>
+            <c:strRef>
+              <c:f>'Key_Question _1'!$A$286:$A$293</c:f>
+              <c:strCache>
+                <c:ptCount val="8"/>
+                <c:pt idx="0">
+                  <c:v>2018</c:v>
+                </c:pt>
+                <c:pt idx="1">
+                  <c:v>2019</c:v>
+                </c:pt>
+                <c:pt idx="2">
+                  <c:v>2020</c:v>
+                </c:pt>
+                <c:pt idx="3">
+                  <c:v>2021</c:v>
+                </c:pt>
+                <c:pt idx="4">
+                  <c:v>2022</c:v>
+                </c:pt>
+                <c:pt idx="5">
+                  <c:v>2023</c:v>
+                </c:pt>
+                <c:pt idx="6">
+                  <c:v>2024</c:v>
+                </c:pt>
+                <c:pt idx="7">
+                  <c:v>2025 (H1)</c:v>
+                </c:pt>
+              </c:strCache>
+            </c:strRef>
+          </c:cat>
+          <c:val>
+            <c:numRef>
+              <c:f>'Key_Question _1'!$B$286:$B$293</c:f>
+              <c:numCache>
+                <c:formatCode>General</c:formatCode>
+                <c:ptCount val="8"/>
+                <c:pt idx="0">
+                  <c:v>59</c:v>
+                </c:pt>
+                <c:pt idx="1">
+                  <c:v>71</c:v>
+                </c:pt>
+                <c:pt idx="2">
+                  <c:v>82</c:v>
+                </c:pt>
+                <c:pt idx="3">
+                  <c:v>98</c:v>
+                </c:pt>
+                <c:pt idx="4">
+                  <c:v>103</c:v>
+                </c:pt>
+                <c:pt idx="5">
+                  <c:v>23</c:v>
+                </c:pt>
+                <c:pt idx="6">
+                  <c:v>48</c:v>
+                </c:pt>
+                <c:pt idx="7">
+                  <c:v>16</c:v>
+                </c:pt>
+              </c:numCache>
+            </c:numRef>
+          </c:val>
+          <c:extLst>
+            <c:ext xmlns:c16="http://schemas.microsoft.com/office/drawing/2014/chart" uri="{C3380CC4-5D6E-409C-BE32-E72D297353CC}">
+              <c16:uniqueId val="{00000000-8563-408F-9B4C-98B08FDBAA60}"/>
+            </c:ext>
+          </c:extLst>
+        </c:ser>
+        <c:ser>
+          <c:idx val="1"/>
+          <c:order val="1"/>
+          <c:spPr>
+            <a:solidFill>
+              <a:schemeClr val="accent2"/>
+            </a:solidFill>
+            <a:ln>
+              <a:noFill/>
+            </a:ln>
+            <a:effectLst/>
+          </c:spPr>
+          <c:invertIfNegative val="0"/>
+          <c:dPt>
+            <c:idx val="6"/>
+            <c:invertIfNegative val="0"/>
+            <c:bubble3D val="0"/>
+            <c:spPr>
+              <a:solidFill>
+                <a:srgbClr val="C0504D"/>
+              </a:solidFill>
+              <a:ln>
+                <a:noFill/>
+              </a:ln>
+              <a:effectLst/>
+            </c:spPr>
+            <c:extLst>
+              <c:ext xmlns:c16="http://schemas.microsoft.com/office/drawing/2014/chart" uri="{C3380CC4-5D6E-409C-BE32-E72D297353CC}">
+                <c16:uniqueId val="{00000002-8563-408F-9B4C-98B08FDBAA60}"/>
+              </c:ext>
+            </c:extLst>
+          </c:dPt>
+          <c:cat>
+            <c:strRef>
+              <c:f>'Key_Question _1'!$A$286:$A$293</c:f>
+              <c:strCache>
+                <c:ptCount val="8"/>
+                <c:pt idx="0">
+                  <c:v>2018</c:v>
+                </c:pt>
+                <c:pt idx="1">
+                  <c:v>2019</c:v>
+                </c:pt>
+                <c:pt idx="2">
+                  <c:v>2020</c:v>
+                </c:pt>
+                <c:pt idx="3">
+                  <c:v>2021</c:v>
+                </c:pt>
+                <c:pt idx="4">
+                  <c:v>2022</c:v>
+                </c:pt>
+                <c:pt idx="5">
+                  <c:v>2023</c:v>
+                </c:pt>
+                <c:pt idx="6">
+                  <c:v>2024</c:v>
+                </c:pt>
+                <c:pt idx="7">
+                  <c:v>2025 (H1)</c:v>
+                </c:pt>
+              </c:strCache>
+            </c:strRef>
+          </c:cat>
+          <c:val>
+            <c:numRef>
+              <c:f>'Key_Question _1'!$C$286:$C$293</c:f>
+              <c:numCache>
+                <c:formatCode>General</c:formatCode>
+                <c:ptCount val="8"/>
+                <c:pt idx="0">
+                  <c:v>2</c:v>
+                </c:pt>
+                <c:pt idx="1">
+                  <c:v>6</c:v>
+                </c:pt>
+                <c:pt idx="2">
+                  <c:v>8</c:v>
+                </c:pt>
+                <c:pt idx="3">
+                  <c:v>14</c:v>
+                </c:pt>
+                <c:pt idx="4">
+                  <c:v>18</c:v>
+                </c:pt>
+                <c:pt idx="5">
+                  <c:v>27</c:v>
+                </c:pt>
+                <c:pt idx="6">
+                  <c:v>28</c:v>
+                </c:pt>
+                <c:pt idx="7">
+                  <c:v>25</c:v>
+                </c:pt>
+              </c:numCache>
+            </c:numRef>
+          </c:val>
+          <c:extLst>
+            <c:ext xmlns:c16="http://schemas.microsoft.com/office/drawing/2014/chart" uri="{C3380CC4-5D6E-409C-BE32-E72D297353CC}">
+              <c16:uniqueId val="{00000003-8563-408F-9B4C-98B08FDBAA60}"/>
+            </c:ext>
+          </c:extLst>
+        </c:ser>
+        <c:dLbls>
+          <c:showLegendKey val="0"/>
+          <c:showVal val="0"/>
+          <c:showCatName val="0"/>
+          <c:showSerName val="0"/>
+          <c:showPercent val="0"/>
+          <c:showBubbleSize val="0"/>
+        </c:dLbls>
+        <c:gapWidth val="182"/>
+        <c:axId val="1201565279"/>
+        <c:axId val="1201568639"/>
+      </c:barChart>
+      <c:catAx>
+        <c:axId val="1201565279"/>
+        <c:scaling>
+          <c:orientation val="minMax"/>
+        </c:scaling>
+        <c:delete val="0"/>
+        <c:axPos val="l"/>
+        <c:numFmt formatCode="General" sourceLinked="1"/>
+        <c:majorTickMark val="none"/>
+        <c:minorTickMark val="none"/>
+        <c:tickLblPos val="nextTo"/>
+        <c:spPr>
+          <a:noFill/>
+          <a:ln w="9525" cap="flat" cmpd="sng" algn="ctr">
+            <a:solidFill>
+              <a:schemeClr val="tx1">
+                <a:lumMod val="15000"/>
+                <a:lumOff val="85000"/>
+              </a:schemeClr>
+            </a:solidFill>
+            <a:round/>
+          </a:ln>
+          <a:effectLst/>
+        </c:spPr>
+        <c:txPr>
+          <a:bodyPr rot="-60000000" spcFirstLastPara="1" vertOverflow="ellipsis" vert="horz" wrap="square" anchor="ctr" anchorCtr="1"/>
+          <a:lstStyle/>
+          <a:p>
+            <a:pPr>
+              <a:defRPr sz="900" b="0" i="0" u="none" strike="noStrike" kern="1200" baseline="0">
+                <a:solidFill>
+                  <a:schemeClr val="tx1">
+                    <a:lumMod val="65000"/>
+                    <a:lumOff val="35000"/>
+                  </a:schemeClr>
+                </a:solidFill>
+                <a:latin typeface="+mn-lt"/>
+                <a:ea typeface="+mn-ea"/>
+                <a:cs typeface="+mn-cs"/>
+              </a:defRPr>
+            </a:pPr>
+            <a:endParaRPr lang="en-US"/>
+          </a:p>
+        </c:txPr>
+        <c:crossAx val="1201568639"/>
+        <c:crosses val="autoZero"/>
+        <c:auto val="1"/>
+        <c:lblAlgn val="ctr"/>
+        <c:lblOffset val="100"/>
+        <c:noMultiLvlLbl val="0"/>
+      </c:catAx>
+      <c:valAx>
+        <c:axId val="1201568639"/>
+        <c:scaling>
+          <c:orientation val="minMax"/>
+        </c:scaling>
+        <c:delete val="0"/>
+        <c:axPos val="b"/>
+        <c:majorGridlines>
+          <c:spPr>
+            <a:ln w="9525" cap="flat" cmpd="sng" algn="ctr">
+              <a:noFill/>
+              <a:round/>
+            </a:ln>
+            <a:effectLst/>
+          </c:spPr>
+        </c:majorGridlines>
+        <c:title>
+          <c:tx>
+            <c:rich>
+              <a:bodyPr rot="0" spcFirstLastPara="1" vertOverflow="ellipsis" vert="horz" wrap="square" anchor="ctr" anchorCtr="1"/>
+              <a:lstStyle/>
+              <a:p>
+                <a:pPr>
+                  <a:defRPr sz="1000" b="0" i="0" u="none" strike="noStrike" kern="1200" baseline="0">
+                    <a:solidFill>
+                      <a:schemeClr val="tx1">
+                        <a:lumMod val="65000"/>
+                        <a:lumOff val="35000"/>
+                      </a:schemeClr>
+                    </a:solidFill>
+                    <a:latin typeface="+mn-lt"/>
+                    <a:ea typeface="+mn-ea"/>
+                    <a:cs typeface="+mn-cs"/>
+                  </a:defRPr>
+                </a:pPr>
+                <a:r>
+                  <a:rPr lang="en-US" sz="900" dirty="0"/>
+                  <a:t>Headcount</a:t>
+                </a:r>
+              </a:p>
+            </c:rich>
+          </c:tx>
+          <c:layout>
+            <c:manualLayout>
+              <c:xMode val="edge"/>
+              <c:yMode val="edge"/>
+              <c:x val="2.2745242382600662E-3"/>
+              <c:y val="0.81951361503096232"/>
+            </c:manualLayout>
+          </c:layout>
+          <c:overlay val="0"/>
+          <c:spPr>
+            <a:noFill/>
+            <a:ln>
+              <a:noFill/>
+            </a:ln>
+            <a:effectLst/>
+          </c:spPr>
+          <c:txPr>
+            <a:bodyPr rot="0" spcFirstLastPara="1" vertOverflow="ellipsis" vert="horz" wrap="square" anchor="ctr" anchorCtr="1"/>
+            <a:lstStyle/>
+            <a:p>
+              <a:pPr>
+                <a:defRPr sz="1000" b="0" i="0" u="none" strike="noStrike" kern="1200" baseline="0">
+                  <a:solidFill>
+                    <a:schemeClr val="tx1">
+                      <a:lumMod val="65000"/>
+                      <a:lumOff val="35000"/>
+                    </a:schemeClr>
+                  </a:solidFill>
+                  <a:latin typeface="+mn-lt"/>
+                  <a:ea typeface="+mn-ea"/>
+                  <a:cs typeface="+mn-cs"/>
+                </a:defRPr>
+              </a:pPr>
+              <a:endParaRPr lang="en-US"/>
+            </a:p>
+          </c:txPr>
+        </c:title>
+        <c:numFmt formatCode="General" sourceLinked="1"/>
+        <c:majorTickMark val="none"/>
+        <c:minorTickMark val="none"/>
+        <c:tickLblPos val="nextTo"/>
+        <c:spPr>
+          <a:noFill/>
+          <a:ln>
+            <a:noFill/>
+          </a:ln>
+          <a:effectLst/>
+        </c:spPr>
+        <c:txPr>
+          <a:bodyPr rot="-60000000" spcFirstLastPara="1" vertOverflow="ellipsis" vert="horz" wrap="square" anchor="ctr" anchorCtr="1"/>
+          <a:lstStyle/>
+          <a:p>
+            <a:pPr>
+              <a:defRPr sz="900" b="0" i="0" u="none" strike="noStrike" kern="1200" baseline="0">
+                <a:solidFill>
+                  <a:schemeClr val="tx1">
+                    <a:lumMod val="65000"/>
+                    <a:lumOff val="35000"/>
+                  </a:schemeClr>
+                </a:solidFill>
+                <a:latin typeface="+mn-lt"/>
+                <a:ea typeface="+mn-ea"/>
+                <a:cs typeface="+mn-cs"/>
+              </a:defRPr>
+            </a:pPr>
+            <a:endParaRPr lang="en-US"/>
+          </a:p>
+        </c:txPr>
+        <c:crossAx val="1201565279"/>
+        <c:crosses val="autoZero"/>
+        <c:crossBetween val="between"/>
+      </c:valAx>
+      <c:spPr>
+        <a:noFill/>
+        <a:ln>
+          <a:noFill/>
+        </a:ln>
+        <a:effectLst/>
+      </c:spPr>
+    </c:plotArea>
+    <c:plotVisOnly val="1"/>
+    <c:dispBlanksAs val="gap"/>
+    <c:extLst>
+      <c:ext xmlns:c16r3="http://schemas.microsoft.com/office/drawing/2017/03/chart" uri="{56B9EC1D-385E-4148-901F-78D8002777C0}">
+        <c16r3:dataDisplayOptions16>
+          <c16r3:dispNaAsBlank val="1"/>
+        </c16r3:dataDisplayOptions16>
+      </c:ext>
+    </c:extLst>
+    <c:showDLblsOverMax val="0"/>
+  </c:chart>
+  <c:spPr>
+    <a:noFill/>
+    <a:ln>
+      <a:noFill/>
+    </a:ln>
+    <a:effectLst/>
+  </c:spPr>
+  <c:txPr>
+    <a:bodyPr/>
+    <a:lstStyle/>
+    <a:p>
+      <a:pPr>
+        <a:defRPr/>
+      </a:pPr>
+      <a:endParaRPr lang="en-US"/>
+    </a:p>
+  </c:txPr>
+  <c:externalData r:id="rId3">
+    <c:autoUpdate val="0"/>
+  </c:externalData>
+</c:chartSpace>
+</file>
+
 <file path=ppt/charts/colors1.xml><?xml version="1.0" encoding="utf-8"?>
 <cs:colorStyle xmlns:cs="http://schemas.microsoft.com/office/drawing/2012/chartStyle" xmlns:a="http://schemas.openxmlformats.org/drawingml/2006/main" meth="cycle" id="10">
   <a:schemeClr val="accent1"/>
@@ -2035,6 +2559,46 @@
 </file>
 
 <file path=ppt/charts/colors2.xml><?xml version="1.0" encoding="utf-8"?>
+<cs:colorStyle xmlns:cs="http://schemas.microsoft.com/office/drawing/2012/chartStyle" xmlns:a="http://schemas.openxmlformats.org/drawingml/2006/main" meth="cycle" id="10">
+  <a:schemeClr val="accent1"/>
+  <a:schemeClr val="accent2"/>
+  <a:schemeClr val="accent3"/>
+  <a:schemeClr val="accent4"/>
+  <a:schemeClr val="accent5"/>
+  <a:schemeClr val="accent6"/>
+  <cs:variation/>
+  <cs:variation>
+    <a:lumMod val="60000"/>
+  </cs:variation>
+  <cs:variation>
+    <a:lumMod val="80000"/>
+    <a:lumOff val="20000"/>
+  </cs:variation>
+  <cs:variation>
+    <a:lumMod val="80000"/>
+  </cs:variation>
+  <cs:variation>
+    <a:lumMod val="60000"/>
+    <a:lumOff val="40000"/>
+  </cs:variation>
+  <cs:variation>
+    <a:lumMod val="50000"/>
+  </cs:variation>
+  <cs:variation>
+    <a:lumMod val="70000"/>
+    <a:lumOff val="30000"/>
+  </cs:variation>
+  <cs:variation>
+    <a:lumMod val="70000"/>
+  </cs:variation>
+  <cs:variation>
+    <a:lumMod val="50000"/>
+    <a:lumOff val="50000"/>
+  </cs:variation>
+</cs:colorStyle>
+</file>
+
+<file path=ppt/charts/colors3.xml><?xml version="1.0" encoding="utf-8"?>
 <cs:colorStyle xmlns:cs="http://schemas.microsoft.com/office/drawing/2012/chartStyle" xmlns:a="http://schemas.openxmlformats.org/drawingml/2006/main" meth="cycle" id="10">
   <a:schemeClr val="accent1"/>
   <a:schemeClr val="accent2"/>
@@ -3080,6 +3644,511 @@
 </cs:chartStyle>
 </file>
 
+<file path=ppt/charts/style3.xml><?xml version="1.0" encoding="utf-8"?>
+<cs:chartStyle xmlns:cs="http://schemas.microsoft.com/office/drawing/2012/chartStyle" xmlns:a="http://schemas.openxmlformats.org/drawingml/2006/main" id="216">
+  <cs:axisTitle>
+    <cs:lnRef idx="0"/>
+    <cs:fillRef idx="0"/>
+    <cs:effectRef idx="0"/>
+    <cs:fontRef idx="minor">
+      <a:schemeClr val="tx1">
+        <a:lumMod val="65000"/>
+        <a:lumOff val="35000"/>
+      </a:schemeClr>
+    </cs:fontRef>
+    <cs:defRPr sz="1000" kern="1200"/>
+  </cs:axisTitle>
+  <cs:categoryAxis>
+    <cs:lnRef idx="0"/>
+    <cs:fillRef idx="0"/>
+    <cs:effectRef idx="0"/>
+    <cs:fontRef idx="minor">
+      <a:schemeClr val="tx1">
+        <a:lumMod val="65000"/>
+        <a:lumOff val="35000"/>
+      </a:schemeClr>
+    </cs:fontRef>
+    <cs:spPr>
+      <a:ln w="9525" cap="flat" cmpd="sng" algn="ctr">
+        <a:solidFill>
+          <a:schemeClr val="tx1">
+            <a:lumMod val="15000"/>
+            <a:lumOff val="85000"/>
+          </a:schemeClr>
+        </a:solidFill>
+        <a:round/>
+      </a:ln>
+    </cs:spPr>
+    <cs:defRPr sz="900" kern="1200"/>
+  </cs:categoryAxis>
+  <cs:chartArea mods="allowNoFillOverride allowNoLineOverride">
+    <cs:lnRef idx="0"/>
+    <cs:fillRef idx="0"/>
+    <cs:effectRef idx="0"/>
+    <cs:fontRef idx="minor">
+      <a:schemeClr val="tx1"/>
+    </cs:fontRef>
+    <cs:spPr>
+      <a:solidFill>
+        <a:schemeClr val="bg1"/>
+      </a:solidFill>
+      <a:ln w="9525" cap="flat" cmpd="sng" algn="ctr">
+        <a:solidFill>
+          <a:schemeClr val="tx1">
+            <a:lumMod val="15000"/>
+            <a:lumOff val="85000"/>
+          </a:schemeClr>
+        </a:solidFill>
+        <a:round/>
+      </a:ln>
+    </cs:spPr>
+    <cs:defRPr sz="1000" kern="1200"/>
+  </cs:chartArea>
+  <cs:dataLabel>
+    <cs:lnRef idx="0"/>
+    <cs:fillRef idx="0"/>
+    <cs:effectRef idx="0"/>
+    <cs:fontRef idx="minor">
+      <a:schemeClr val="tx1">
+        <a:lumMod val="75000"/>
+        <a:lumOff val="25000"/>
+      </a:schemeClr>
+    </cs:fontRef>
+    <cs:defRPr sz="900" kern="1200"/>
+  </cs:dataLabel>
+  <cs:dataLabelCallout>
+    <cs:lnRef idx="0"/>
+    <cs:fillRef idx="0"/>
+    <cs:effectRef idx="0"/>
+    <cs:fontRef idx="minor">
+      <a:schemeClr val="dk1">
+        <a:lumMod val="65000"/>
+        <a:lumOff val="35000"/>
+      </a:schemeClr>
+    </cs:fontRef>
+    <cs:spPr>
+      <a:solidFill>
+        <a:schemeClr val="lt1"/>
+      </a:solidFill>
+      <a:ln>
+        <a:solidFill>
+          <a:schemeClr val="dk1">
+            <a:lumMod val="25000"/>
+            <a:lumOff val="75000"/>
+          </a:schemeClr>
+        </a:solidFill>
+      </a:ln>
+    </cs:spPr>
+    <cs:defRPr sz="900" kern="1200"/>
+    <cs:bodyPr rot="0" spcFirstLastPara="1" vertOverflow="clip" horzOverflow="clip" vert="horz" wrap="square" lIns="36576" tIns="18288" rIns="36576" bIns="18288" anchor="ctr" anchorCtr="1">
+      <a:spAutoFit/>
+    </cs:bodyPr>
+  </cs:dataLabelCallout>
+  <cs:dataPoint>
+    <cs:lnRef idx="0"/>
+    <cs:fillRef idx="1">
+      <cs:styleClr val="auto"/>
+    </cs:fillRef>
+    <cs:effectRef idx="0"/>
+    <cs:fontRef idx="minor">
+      <a:schemeClr val="tx1"/>
+    </cs:fontRef>
+  </cs:dataPoint>
+  <cs:dataPoint3D>
+    <cs:lnRef idx="0"/>
+    <cs:fillRef idx="1">
+      <cs:styleClr val="auto"/>
+    </cs:fillRef>
+    <cs:effectRef idx="0"/>
+    <cs:fontRef idx="minor">
+      <a:schemeClr val="tx1"/>
+    </cs:fontRef>
+  </cs:dataPoint3D>
+  <cs:dataPointLine>
+    <cs:lnRef idx="0">
+      <cs:styleClr val="auto"/>
+    </cs:lnRef>
+    <cs:fillRef idx="1"/>
+    <cs:effectRef idx="0"/>
+    <cs:fontRef idx="minor">
+      <a:schemeClr val="tx1"/>
+    </cs:fontRef>
+    <cs:spPr>
+      <a:ln w="28575" cap="rnd">
+        <a:solidFill>
+          <a:schemeClr val="phClr"/>
+        </a:solidFill>
+        <a:round/>
+      </a:ln>
+    </cs:spPr>
+  </cs:dataPointLine>
+  <cs:dataPointMarker>
+    <cs:lnRef idx="0">
+      <cs:styleClr val="auto"/>
+    </cs:lnRef>
+    <cs:fillRef idx="1">
+      <cs:styleClr val="auto"/>
+    </cs:fillRef>
+    <cs:effectRef idx="0"/>
+    <cs:fontRef idx="minor">
+      <a:schemeClr val="tx1"/>
+    </cs:fontRef>
+    <cs:spPr>
+      <a:ln w="9525">
+        <a:solidFill>
+          <a:schemeClr val="phClr"/>
+        </a:solidFill>
+      </a:ln>
+    </cs:spPr>
+  </cs:dataPointMarker>
+  <cs:dataPointMarkerLayout symbol="circle" size="5"/>
+  <cs:dataPointWireframe>
+    <cs:lnRef idx="0">
+      <cs:styleClr val="auto"/>
+    </cs:lnRef>
+    <cs:fillRef idx="1"/>
+    <cs:effectRef idx="0"/>
+    <cs:fontRef idx="minor">
+      <a:schemeClr val="tx1"/>
+    </cs:fontRef>
+    <cs:spPr>
+      <a:ln w="9525" cap="rnd">
+        <a:solidFill>
+          <a:schemeClr val="phClr"/>
+        </a:solidFill>
+        <a:round/>
+      </a:ln>
+    </cs:spPr>
+  </cs:dataPointWireframe>
+  <cs:dataTable>
+    <cs:lnRef idx="0"/>
+    <cs:fillRef idx="0"/>
+    <cs:effectRef idx="0"/>
+    <cs:fontRef idx="minor">
+      <a:schemeClr val="tx1">
+        <a:lumMod val="65000"/>
+        <a:lumOff val="35000"/>
+      </a:schemeClr>
+    </cs:fontRef>
+    <cs:spPr>
+      <a:noFill/>
+      <a:ln w="9525" cap="flat" cmpd="sng" algn="ctr">
+        <a:solidFill>
+          <a:schemeClr val="tx1">
+            <a:lumMod val="15000"/>
+            <a:lumOff val="85000"/>
+          </a:schemeClr>
+        </a:solidFill>
+        <a:round/>
+      </a:ln>
+    </cs:spPr>
+    <cs:defRPr sz="900" kern="1200"/>
+  </cs:dataTable>
+  <cs:downBar>
+    <cs:lnRef idx="0"/>
+    <cs:fillRef idx="0"/>
+    <cs:effectRef idx="0"/>
+    <cs:fontRef idx="minor">
+      <a:schemeClr val="tx1"/>
+    </cs:fontRef>
+    <cs:spPr>
+      <a:solidFill>
+        <a:schemeClr val="dk1">
+          <a:lumMod val="75000"/>
+          <a:lumOff val="25000"/>
+        </a:schemeClr>
+      </a:solidFill>
+      <a:ln w="9525" cap="flat" cmpd="sng" algn="ctr">
+        <a:solidFill>
+          <a:schemeClr val="tx1">
+            <a:lumMod val="65000"/>
+            <a:lumOff val="35000"/>
+          </a:schemeClr>
+        </a:solidFill>
+        <a:round/>
+      </a:ln>
+    </cs:spPr>
+  </cs:downBar>
+  <cs:dropLine>
+    <cs:lnRef idx="0"/>
+    <cs:fillRef idx="0"/>
+    <cs:effectRef idx="0"/>
+    <cs:fontRef idx="minor">
+      <a:schemeClr val="tx1"/>
+    </cs:fontRef>
+    <cs:spPr>
+      <a:ln w="9525" cap="flat" cmpd="sng" algn="ctr">
+        <a:solidFill>
+          <a:schemeClr val="tx1">
+            <a:lumMod val="35000"/>
+            <a:lumOff val="65000"/>
+          </a:schemeClr>
+        </a:solidFill>
+        <a:round/>
+      </a:ln>
+    </cs:spPr>
+  </cs:dropLine>
+  <cs:errorBar>
+    <cs:lnRef idx="0"/>
+    <cs:fillRef idx="0"/>
+    <cs:effectRef idx="0"/>
+    <cs:fontRef idx="minor">
+      <a:schemeClr val="tx1"/>
+    </cs:fontRef>
+    <cs:spPr>
+      <a:ln w="9525" cap="flat" cmpd="sng" algn="ctr">
+        <a:solidFill>
+          <a:schemeClr val="tx1">
+            <a:lumMod val="65000"/>
+            <a:lumOff val="35000"/>
+          </a:schemeClr>
+        </a:solidFill>
+        <a:round/>
+      </a:ln>
+    </cs:spPr>
+  </cs:errorBar>
+  <cs:floor>
+    <cs:lnRef idx="0"/>
+    <cs:fillRef idx="0"/>
+    <cs:effectRef idx="0"/>
+    <cs:fontRef idx="minor">
+      <a:schemeClr val="tx1"/>
+    </cs:fontRef>
+    <cs:spPr>
+      <a:noFill/>
+      <a:ln>
+        <a:noFill/>
+      </a:ln>
+    </cs:spPr>
+  </cs:floor>
+  <cs:gridlineMajor>
+    <cs:lnRef idx="0"/>
+    <cs:fillRef idx="0"/>
+    <cs:effectRef idx="0"/>
+    <cs:fontRef idx="minor">
+      <a:schemeClr val="tx1"/>
+    </cs:fontRef>
+    <cs:spPr>
+      <a:ln w="9525" cap="flat" cmpd="sng" algn="ctr">
+        <a:solidFill>
+          <a:schemeClr val="tx1">
+            <a:lumMod val="15000"/>
+            <a:lumOff val="85000"/>
+          </a:schemeClr>
+        </a:solidFill>
+        <a:round/>
+      </a:ln>
+    </cs:spPr>
+  </cs:gridlineMajor>
+  <cs:gridlineMinor>
+    <cs:lnRef idx="0"/>
+    <cs:fillRef idx="0"/>
+    <cs:effectRef idx="0"/>
+    <cs:fontRef idx="minor">
+      <a:schemeClr val="tx1"/>
+    </cs:fontRef>
+    <cs:spPr>
+      <a:ln w="9525" cap="flat" cmpd="sng" algn="ctr">
+        <a:solidFill>
+          <a:schemeClr val="tx1">
+            <a:lumMod val="5000"/>
+            <a:lumOff val="95000"/>
+          </a:schemeClr>
+        </a:solidFill>
+        <a:round/>
+      </a:ln>
+    </cs:spPr>
+  </cs:gridlineMinor>
+  <cs:hiLoLine>
+    <cs:lnRef idx="0"/>
+    <cs:fillRef idx="0"/>
+    <cs:effectRef idx="0"/>
+    <cs:fontRef idx="minor">
+      <a:schemeClr val="tx1"/>
+    </cs:fontRef>
+    <cs:spPr>
+      <a:ln w="9525" cap="flat" cmpd="sng" algn="ctr">
+        <a:solidFill>
+          <a:schemeClr val="tx1">
+            <a:lumMod val="50000"/>
+            <a:lumOff val="50000"/>
+          </a:schemeClr>
+        </a:solidFill>
+        <a:round/>
+      </a:ln>
+    </cs:spPr>
+  </cs:hiLoLine>
+  <cs:leaderLine>
+    <cs:lnRef idx="0"/>
+    <cs:fillRef idx="0"/>
+    <cs:effectRef idx="0"/>
+    <cs:fontRef idx="minor">
+      <a:schemeClr val="tx1"/>
+    </cs:fontRef>
+    <cs:spPr>
+      <a:ln w="9525" cap="flat" cmpd="sng" algn="ctr">
+        <a:solidFill>
+          <a:schemeClr val="tx1">
+            <a:lumMod val="35000"/>
+            <a:lumOff val="65000"/>
+          </a:schemeClr>
+        </a:solidFill>
+        <a:round/>
+      </a:ln>
+    </cs:spPr>
+  </cs:leaderLine>
+  <cs:legend>
+    <cs:lnRef idx="0"/>
+    <cs:fillRef idx="0"/>
+    <cs:effectRef idx="0"/>
+    <cs:fontRef idx="minor">
+      <a:schemeClr val="tx1">
+        <a:lumMod val="65000"/>
+        <a:lumOff val="35000"/>
+      </a:schemeClr>
+    </cs:fontRef>
+    <cs:defRPr sz="900" kern="1200"/>
+  </cs:legend>
+  <cs:plotArea mods="allowNoFillOverride allowNoLineOverride">
+    <cs:lnRef idx="0"/>
+    <cs:fillRef idx="0"/>
+    <cs:effectRef idx="0"/>
+    <cs:fontRef idx="minor">
+      <a:schemeClr val="tx1"/>
+    </cs:fontRef>
+  </cs:plotArea>
+  <cs:plotArea3D mods="allowNoFillOverride allowNoLineOverride">
+    <cs:lnRef idx="0"/>
+    <cs:fillRef idx="0"/>
+    <cs:effectRef idx="0"/>
+    <cs:fontRef idx="minor">
+      <a:schemeClr val="tx1"/>
+    </cs:fontRef>
+  </cs:plotArea3D>
+  <cs:seriesAxis>
+    <cs:lnRef idx="0"/>
+    <cs:fillRef idx="0"/>
+    <cs:effectRef idx="0"/>
+    <cs:fontRef idx="minor">
+      <a:schemeClr val="tx1">
+        <a:lumMod val="65000"/>
+        <a:lumOff val="35000"/>
+      </a:schemeClr>
+    </cs:fontRef>
+    <cs:defRPr sz="900" kern="1200"/>
+  </cs:seriesAxis>
+  <cs:seriesLine>
+    <cs:lnRef idx="0"/>
+    <cs:fillRef idx="0"/>
+    <cs:effectRef idx="0"/>
+    <cs:fontRef idx="minor">
+      <a:schemeClr val="tx1"/>
+    </cs:fontRef>
+    <cs:spPr>
+      <a:ln w="9525" cap="flat" cmpd="sng" algn="ctr">
+        <a:solidFill>
+          <a:schemeClr val="tx1">
+            <a:lumMod val="35000"/>
+            <a:lumOff val="65000"/>
+          </a:schemeClr>
+        </a:solidFill>
+        <a:round/>
+      </a:ln>
+    </cs:spPr>
+  </cs:seriesLine>
+  <cs:title>
+    <cs:lnRef idx="0"/>
+    <cs:fillRef idx="0"/>
+    <cs:effectRef idx="0"/>
+    <cs:fontRef idx="minor">
+      <a:schemeClr val="tx1">
+        <a:lumMod val="65000"/>
+        <a:lumOff val="35000"/>
+      </a:schemeClr>
+    </cs:fontRef>
+    <cs:defRPr sz="1400" b="0" kern="1200" spc="0" baseline="0"/>
+  </cs:title>
+  <cs:trendline>
+    <cs:lnRef idx="0">
+      <cs:styleClr val="auto"/>
+    </cs:lnRef>
+    <cs:fillRef idx="0"/>
+    <cs:effectRef idx="0"/>
+    <cs:fontRef idx="minor">
+      <a:schemeClr val="tx1"/>
+    </cs:fontRef>
+    <cs:spPr>
+      <a:ln w="19050" cap="rnd">
+        <a:solidFill>
+          <a:schemeClr val="phClr"/>
+        </a:solidFill>
+        <a:prstDash val="sysDot"/>
+      </a:ln>
+    </cs:spPr>
+  </cs:trendline>
+  <cs:trendlineLabel>
+    <cs:lnRef idx="0"/>
+    <cs:fillRef idx="0"/>
+    <cs:effectRef idx="0"/>
+    <cs:fontRef idx="minor">
+      <a:schemeClr val="tx1">
+        <a:lumMod val="65000"/>
+        <a:lumOff val="35000"/>
+      </a:schemeClr>
+    </cs:fontRef>
+    <cs:defRPr sz="900" kern="1200"/>
+  </cs:trendlineLabel>
+  <cs:upBar>
+    <cs:lnRef idx="0"/>
+    <cs:fillRef idx="0"/>
+    <cs:effectRef idx="0"/>
+    <cs:fontRef idx="minor">
+      <a:schemeClr val="tx1"/>
+    </cs:fontRef>
+    <cs:spPr>
+      <a:solidFill>
+        <a:schemeClr val="lt1"/>
+      </a:solidFill>
+      <a:ln w="9525" cap="flat" cmpd="sng" algn="ctr">
+        <a:solidFill>
+          <a:schemeClr val="tx1">
+            <a:lumMod val="65000"/>
+            <a:lumOff val="35000"/>
+          </a:schemeClr>
+        </a:solidFill>
+        <a:round/>
+      </a:ln>
+    </cs:spPr>
+  </cs:upBar>
+  <cs:valueAxis>
+    <cs:lnRef idx="0"/>
+    <cs:fillRef idx="0"/>
+    <cs:effectRef idx="0"/>
+    <cs:fontRef idx="minor">
+      <a:schemeClr val="tx1">
+        <a:lumMod val="65000"/>
+        <a:lumOff val="35000"/>
+      </a:schemeClr>
+    </cs:fontRef>
+    <cs:defRPr sz="900" kern="1200"/>
+  </cs:valueAxis>
+  <cs:wall>
+    <cs:lnRef idx="0"/>
+    <cs:fillRef idx="0"/>
+    <cs:effectRef idx="0"/>
+    <cs:fontRef idx="minor">
+      <a:schemeClr val="tx1"/>
+    </cs:fontRef>
+    <cs:spPr>
+      <a:noFill/>
+      <a:ln>
+        <a:noFill/>
+      </a:ln>
+    </cs:spPr>
+  </cs:wall>
+</cs:chartStyle>
+</file>
+
 <file path=ppt/slideLayouts/slideLayout1.xml><?xml version="1.0" encoding="utf-8"?>
 <p:sldLayout xmlns:a="http://schemas.openxmlformats.org/drawingml/2006/main" xmlns:r="http://schemas.openxmlformats.org/officeDocument/2006/relationships" xmlns:p="http://schemas.openxmlformats.org/presentationml/2006/main" type="title" preserve="1">
   <p:cSld name="Title Slide">
@@ -3109,8 +4178,8 @@
         </p:nvSpPr>
         <p:spPr>
           <a:xfrm>
-            <a:off x="685800" y="2130425"/>
-            <a:ext cx="7772400" cy="1470025"/>
+            <a:off x="685800" y="1597826"/>
+            <a:ext cx="7772400" cy="1102519"/>
           </a:xfrm>
         </p:spPr>
         <p:txBody>
@@ -3136,8 +4205,8 @@
         </p:nvSpPr>
         <p:spPr>
           <a:xfrm>
-            <a:off x="1371600" y="3886200"/>
-            <a:ext cx="6400800" cy="1752600"/>
+            <a:off x="1371600" y="2914650"/>
+            <a:ext cx="6400800" cy="1314450"/>
           </a:xfrm>
         </p:spPr>
         <p:txBody>
@@ -3153,7 +4222,7 @@
                 </a:solidFill>
               </a:defRPr>
             </a:lvl1pPr>
-            <a:lvl2pPr marL="457200" indent="0" algn="ctr">
+            <a:lvl2pPr marL="342883" indent="0" algn="ctr">
               <a:buNone/>
               <a:defRPr>
                 <a:solidFill>
@@ -3163,7 +4232,7 @@
                 </a:solidFill>
               </a:defRPr>
             </a:lvl2pPr>
-            <a:lvl3pPr marL="914400" indent="0" algn="ctr">
+            <a:lvl3pPr marL="685766" indent="0" algn="ctr">
               <a:buNone/>
               <a:defRPr>
                 <a:solidFill>
@@ -3173,7 +4242,7 @@
                 </a:solidFill>
               </a:defRPr>
             </a:lvl3pPr>
-            <a:lvl4pPr marL="1371600" indent="0" algn="ctr">
+            <a:lvl4pPr marL="1028648" indent="0" algn="ctr">
               <a:buNone/>
               <a:defRPr>
                 <a:solidFill>
@@ -3183,7 +4252,7 @@
                 </a:solidFill>
               </a:defRPr>
             </a:lvl4pPr>
-            <a:lvl5pPr marL="1828800" indent="0" algn="ctr">
+            <a:lvl5pPr marL="1371532" indent="0" algn="ctr">
               <a:buNone/>
               <a:defRPr>
                 <a:solidFill>
@@ -3193,7 +4262,7 @@
                 </a:solidFill>
               </a:defRPr>
             </a:lvl5pPr>
-            <a:lvl6pPr marL="2286000" indent="0" algn="ctr">
+            <a:lvl6pPr marL="1714415" indent="0" algn="ctr">
               <a:buNone/>
               <a:defRPr>
                 <a:solidFill>
@@ -3203,7 +4272,7 @@
                 </a:solidFill>
               </a:defRPr>
             </a:lvl6pPr>
-            <a:lvl7pPr marL="2743200" indent="0" algn="ctr">
+            <a:lvl7pPr marL="2057297" indent="0" algn="ctr">
               <a:buNone/>
               <a:defRPr>
                 <a:solidFill>
@@ -3213,7 +4282,7 @@
                 </a:solidFill>
               </a:defRPr>
             </a:lvl7pPr>
-            <a:lvl8pPr marL="3200400" indent="0" algn="ctr">
+            <a:lvl8pPr marL="2400180" indent="0" algn="ctr">
               <a:buNone/>
               <a:defRPr>
                 <a:solidFill>
@@ -3223,7 +4292,7 @@
                 </a:solidFill>
               </a:defRPr>
             </a:lvl8pPr>
-            <a:lvl9pPr marL="3657600" indent="0" algn="ctr">
+            <a:lvl9pPr marL="2743063" indent="0" algn="ctr">
               <a:buNone/>
               <a:defRPr>
                 <a:solidFill>
@@ -3517,8 +4586,8 @@
         </p:nvSpPr>
         <p:spPr>
           <a:xfrm>
-            <a:off x="6629400" y="274638"/>
-            <a:ext cx="2057400" cy="5851525"/>
+            <a:off x="6629400" y="205980"/>
+            <a:ext cx="2057400" cy="4388644"/>
           </a:xfrm>
         </p:spPr>
         <p:txBody>
@@ -3544,8 +4613,8 @@
         </p:nvSpPr>
         <p:spPr>
           <a:xfrm>
-            <a:off x="457200" y="274638"/>
-            <a:ext cx="6019800" cy="5851525"/>
+            <a:off x="457200" y="205980"/>
+            <a:ext cx="6019800" cy="4388644"/>
           </a:xfrm>
         </p:spPr>
         <p:txBody>
@@ -3863,15 +4932,15 @@
         </p:nvSpPr>
         <p:spPr>
           <a:xfrm>
-            <a:off x="722313" y="4406900"/>
-            <a:ext cx="7772400" cy="1362075"/>
+            <a:off x="722313" y="3305176"/>
+            <a:ext cx="7772400" cy="1021556"/>
           </a:xfrm>
         </p:spPr>
         <p:txBody>
           <a:bodyPr anchor="t"/>
           <a:lstStyle>
             <a:lvl1pPr algn="l">
-              <a:defRPr sz="4000" b="1" cap="all"/>
+              <a:defRPr sz="3000" b="1" cap="all"/>
             </a:lvl1pPr>
           </a:lstStyle>
           <a:p>
@@ -3894,8 +4963,8 @@
         </p:nvSpPr>
         <p:spPr>
           <a:xfrm>
-            <a:off x="722313" y="2906713"/>
-            <a:ext cx="7772400" cy="1500187"/>
+            <a:off x="722313" y="2180035"/>
+            <a:ext cx="7772400" cy="1125140"/>
           </a:xfrm>
         </p:spPr>
         <p:txBody>
@@ -3903,7 +4972,7 @@
           <a:lstStyle>
             <a:lvl1pPr marL="0" indent="0">
               <a:buNone/>
-              <a:defRPr sz="2000">
+              <a:defRPr sz="1500">
                 <a:solidFill>
                   <a:schemeClr val="tx1">
                     <a:tint val="75000"/>
@@ -3911,9 +4980,9 @@
                 </a:solidFill>
               </a:defRPr>
             </a:lvl1pPr>
-            <a:lvl2pPr marL="457200" indent="0">
+            <a:lvl2pPr marL="342883" indent="0">
               <a:buNone/>
-              <a:defRPr sz="1800">
+              <a:defRPr sz="1351">
                 <a:solidFill>
                   <a:schemeClr val="tx1">
                     <a:tint val="75000"/>
@@ -3921,9 +4990,9 @@
                 </a:solidFill>
               </a:defRPr>
             </a:lvl2pPr>
-            <a:lvl3pPr marL="914400" indent="0">
+            <a:lvl3pPr marL="685766" indent="0">
               <a:buNone/>
-              <a:defRPr sz="1600">
+              <a:defRPr sz="1200">
                 <a:solidFill>
                   <a:schemeClr val="tx1">
                     <a:tint val="75000"/>
@@ -3931,9 +5000,9 @@
                 </a:solidFill>
               </a:defRPr>
             </a:lvl3pPr>
-            <a:lvl4pPr marL="1371600" indent="0">
+            <a:lvl4pPr marL="1028648" indent="0">
               <a:buNone/>
-              <a:defRPr sz="1400">
+              <a:defRPr sz="1051">
                 <a:solidFill>
                   <a:schemeClr val="tx1">
                     <a:tint val="75000"/>
@@ -3941,9 +5010,9 @@
                 </a:solidFill>
               </a:defRPr>
             </a:lvl4pPr>
-            <a:lvl5pPr marL="1828800" indent="0">
+            <a:lvl5pPr marL="1371532" indent="0">
               <a:buNone/>
-              <a:defRPr sz="1400">
+              <a:defRPr sz="1051">
                 <a:solidFill>
                   <a:schemeClr val="tx1">
                     <a:tint val="75000"/>
@@ -3951,9 +5020,9 @@
                 </a:solidFill>
               </a:defRPr>
             </a:lvl5pPr>
-            <a:lvl6pPr marL="2286000" indent="0">
+            <a:lvl6pPr marL="1714415" indent="0">
               <a:buNone/>
-              <a:defRPr sz="1400">
+              <a:defRPr sz="1051">
                 <a:solidFill>
                   <a:schemeClr val="tx1">
                     <a:tint val="75000"/>
@@ -3961,9 +5030,9 @@
                 </a:solidFill>
               </a:defRPr>
             </a:lvl6pPr>
-            <a:lvl7pPr marL="2743200" indent="0">
+            <a:lvl7pPr marL="2057297" indent="0">
               <a:buNone/>
-              <a:defRPr sz="1400">
+              <a:defRPr sz="1051">
                 <a:solidFill>
                   <a:schemeClr val="tx1">
                     <a:tint val="75000"/>
@@ -3971,9 +5040,9 @@
                 </a:solidFill>
               </a:defRPr>
             </a:lvl7pPr>
-            <a:lvl8pPr marL="3200400" indent="0">
+            <a:lvl8pPr marL="2400180" indent="0">
               <a:buNone/>
-              <a:defRPr sz="1400">
+              <a:defRPr sz="1051">
                 <a:solidFill>
                   <a:schemeClr val="tx1">
                     <a:tint val="75000"/>
@@ -3981,9 +5050,9 @@
                 </a:solidFill>
               </a:defRPr>
             </a:lvl8pPr>
-            <a:lvl9pPr marL="3657600" indent="0">
+            <a:lvl9pPr marL="2743063" indent="0">
               <a:buNone/>
-              <a:defRPr sz="1400">
+              <a:defRPr sz="1051">
                 <a:solidFill>
                   <a:schemeClr val="tx1">
                     <a:tint val="75000"/>
@@ -4130,39 +5199,39 @@
         </p:nvSpPr>
         <p:spPr>
           <a:xfrm>
-            <a:off x="457200" y="1600200"/>
-            <a:ext cx="4038600" cy="4525963"/>
+            <a:off x="457200" y="1200151"/>
+            <a:ext cx="4038600" cy="3394472"/>
           </a:xfrm>
         </p:spPr>
         <p:txBody>
           <a:bodyPr/>
           <a:lstStyle>
             <a:lvl1pPr>
-              <a:defRPr sz="2800"/>
+              <a:defRPr sz="2100"/>
             </a:lvl1pPr>
             <a:lvl2pPr>
-              <a:defRPr sz="2400"/>
+              <a:defRPr sz="1800"/>
             </a:lvl2pPr>
             <a:lvl3pPr>
-              <a:defRPr sz="2000"/>
+              <a:defRPr sz="1500"/>
             </a:lvl3pPr>
             <a:lvl4pPr>
-              <a:defRPr sz="1800"/>
+              <a:defRPr sz="1351"/>
             </a:lvl4pPr>
             <a:lvl5pPr>
-              <a:defRPr sz="1800"/>
+              <a:defRPr sz="1351"/>
             </a:lvl5pPr>
             <a:lvl6pPr>
-              <a:defRPr sz="1800"/>
+              <a:defRPr sz="1351"/>
             </a:lvl6pPr>
             <a:lvl7pPr>
-              <a:defRPr sz="1800"/>
+              <a:defRPr sz="1351"/>
             </a:lvl7pPr>
             <a:lvl8pPr>
-              <a:defRPr sz="1800"/>
+              <a:defRPr sz="1351"/>
             </a:lvl8pPr>
             <a:lvl9pPr>
-              <a:defRPr sz="1800"/>
+              <a:defRPr sz="1351"/>
             </a:lvl9pPr>
           </a:lstStyle>
           <a:p>
@@ -4214,39 +5283,39 @@
         </p:nvSpPr>
         <p:spPr>
           <a:xfrm>
-            <a:off x="4648200" y="1600200"/>
-            <a:ext cx="4038600" cy="4525963"/>
+            <a:off x="4648200" y="1200151"/>
+            <a:ext cx="4038600" cy="3394472"/>
           </a:xfrm>
         </p:spPr>
         <p:txBody>
           <a:bodyPr/>
           <a:lstStyle>
             <a:lvl1pPr>
-              <a:defRPr sz="2800"/>
+              <a:defRPr sz="2100"/>
             </a:lvl1pPr>
             <a:lvl2pPr>
-              <a:defRPr sz="2400"/>
+              <a:defRPr sz="1800"/>
             </a:lvl2pPr>
             <a:lvl3pPr>
-              <a:defRPr sz="2000"/>
+              <a:defRPr sz="1500"/>
             </a:lvl3pPr>
             <a:lvl4pPr>
-              <a:defRPr sz="1800"/>
+              <a:defRPr sz="1351"/>
             </a:lvl4pPr>
             <a:lvl5pPr>
-              <a:defRPr sz="1800"/>
+              <a:defRPr sz="1351"/>
             </a:lvl5pPr>
             <a:lvl6pPr>
-              <a:defRPr sz="1800"/>
+              <a:defRPr sz="1351"/>
             </a:lvl6pPr>
             <a:lvl7pPr>
-              <a:defRPr sz="1800"/>
+              <a:defRPr sz="1351"/>
             </a:lvl7pPr>
             <a:lvl8pPr>
-              <a:defRPr sz="1800"/>
+              <a:defRPr sz="1351"/>
             </a:lvl8pPr>
             <a:lvl9pPr>
-              <a:defRPr sz="1800"/>
+              <a:defRPr sz="1351"/>
             </a:lvl9pPr>
           </a:lstStyle>
           <a:p>
@@ -4419,8 +5488,8 @@
         </p:nvSpPr>
         <p:spPr>
           <a:xfrm>
-            <a:off x="457200" y="1535113"/>
-            <a:ext cx="4040188" cy="639762"/>
+            <a:off x="457203" y="1151335"/>
+            <a:ext cx="4040188" cy="479822"/>
           </a:xfrm>
         </p:spPr>
         <p:txBody>
@@ -4428,39 +5497,39 @@
           <a:lstStyle>
             <a:lvl1pPr marL="0" indent="0">
               <a:buNone/>
-              <a:defRPr sz="2400" b="1"/>
+              <a:defRPr sz="1800" b="1"/>
             </a:lvl1pPr>
-            <a:lvl2pPr marL="457200" indent="0">
+            <a:lvl2pPr marL="342883" indent="0">
               <a:buNone/>
-              <a:defRPr sz="2000" b="1"/>
+              <a:defRPr sz="1500" b="1"/>
             </a:lvl2pPr>
-            <a:lvl3pPr marL="914400" indent="0">
+            <a:lvl3pPr marL="685766" indent="0">
               <a:buNone/>
-              <a:defRPr sz="1800" b="1"/>
+              <a:defRPr sz="1351" b="1"/>
             </a:lvl3pPr>
-            <a:lvl4pPr marL="1371600" indent="0">
+            <a:lvl4pPr marL="1028648" indent="0">
               <a:buNone/>
-              <a:defRPr sz="1600" b="1"/>
+              <a:defRPr sz="1200" b="1"/>
             </a:lvl4pPr>
-            <a:lvl5pPr marL="1828800" indent="0">
+            <a:lvl5pPr marL="1371532" indent="0">
               <a:buNone/>
-              <a:defRPr sz="1600" b="1"/>
+              <a:defRPr sz="1200" b="1"/>
             </a:lvl5pPr>
-            <a:lvl6pPr marL="2286000" indent="0">
+            <a:lvl6pPr marL="1714415" indent="0">
               <a:buNone/>
-              <a:defRPr sz="1600" b="1"/>
+              <a:defRPr sz="1200" b="1"/>
             </a:lvl6pPr>
-            <a:lvl7pPr marL="2743200" indent="0">
+            <a:lvl7pPr marL="2057297" indent="0">
               <a:buNone/>
-              <a:defRPr sz="1600" b="1"/>
+              <a:defRPr sz="1200" b="1"/>
             </a:lvl7pPr>
-            <a:lvl8pPr marL="3200400" indent="0">
+            <a:lvl8pPr marL="2400180" indent="0">
               <a:buNone/>
-              <a:defRPr sz="1600" b="1"/>
+              <a:defRPr sz="1200" b="1"/>
             </a:lvl8pPr>
-            <a:lvl9pPr marL="3657600" indent="0">
+            <a:lvl9pPr marL="2743063" indent="0">
               <a:buNone/>
-              <a:defRPr sz="1600" b="1"/>
+              <a:defRPr sz="1200" b="1"/>
             </a:lvl9pPr>
           </a:lstStyle>
           <a:p>
@@ -4484,39 +5553,39 @@
         </p:nvSpPr>
         <p:spPr>
           <a:xfrm>
-            <a:off x="457200" y="2174875"/>
-            <a:ext cx="4040188" cy="3951288"/>
+            <a:off x="457203" y="1631156"/>
+            <a:ext cx="4040188" cy="2963466"/>
           </a:xfrm>
         </p:spPr>
         <p:txBody>
           <a:bodyPr/>
           <a:lstStyle>
             <a:lvl1pPr>
-              <a:defRPr sz="2400"/>
+              <a:defRPr sz="1800"/>
             </a:lvl1pPr>
             <a:lvl2pPr>
-              <a:defRPr sz="2000"/>
+              <a:defRPr sz="1500"/>
             </a:lvl2pPr>
             <a:lvl3pPr>
-              <a:defRPr sz="1800"/>
+              <a:defRPr sz="1351"/>
             </a:lvl3pPr>
             <a:lvl4pPr>
-              <a:defRPr sz="1600"/>
+              <a:defRPr sz="1200"/>
             </a:lvl4pPr>
             <a:lvl5pPr>
-              <a:defRPr sz="1600"/>
+              <a:defRPr sz="1200"/>
             </a:lvl5pPr>
             <a:lvl6pPr>
-              <a:defRPr sz="1600"/>
+              <a:defRPr sz="1200"/>
             </a:lvl6pPr>
             <a:lvl7pPr>
-              <a:defRPr sz="1600"/>
+              <a:defRPr sz="1200"/>
             </a:lvl7pPr>
             <a:lvl8pPr>
-              <a:defRPr sz="1600"/>
+              <a:defRPr sz="1200"/>
             </a:lvl8pPr>
             <a:lvl9pPr>
-              <a:defRPr sz="1600"/>
+              <a:defRPr sz="1200"/>
             </a:lvl9pPr>
           </a:lstStyle>
           <a:p>
@@ -4568,8 +5637,8 @@
         </p:nvSpPr>
         <p:spPr>
           <a:xfrm>
-            <a:off x="4645025" y="1535113"/>
-            <a:ext cx="4041775" cy="639762"/>
+            <a:off x="4645030" y="1151335"/>
+            <a:ext cx="4041775" cy="479822"/>
           </a:xfrm>
         </p:spPr>
         <p:txBody>
@@ -4577,39 +5646,39 @@
           <a:lstStyle>
             <a:lvl1pPr marL="0" indent="0">
               <a:buNone/>
-              <a:defRPr sz="2400" b="1"/>
+              <a:defRPr sz="1800" b="1"/>
             </a:lvl1pPr>
-            <a:lvl2pPr marL="457200" indent="0">
+            <a:lvl2pPr marL="342883" indent="0">
               <a:buNone/>
-              <a:defRPr sz="2000" b="1"/>
+              <a:defRPr sz="1500" b="1"/>
             </a:lvl2pPr>
-            <a:lvl3pPr marL="914400" indent="0">
+            <a:lvl3pPr marL="685766" indent="0">
               <a:buNone/>
-              <a:defRPr sz="1800" b="1"/>
+              <a:defRPr sz="1351" b="1"/>
             </a:lvl3pPr>
-            <a:lvl4pPr marL="1371600" indent="0">
+            <a:lvl4pPr marL="1028648" indent="0">
               <a:buNone/>
-              <a:defRPr sz="1600" b="1"/>
+              <a:defRPr sz="1200" b="1"/>
             </a:lvl4pPr>
-            <a:lvl5pPr marL="1828800" indent="0">
+            <a:lvl5pPr marL="1371532" indent="0">
               <a:buNone/>
-              <a:defRPr sz="1600" b="1"/>
+              <a:defRPr sz="1200" b="1"/>
             </a:lvl5pPr>
-            <a:lvl6pPr marL="2286000" indent="0">
+            <a:lvl6pPr marL="1714415" indent="0">
               <a:buNone/>
-              <a:defRPr sz="1600" b="1"/>
+              <a:defRPr sz="1200" b="1"/>
             </a:lvl6pPr>
-            <a:lvl7pPr marL="2743200" indent="0">
+            <a:lvl7pPr marL="2057297" indent="0">
               <a:buNone/>
-              <a:defRPr sz="1600" b="1"/>
+              <a:defRPr sz="1200" b="1"/>
             </a:lvl7pPr>
-            <a:lvl8pPr marL="3200400" indent="0">
+            <a:lvl8pPr marL="2400180" indent="0">
               <a:buNone/>
-              <a:defRPr sz="1600" b="1"/>
+              <a:defRPr sz="1200" b="1"/>
             </a:lvl8pPr>
-            <a:lvl9pPr marL="3657600" indent="0">
+            <a:lvl9pPr marL="2743063" indent="0">
               <a:buNone/>
-              <a:defRPr sz="1600" b="1"/>
+              <a:defRPr sz="1200" b="1"/>
             </a:lvl9pPr>
           </a:lstStyle>
           <a:p>
@@ -4633,39 +5702,39 @@
         </p:nvSpPr>
         <p:spPr>
           <a:xfrm>
-            <a:off x="4645025" y="2174875"/>
-            <a:ext cx="4041775" cy="3951288"/>
+            <a:off x="4645030" y="1631156"/>
+            <a:ext cx="4041775" cy="2963466"/>
           </a:xfrm>
         </p:spPr>
         <p:txBody>
           <a:bodyPr/>
           <a:lstStyle>
             <a:lvl1pPr>
-              <a:defRPr sz="2400"/>
+              <a:defRPr sz="1800"/>
             </a:lvl1pPr>
             <a:lvl2pPr>
-              <a:defRPr sz="2000"/>
+              <a:defRPr sz="1500"/>
             </a:lvl2pPr>
             <a:lvl3pPr>
-              <a:defRPr sz="1800"/>
+              <a:defRPr sz="1351"/>
             </a:lvl3pPr>
             <a:lvl4pPr>
-              <a:defRPr sz="1600"/>
+              <a:defRPr sz="1200"/>
             </a:lvl4pPr>
             <a:lvl5pPr>
-              <a:defRPr sz="1600"/>
+              <a:defRPr sz="1200"/>
             </a:lvl5pPr>
             <a:lvl6pPr>
-              <a:defRPr sz="1600"/>
+              <a:defRPr sz="1200"/>
             </a:lvl6pPr>
             <a:lvl7pPr>
-              <a:defRPr sz="1600"/>
+              <a:defRPr sz="1200"/>
             </a:lvl7pPr>
             <a:lvl8pPr>
-              <a:defRPr sz="1600"/>
+              <a:defRPr sz="1200"/>
             </a:lvl8pPr>
             <a:lvl9pPr>
-              <a:defRPr sz="1600"/>
+              <a:defRPr sz="1200"/>
             </a:lvl9pPr>
           </a:lstStyle>
           <a:p>
@@ -5024,15 +6093,15 @@
         </p:nvSpPr>
         <p:spPr>
           <a:xfrm>
-            <a:off x="457200" y="273050"/>
-            <a:ext cx="3008313" cy="1162050"/>
+            <a:off x="457205" y="204787"/>
+            <a:ext cx="3008313" cy="871538"/>
           </a:xfrm>
         </p:spPr>
         <p:txBody>
           <a:bodyPr anchor="b"/>
           <a:lstStyle>
             <a:lvl1pPr algn="l">
-              <a:defRPr sz="2000" b="1"/>
+              <a:defRPr sz="1500" b="1"/>
             </a:lvl1pPr>
           </a:lstStyle>
           <a:p>
@@ -5055,39 +6124,39 @@
         </p:nvSpPr>
         <p:spPr>
           <a:xfrm>
-            <a:off x="3575050" y="273050"/>
-            <a:ext cx="5111750" cy="5853113"/>
+            <a:off x="3575053" y="204795"/>
+            <a:ext cx="5111751" cy="4389835"/>
           </a:xfrm>
         </p:spPr>
         <p:txBody>
           <a:bodyPr/>
           <a:lstStyle>
             <a:lvl1pPr>
-              <a:defRPr sz="3200"/>
+              <a:defRPr sz="2400"/>
             </a:lvl1pPr>
             <a:lvl2pPr>
-              <a:defRPr sz="2800"/>
+              <a:defRPr sz="2100"/>
             </a:lvl2pPr>
             <a:lvl3pPr>
-              <a:defRPr sz="2400"/>
+              <a:defRPr sz="1800"/>
             </a:lvl3pPr>
             <a:lvl4pPr>
-              <a:defRPr sz="2000"/>
+              <a:defRPr sz="1500"/>
             </a:lvl4pPr>
             <a:lvl5pPr>
-              <a:defRPr sz="2000"/>
+              <a:defRPr sz="1500"/>
             </a:lvl5pPr>
             <a:lvl6pPr>
-              <a:defRPr sz="2000"/>
+              <a:defRPr sz="1500"/>
             </a:lvl6pPr>
             <a:lvl7pPr>
-              <a:defRPr sz="2000"/>
+              <a:defRPr sz="1500"/>
             </a:lvl7pPr>
             <a:lvl8pPr>
-              <a:defRPr sz="2000"/>
+              <a:defRPr sz="1500"/>
             </a:lvl8pPr>
             <a:lvl9pPr>
-              <a:defRPr sz="2000"/>
+              <a:defRPr sz="1500"/>
             </a:lvl9pPr>
           </a:lstStyle>
           <a:p>
@@ -5139,8 +6208,8 @@
         </p:nvSpPr>
         <p:spPr>
           <a:xfrm>
-            <a:off x="457200" y="1435100"/>
-            <a:ext cx="3008313" cy="4691063"/>
+            <a:off x="457205" y="1076328"/>
+            <a:ext cx="3008313" cy="3518297"/>
           </a:xfrm>
         </p:spPr>
         <p:txBody>
@@ -5148,39 +6217,39 @@
           <a:lstStyle>
             <a:lvl1pPr marL="0" indent="0">
               <a:buNone/>
-              <a:defRPr sz="1400"/>
+              <a:defRPr sz="1051"/>
             </a:lvl1pPr>
-            <a:lvl2pPr marL="457200" indent="0">
-              <a:buNone/>
-              <a:defRPr sz="1200"/>
-            </a:lvl2pPr>
-            <a:lvl3pPr marL="914400" indent="0">
-              <a:buNone/>
-              <a:defRPr sz="1000"/>
-            </a:lvl3pPr>
-            <a:lvl4pPr marL="1371600" indent="0">
+            <a:lvl2pPr marL="342883" indent="0">
               <a:buNone/>
               <a:defRPr sz="900"/>
+            </a:lvl2pPr>
+            <a:lvl3pPr marL="685766" indent="0">
+              <a:buNone/>
+              <a:defRPr sz="751"/>
+            </a:lvl3pPr>
+            <a:lvl4pPr marL="1028648" indent="0">
+              <a:buNone/>
+              <a:defRPr sz="675"/>
             </a:lvl4pPr>
-            <a:lvl5pPr marL="1828800" indent="0">
+            <a:lvl5pPr marL="1371532" indent="0">
               <a:buNone/>
-              <a:defRPr sz="900"/>
+              <a:defRPr sz="675"/>
             </a:lvl5pPr>
-            <a:lvl6pPr marL="2286000" indent="0">
+            <a:lvl6pPr marL="1714415" indent="0">
               <a:buNone/>
-              <a:defRPr sz="900"/>
+              <a:defRPr sz="675"/>
             </a:lvl6pPr>
-            <a:lvl7pPr marL="2743200" indent="0">
+            <a:lvl7pPr marL="2057297" indent="0">
               <a:buNone/>
-              <a:defRPr sz="900"/>
+              <a:defRPr sz="675"/>
             </a:lvl7pPr>
-            <a:lvl8pPr marL="3200400" indent="0">
+            <a:lvl8pPr marL="2400180" indent="0">
               <a:buNone/>
-              <a:defRPr sz="900"/>
+              <a:defRPr sz="675"/>
             </a:lvl8pPr>
-            <a:lvl9pPr marL="3657600" indent="0">
+            <a:lvl9pPr marL="2743063" indent="0">
               <a:buNone/>
-              <a:defRPr sz="900"/>
+              <a:defRPr sz="675"/>
             </a:lvl9pPr>
           </a:lstStyle>
           <a:p>
@@ -5299,15 +6368,15 @@
         </p:nvSpPr>
         <p:spPr>
           <a:xfrm>
-            <a:off x="1792288" y="4800600"/>
-            <a:ext cx="5486400" cy="566738"/>
+            <a:off x="1792288" y="3600450"/>
+            <a:ext cx="5486400" cy="425054"/>
           </a:xfrm>
         </p:spPr>
         <p:txBody>
           <a:bodyPr anchor="b"/>
           <a:lstStyle>
             <a:lvl1pPr algn="l">
-              <a:defRPr sz="2000" b="1"/>
+              <a:defRPr sz="1500" b="1"/>
             </a:lvl1pPr>
           </a:lstStyle>
           <a:p>
@@ -5330,8 +6399,8 @@
         </p:nvSpPr>
         <p:spPr>
           <a:xfrm>
-            <a:off x="1792288" y="612775"/>
-            <a:ext cx="5486400" cy="4114800"/>
+            <a:off x="1792288" y="459581"/>
+            <a:ext cx="5486400" cy="3086100"/>
           </a:xfrm>
         </p:spPr>
         <p:txBody>
@@ -5339,39 +6408,39 @@
           <a:lstStyle>
             <a:lvl1pPr marL="0" indent="0">
               <a:buNone/>
-              <a:defRPr sz="3200"/>
+              <a:defRPr sz="2400"/>
             </a:lvl1pPr>
-            <a:lvl2pPr marL="457200" indent="0">
+            <a:lvl2pPr marL="342883" indent="0">
               <a:buNone/>
-              <a:defRPr sz="2800"/>
+              <a:defRPr sz="2100"/>
             </a:lvl2pPr>
-            <a:lvl3pPr marL="914400" indent="0">
+            <a:lvl3pPr marL="685766" indent="0">
               <a:buNone/>
-              <a:defRPr sz="2400"/>
+              <a:defRPr sz="1800"/>
             </a:lvl3pPr>
-            <a:lvl4pPr marL="1371600" indent="0">
+            <a:lvl4pPr marL="1028648" indent="0">
               <a:buNone/>
-              <a:defRPr sz="2000"/>
+              <a:defRPr sz="1500"/>
             </a:lvl4pPr>
-            <a:lvl5pPr marL="1828800" indent="0">
+            <a:lvl5pPr marL="1371532" indent="0">
               <a:buNone/>
-              <a:defRPr sz="2000"/>
+              <a:defRPr sz="1500"/>
             </a:lvl5pPr>
-            <a:lvl6pPr marL="2286000" indent="0">
+            <a:lvl6pPr marL="1714415" indent="0">
               <a:buNone/>
-              <a:defRPr sz="2000"/>
+              <a:defRPr sz="1500"/>
             </a:lvl6pPr>
-            <a:lvl7pPr marL="2743200" indent="0">
+            <a:lvl7pPr marL="2057297" indent="0">
               <a:buNone/>
-              <a:defRPr sz="2000"/>
+              <a:defRPr sz="1500"/>
             </a:lvl7pPr>
-            <a:lvl8pPr marL="3200400" indent="0">
+            <a:lvl8pPr marL="2400180" indent="0">
               <a:buNone/>
-              <a:defRPr sz="2000"/>
+              <a:defRPr sz="1500"/>
             </a:lvl8pPr>
-            <a:lvl9pPr marL="3657600" indent="0">
+            <a:lvl9pPr marL="2743063" indent="0">
               <a:buNone/>
-              <a:defRPr sz="2000"/>
+              <a:defRPr sz="1500"/>
             </a:lvl9pPr>
           </a:lstStyle>
           <a:p>
@@ -5391,8 +6460,8 @@
         </p:nvSpPr>
         <p:spPr>
           <a:xfrm>
-            <a:off x="1792288" y="5367338"/>
-            <a:ext cx="5486400" cy="804862"/>
+            <a:off x="1792288" y="4025509"/>
+            <a:ext cx="5486400" cy="603647"/>
           </a:xfrm>
         </p:spPr>
         <p:txBody>
@@ -5400,39 +6469,39 @@
           <a:lstStyle>
             <a:lvl1pPr marL="0" indent="0">
               <a:buNone/>
-              <a:defRPr sz="1400"/>
+              <a:defRPr sz="1051"/>
             </a:lvl1pPr>
-            <a:lvl2pPr marL="457200" indent="0">
-              <a:buNone/>
-              <a:defRPr sz="1200"/>
-            </a:lvl2pPr>
-            <a:lvl3pPr marL="914400" indent="0">
-              <a:buNone/>
-              <a:defRPr sz="1000"/>
-            </a:lvl3pPr>
-            <a:lvl4pPr marL="1371600" indent="0">
+            <a:lvl2pPr marL="342883" indent="0">
               <a:buNone/>
               <a:defRPr sz="900"/>
+            </a:lvl2pPr>
+            <a:lvl3pPr marL="685766" indent="0">
+              <a:buNone/>
+              <a:defRPr sz="751"/>
+            </a:lvl3pPr>
+            <a:lvl4pPr marL="1028648" indent="0">
+              <a:buNone/>
+              <a:defRPr sz="675"/>
             </a:lvl4pPr>
-            <a:lvl5pPr marL="1828800" indent="0">
+            <a:lvl5pPr marL="1371532" indent="0">
               <a:buNone/>
-              <a:defRPr sz="900"/>
+              <a:defRPr sz="675"/>
             </a:lvl5pPr>
-            <a:lvl6pPr marL="2286000" indent="0">
+            <a:lvl6pPr marL="1714415" indent="0">
               <a:buNone/>
-              <a:defRPr sz="900"/>
+              <a:defRPr sz="675"/>
             </a:lvl6pPr>
-            <a:lvl7pPr marL="2743200" indent="0">
+            <a:lvl7pPr marL="2057297" indent="0">
               <a:buNone/>
-              <a:defRPr sz="900"/>
+              <a:defRPr sz="675"/>
             </a:lvl7pPr>
-            <a:lvl8pPr marL="3200400" indent="0">
+            <a:lvl8pPr marL="2400180" indent="0">
               <a:buNone/>
-              <a:defRPr sz="900"/>
+              <a:defRPr sz="675"/>
             </a:lvl8pPr>
-            <a:lvl9pPr marL="3657600" indent="0">
+            <a:lvl9pPr marL="2743063" indent="0">
               <a:buNone/>
-              <a:defRPr sz="900"/>
+              <a:defRPr sz="675"/>
             </a:lvl9pPr>
           </a:lstStyle>
           <a:p>
@@ -5556,8 +6625,8 @@
         </p:nvSpPr>
         <p:spPr>
           <a:xfrm>
-            <a:off x="457200" y="274638"/>
-            <a:ext cx="8229600" cy="1143000"/>
+            <a:off x="457200" y="205979"/>
+            <a:ext cx="8229600" cy="857250"/>
           </a:xfrm>
           <a:prstGeom prst="rect">
             <a:avLst/>
@@ -5588,8 +6657,8 @@
         </p:nvSpPr>
         <p:spPr>
           <a:xfrm>
-            <a:off x="457200" y="1600200"/>
-            <a:ext cx="8229600" cy="4525963"/>
+            <a:off x="457200" y="1200151"/>
+            <a:ext cx="8229600" cy="3394472"/>
           </a:xfrm>
           <a:prstGeom prst="rect">
             <a:avLst/>
@@ -5649,8 +6718,8 @@
         </p:nvSpPr>
         <p:spPr>
           <a:xfrm>
-            <a:off x="457200" y="6356350"/>
-            <a:ext cx="2133600" cy="365125"/>
+            <a:off x="457200" y="4767264"/>
+            <a:ext cx="2133600" cy="273844"/>
           </a:xfrm>
           <a:prstGeom prst="rect">
             <a:avLst/>
@@ -5660,7 +6729,7 @@
           <a:bodyPr vert="horz" lIns="91440" tIns="45720" rIns="91440" bIns="45720" rtlCol="0" anchor="ctr"/>
           <a:lstStyle>
             <a:lvl1pPr algn="l">
-              <a:defRPr sz="1200">
+              <a:defRPr sz="900">
                 <a:solidFill>
                   <a:schemeClr val="tx1">
                     <a:tint val="75000"/>
@@ -5690,8 +6759,8 @@
         </p:nvSpPr>
         <p:spPr>
           <a:xfrm>
-            <a:off x="3124200" y="6356350"/>
-            <a:ext cx="2895600" cy="365125"/>
+            <a:off x="3124200" y="4767264"/>
+            <a:ext cx="2895600" cy="273844"/>
           </a:xfrm>
           <a:prstGeom prst="rect">
             <a:avLst/>
@@ -5701,7 +6770,7 @@
           <a:bodyPr vert="horz" lIns="91440" tIns="45720" rIns="91440" bIns="45720" rtlCol="0" anchor="ctr"/>
           <a:lstStyle>
             <a:lvl1pPr algn="ctr">
-              <a:defRPr sz="1200">
+              <a:defRPr sz="900">
                 <a:solidFill>
                   <a:schemeClr val="tx1">
                     <a:tint val="75000"/>
@@ -5727,8 +6796,8 @@
         </p:nvSpPr>
         <p:spPr>
           <a:xfrm>
-            <a:off x="6553200" y="6356350"/>
-            <a:ext cx="2133600" cy="365125"/>
+            <a:off x="6553200" y="4767264"/>
+            <a:ext cx="2133600" cy="273844"/>
           </a:xfrm>
           <a:prstGeom prst="rect">
             <a:avLst/>
@@ -5738,7 +6807,7 @@
           <a:bodyPr vert="horz" lIns="91440" tIns="45720" rIns="91440" bIns="45720" rtlCol="0" anchor="ctr"/>
           <a:lstStyle>
             <a:lvl1pPr algn="r">
-              <a:defRPr sz="1200">
+              <a:defRPr sz="900">
                 <a:solidFill>
                   <a:schemeClr val="tx1">
                     <a:tint val="75000"/>
@@ -5779,12 +6848,12 @@
   </p:sldLayoutIdLst>
   <p:txStyles>
     <p:titleStyle>
-      <a:lvl1pPr algn="ctr" defTabSz="457200" rtl="0" eaLnBrk="1" latinLnBrk="0" hangingPunct="1">
+      <a:lvl1pPr algn="ctr" defTabSz="342883" rtl="0" eaLnBrk="1" latinLnBrk="0" hangingPunct="1">
         <a:spcBef>
           <a:spcPct val="0"/>
         </a:spcBef>
         <a:buNone/>
-        <a:defRPr sz="4400" kern="1200">
+        <a:defRPr sz="3300" kern="1200">
           <a:solidFill>
             <a:schemeClr val="tx1"/>
           </a:solidFill>
@@ -5795,37 +6864,7 @@
       </a:lvl1pPr>
     </p:titleStyle>
     <p:bodyStyle>
-      <a:lvl1pPr marL="342900" indent="-342900" algn="l" defTabSz="457200" rtl="0" eaLnBrk="1" latinLnBrk="0" hangingPunct="1">
-        <a:spcBef>
-          <a:spcPct val="20000"/>
-        </a:spcBef>
-        <a:buFont typeface="Arial"/>
-        <a:buChar char="•"/>
-        <a:defRPr sz="3200" kern="1200">
-          <a:solidFill>
-            <a:schemeClr val="tx1"/>
-          </a:solidFill>
-          <a:latin typeface="+mn-lt"/>
-          <a:ea typeface="+mn-ea"/>
-          <a:cs typeface="+mn-cs"/>
-        </a:defRPr>
-      </a:lvl1pPr>
-      <a:lvl2pPr marL="742950" indent="-285750" algn="l" defTabSz="457200" rtl="0" eaLnBrk="1" latinLnBrk="0" hangingPunct="1">
-        <a:spcBef>
-          <a:spcPct val="20000"/>
-        </a:spcBef>
-        <a:buFont typeface="Arial"/>
-        <a:buChar char="–"/>
-        <a:defRPr sz="2800" kern="1200">
-          <a:solidFill>
-            <a:schemeClr val="tx1"/>
-          </a:solidFill>
-          <a:latin typeface="+mn-lt"/>
-          <a:ea typeface="+mn-ea"/>
-          <a:cs typeface="+mn-cs"/>
-        </a:defRPr>
-      </a:lvl2pPr>
-      <a:lvl3pPr marL="1143000" indent="-228600" algn="l" defTabSz="457200" rtl="0" eaLnBrk="1" latinLnBrk="0" hangingPunct="1">
+      <a:lvl1pPr marL="257162" indent="-257162" algn="l" defTabSz="342883" rtl="0" eaLnBrk="1" latinLnBrk="0" hangingPunct="1">
         <a:spcBef>
           <a:spcPct val="20000"/>
         </a:spcBef>
@@ -5839,14 +6878,44 @@
           <a:ea typeface="+mn-ea"/>
           <a:cs typeface="+mn-cs"/>
         </a:defRPr>
-      </a:lvl3pPr>
-      <a:lvl4pPr marL="1600200" indent="-228600" algn="l" defTabSz="457200" rtl="0" eaLnBrk="1" latinLnBrk="0" hangingPunct="1">
+      </a:lvl1pPr>
+      <a:lvl2pPr marL="557185" indent="-214303" algn="l" defTabSz="342883" rtl="0" eaLnBrk="1" latinLnBrk="0" hangingPunct="1">
         <a:spcBef>
           <a:spcPct val="20000"/>
         </a:spcBef>
         <a:buFont typeface="Arial"/>
         <a:buChar char="–"/>
-        <a:defRPr sz="2000" kern="1200">
+        <a:defRPr sz="2100" kern="1200">
+          <a:solidFill>
+            <a:schemeClr val="tx1"/>
+          </a:solidFill>
+          <a:latin typeface="+mn-lt"/>
+          <a:ea typeface="+mn-ea"/>
+          <a:cs typeface="+mn-cs"/>
+        </a:defRPr>
+      </a:lvl2pPr>
+      <a:lvl3pPr marL="857207" indent="-171442" algn="l" defTabSz="342883" rtl="0" eaLnBrk="1" latinLnBrk="0" hangingPunct="1">
+        <a:spcBef>
+          <a:spcPct val="20000"/>
+        </a:spcBef>
+        <a:buFont typeface="Arial"/>
+        <a:buChar char="•"/>
+        <a:defRPr sz="1800" kern="1200">
+          <a:solidFill>
+            <a:schemeClr val="tx1"/>
+          </a:solidFill>
+          <a:latin typeface="+mn-lt"/>
+          <a:ea typeface="+mn-ea"/>
+          <a:cs typeface="+mn-cs"/>
+        </a:defRPr>
+      </a:lvl3pPr>
+      <a:lvl4pPr marL="1200091" indent="-171442" algn="l" defTabSz="342883" rtl="0" eaLnBrk="1" latinLnBrk="0" hangingPunct="1">
+        <a:spcBef>
+          <a:spcPct val="20000"/>
+        </a:spcBef>
+        <a:buFont typeface="Arial"/>
+        <a:buChar char="–"/>
+        <a:defRPr sz="1500" kern="1200">
           <a:solidFill>
             <a:schemeClr val="tx1"/>
           </a:solidFill>
@@ -5855,13 +6924,13 @@
           <a:cs typeface="+mn-cs"/>
         </a:defRPr>
       </a:lvl4pPr>
-      <a:lvl5pPr marL="2057400" indent="-228600" algn="l" defTabSz="457200" rtl="0" eaLnBrk="1" latinLnBrk="0" hangingPunct="1">
+      <a:lvl5pPr marL="1542974" indent="-171442" algn="l" defTabSz="342883" rtl="0" eaLnBrk="1" latinLnBrk="0" hangingPunct="1">
         <a:spcBef>
           <a:spcPct val="20000"/>
         </a:spcBef>
         <a:buFont typeface="Arial"/>
         <a:buChar char="»"/>
-        <a:defRPr sz="2000" kern="1200">
+        <a:defRPr sz="1500" kern="1200">
           <a:solidFill>
             <a:schemeClr val="tx1"/>
           </a:solidFill>
@@ -5870,13 +6939,13 @@
           <a:cs typeface="+mn-cs"/>
         </a:defRPr>
       </a:lvl5pPr>
-      <a:lvl6pPr marL="2514600" indent="-228600" algn="l" defTabSz="457200" rtl="0" eaLnBrk="1" latinLnBrk="0" hangingPunct="1">
+      <a:lvl6pPr marL="1885857" indent="-171442" algn="l" defTabSz="342883" rtl="0" eaLnBrk="1" latinLnBrk="0" hangingPunct="1">
         <a:spcBef>
           <a:spcPct val="20000"/>
         </a:spcBef>
         <a:buFont typeface="Arial"/>
         <a:buChar char="•"/>
-        <a:defRPr sz="2000" kern="1200">
+        <a:defRPr sz="1500" kern="1200">
           <a:solidFill>
             <a:schemeClr val="tx1"/>
           </a:solidFill>
@@ -5885,13 +6954,13 @@
           <a:cs typeface="+mn-cs"/>
         </a:defRPr>
       </a:lvl6pPr>
-      <a:lvl7pPr marL="2971800" indent="-228600" algn="l" defTabSz="457200" rtl="0" eaLnBrk="1" latinLnBrk="0" hangingPunct="1">
+      <a:lvl7pPr marL="2228739" indent="-171442" algn="l" defTabSz="342883" rtl="0" eaLnBrk="1" latinLnBrk="0" hangingPunct="1">
         <a:spcBef>
           <a:spcPct val="20000"/>
         </a:spcBef>
         <a:buFont typeface="Arial"/>
         <a:buChar char="•"/>
-        <a:defRPr sz="2000" kern="1200">
+        <a:defRPr sz="1500" kern="1200">
           <a:solidFill>
             <a:schemeClr val="tx1"/>
           </a:solidFill>
@@ -5900,13 +6969,13 @@
           <a:cs typeface="+mn-cs"/>
         </a:defRPr>
       </a:lvl7pPr>
-      <a:lvl8pPr marL="3429000" indent="-228600" algn="l" defTabSz="457200" rtl="0" eaLnBrk="1" latinLnBrk="0" hangingPunct="1">
+      <a:lvl8pPr marL="2571622" indent="-171442" algn="l" defTabSz="342883" rtl="0" eaLnBrk="1" latinLnBrk="0" hangingPunct="1">
         <a:spcBef>
           <a:spcPct val="20000"/>
         </a:spcBef>
         <a:buFont typeface="Arial"/>
         <a:buChar char="•"/>
-        <a:defRPr sz="2000" kern="1200">
+        <a:defRPr sz="1500" kern="1200">
           <a:solidFill>
             <a:schemeClr val="tx1"/>
           </a:solidFill>
@@ -5915,13 +6984,13 @@
           <a:cs typeface="+mn-cs"/>
         </a:defRPr>
       </a:lvl8pPr>
-      <a:lvl9pPr marL="3886200" indent="-228600" algn="l" defTabSz="457200" rtl="0" eaLnBrk="1" latinLnBrk="0" hangingPunct="1">
+      <a:lvl9pPr marL="2914505" indent="-171442" algn="l" defTabSz="342883" rtl="0" eaLnBrk="1" latinLnBrk="0" hangingPunct="1">
         <a:spcBef>
           <a:spcPct val="20000"/>
         </a:spcBef>
         <a:buFont typeface="Arial"/>
         <a:buChar char="•"/>
-        <a:defRPr sz="2000" kern="1200">
+        <a:defRPr sz="1500" kern="1200">
           <a:solidFill>
             <a:schemeClr val="tx1"/>
           </a:solidFill>
@@ -5935,8 +7004,8 @@
       <a:defPPr>
         <a:defRPr lang="en-US"/>
       </a:defPPr>
-      <a:lvl1pPr marL="0" algn="l" defTabSz="457200" rtl="0" eaLnBrk="1" latinLnBrk="0" hangingPunct="1">
-        <a:defRPr sz="1800" kern="1200">
+      <a:lvl1pPr marL="0" algn="l" defTabSz="342883" rtl="0" eaLnBrk="1" latinLnBrk="0" hangingPunct="1">
+        <a:defRPr sz="1351" kern="1200">
           <a:solidFill>
             <a:schemeClr val="tx1"/>
           </a:solidFill>
@@ -5945,8 +7014,8 @@
           <a:cs typeface="+mn-cs"/>
         </a:defRPr>
       </a:lvl1pPr>
-      <a:lvl2pPr marL="457200" algn="l" defTabSz="457200" rtl="0" eaLnBrk="1" latinLnBrk="0" hangingPunct="1">
-        <a:defRPr sz="1800" kern="1200">
+      <a:lvl2pPr marL="342883" algn="l" defTabSz="342883" rtl="0" eaLnBrk="1" latinLnBrk="0" hangingPunct="1">
+        <a:defRPr sz="1351" kern="1200">
           <a:solidFill>
             <a:schemeClr val="tx1"/>
           </a:solidFill>
@@ -5955,8 +7024,8 @@
           <a:cs typeface="+mn-cs"/>
         </a:defRPr>
       </a:lvl2pPr>
-      <a:lvl3pPr marL="914400" algn="l" defTabSz="457200" rtl="0" eaLnBrk="1" latinLnBrk="0" hangingPunct="1">
-        <a:defRPr sz="1800" kern="1200">
+      <a:lvl3pPr marL="685766" algn="l" defTabSz="342883" rtl="0" eaLnBrk="1" latinLnBrk="0" hangingPunct="1">
+        <a:defRPr sz="1351" kern="1200">
           <a:solidFill>
             <a:schemeClr val="tx1"/>
           </a:solidFill>
@@ -5965,8 +7034,8 @@
           <a:cs typeface="+mn-cs"/>
         </a:defRPr>
       </a:lvl3pPr>
-      <a:lvl4pPr marL="1371600" algn="l" defTabSz="457200" rtl="0" eaLnBrk="1" latinLnBrk="0" hangingPunct="1">
-        <a:defRPr sz="1800" kern="1200">
+      <a:lvl4pPr marL="1028648" algn="l" defTabSz="342883" rtl="0" eaLnBrk="1" latinLnBrk="0" hangingPunct="1">
+        <a:defRPr sz="1351" kern="1200">
           <a:solidFill>
             <a:schemeClr val="tx1"/>
           </a:solidFill>
@@ -5975,8 +7044,8 @@
           <a:cs typeface="+mn-cs"/>
         </a:defRPr>
       </a:lvl4pPr>
-      <a:lvl5pPr marL="1828800" algn="l" defTabSz="457200" rtl="0" eaLnBrk="1" latinLnBrk="0" hangingPunct="1">
-        <a:defRPr sz="1800" kern="1200">
+      <a:lvl5pPr marL="1371532" algn="l" defTabSz="342883" rtl="0" eaLnBrk="1" latinLnBrk="0" hangingPunct="1">
+        <a:defRPr sz="1351" kern="1200">
           <a:solidFill>
             <a:schemeClr val="tx1"/>
           </a:solidFill>
@@ -5985,8 +7054,8 @@
           <a:cs typeface="+mn-cs"/>
         </a:defRPr>
       </a:lvl5pPr>
-      <a:lvl6pPr marL="2286000" algn="l" defTabSz="457200" rtl="0" eaLnBrk="1" latinLnBrk="0" hangingPunct="1">
-        <a:defRPr sz="1800" kern="1200">
+      <a:lvl6pPr marL="1714415" algn="l" defTabSz="342883" rtl="0" eaLnBrk="1" latinLnBrk="0" hangingPunct="1">
+        <a:defRPr sz="1351" kern="1200">
           <a:solidFill>
             <a:schemeClr val="tx1"/>
           </a:solidFill>
@@ -5995,8 +7064,8 @@
           <a:cs typeface="+mn-cs"/>
         </a:defRPr>
       </a:lvl6pPr>
-      <a:lvl7pPr marL="2743200" algn="l" defTabSz="457200" rtl="0" eaLnBrk="1" latinLnBrk="0" hangingPunct="1">
-        <a:defRPr sz="1800" kern="1200">
+      <a:lvl7pPr marL="2057297" algn="l" defTabSz="342883" rtl="0" eaLnBrk="1" latinLnBrk="0" hangingPunct="1">
+        <a:defRPr sz="1351" kern="1200">
           <a:solidFill>
             <a:schemeClr val="tx1"/>
           </a:solidFill>
@@ -6005,8 +7074,8 @@
           <a:cs typeface="+mn-cs"/>
         </a:defRPr>
       </a:lvl7pPr>
-      <a:lvl8pPr marL="3200400" algn="l" defTabSz="457200" rtl="0" eaLnBrk="1" latinLnBrk="0" hangingPunct="1">
-        <a:defRPr sz="1800" kern="1200">
+      <a:lvl8pPr marL="2400180" algn="l" defTabSz="342883" rtl="0" eaLnBrk="1" latinLnBrk="0" hangingPunct="1">
+        <a:defRPr sz="1351" kern="1200">
           <a:solidFill>
             <a:schemeClr val="tx1"/>
           </a:solidFill>
@@ -6015,8 +7084,8 @@
           <a:cs typeface="+mn-cs"/>
         </a:defRPr>
       </a:lvl8pPr>
-      <a:lvl9pPr marL="3657600" algn="l" defTabSz="457200" rtl="0" eaLnBrk="1" latinLnBrk="0" hangingPunct="1">
-        <a:defRPr sz="1800" kern="1200">
+      <a:lvl9pPr marL="2743063" algn="l" defTabSz="342883" rtl="0" eaLnBrk="1" latinLnBrk="0" hangingPunct="1">
+        <a:defRPr sz="1351" kern="1200">
           <a:solidFill>
             <a:schemeClr val="tx1"/>
           </a:solidFill>
@@ -6065,8 +7134,8 @@
         </p:nvSpPr>
         <p:spPr>
           <a:xfrm>
-            <a:off x="457200" y="274638"/>
-            <a:ext cx="8229600" cy="825617"/>
+            <a:off x="296695" y="205983"/>
+            <a:ext cx="8536020" cy="619213"/>
           </a:xfrm>
         </p:spPr>
         <p:txBody>
@@ -6076,15 +7145,8 @@
           <a:lstStyle/>
           <a:p>
             <a:r>
-              <a:rPr lang="en-US" sz="3600" dirty="0"/>
-              <a:t>Executive Summary: </a:t>
-            </a:r>
-            <a:br>
-              <a:rPr lang="en-US" sz="3600" dirty="0"/>
-            </a:br>
-            <a:r>
-              <a:rPr lang="en-US" sz="3600" dirty="0"/>
-              <a:t>Automotive SDV Software Talent</a:t>
+              <a:rPr lang="en-US" sz="1800" dirty="0"/>
+              <a:t>Executive Summary: Automotive SDV Software Talent</a:t>
             </a:r>
           </a:p>
         </p:txBody>
@@ -6103,8 +7165,8 @@
         </p:nvSpPr>
         <p:spPr>
           <a:xfrm>
-            <a:off x="365760" y="1407828"/>
-            <a:ext cx="8321040" cy="584775"/>
+            <a:off x="296695" y="871053"/>
+            <a:ext cx="8536020" cy="415755"/>
           </a:xfrm>
           <a:prstGeom prst="rect">
             <a:avLst/>
@@ -6121,15 +7183,8 @@
               <a:defRPr sz="1200"/>
             </a:pPr>
             <a:r>
-              <a:rPr lang="en-US" sz="1600" dirty="0"/>
-              <a:t>Securing top software talent is vital for our Software-Defined Vehicle (SDV) strategy. </a:t>
-            </a:r>
-            <a:br>
-              <a:rPr lang="en-US" sz="1600" dirty="0"/>
-            </a:br>
-            <a:r>
-              <a:rPr lang="en-US" sz="1600" dirty="0"/>
-              <a:t>Analysis reveals five key insights.</a:t>
+              <a:rPr lang="en-US" sz="1051" dirty="0"/>
+              <a:t>Securing top software talent is vital for our Software-Defined Vehicle (SDV) strategy. Analysis reveals five key insights across the dimensions Hiring, Attrition and Skills.</a:t>
             </a:r>
           </a:p>
         </p:txBody>
@@ -6148,8 +7203,8 @@
         </p:nvSpPr>
         <p:spPr>
           <a:xfrm>
-            <a:off x="457200" y="2138482"/>
-            <a:ext cx="2433320" cy="838356"/>
+            <a:off x="363935" y="1419043"/>
+            <a:ext cx="1824991" cy="628767"/>
           </a:xfrm>
           <a:prstGeom prst="rect">
             <a:avLst/>
@@ -6180,10 +7235,10 @@
           <a:p>
             <a:pPr algn="ctr"/>
             <a:r>
-              <a:rPr lang="de-DE" sz="3600" dirty="0"/>
+              <a:rPr lang="de-DE" sz="2700" dirty="0"/>
               <a:t>Hiring</a:t>
             </a:r>
-            <a:endParaRPr lang="en-US" sz="3600" dirty="0"/>
+            <a:endParaRPr lang="en-US" sz="2700" dirty="0"/>
           </a:p>
         </p:txBody>
       </p:sp>
@@ -6201,10 +7256,10 @@
         </p:nvGrpSpPr>
         <p:grpSpPr>
           <a:xfrm>
-            <a:off x="3151161" y="2129122"/>
-            <a:ext cx="5685879" cy="784830"/>
+            <a:off x="2403417" y="1412026"/>
+            <a:ext cx="6248618" cy="611963"/>
             <a:chOff x="2864939" y="2144811"/>
-            <a:chExt cx="4572000" cy="784830"/>
+            <a:chExt cx="4572000" cy="815948"/>
           </a:xfrm>
         </p:grpSpPr>
         <p:sp>
@@ -6222,7 +7277,7 @@
           <p:spPr>
             <a:xfrm>
               <a:off x="2864939" y="2406421"/>
-              <a:ext cx="4572000" cy="523220"/>
+              <a:ext cx="4572000" cy="554338"/>
             </a:xfrm>
             <a:prstGeom prst="rect">
               <a:avLst/>
@@ -6239,8 +7294,15 @@
                 <a:defRPr sz="1200"/>
               </a:pPr>
               <a:r>
-                <a:rPr lang="en-US" sz="1400" dirty="0"/>
-                <a:t>Hiring Channels: LinkedIn (40%), Recruiters (27%), Referrals (20%) effective; Career Fairs underperforming post-COVID. </a:t>
+                <a:rPr lang="en-US" sz="1051" dirty="0"/>
+                <a:t>Hiring Channels: LinkedIn (40%), Recruiters (27%), Referrals (20%) effective; </a:t>
+              </a:r>
+              <a:br>
+                <a:rPr lang="en-US" sz="1051" dirty="0"/>
+              </a:br>
+              <a:r>
+                <a:rPr lang="en-US" sz="1051" dirty="0"/>
+                <a:t>Career Fairs underperforming post-COVID. </a:t>
               </a:r>
             </a:p>
           </p:txBody>
@@ -6260,7 +7322,7 @@
           <p:spPr>
             <a:xfrm>
               <a:off x="2864939" y="2144811"/>
-              <a:ext cx="4572000" cy="523220"/>
+              <a:ext cx="4572000" cy="338724"/>
             </a:xfrm>
             <a:prstGeom prst="rect">
               <a:avLst/>
@@ -6274,7 +7336,7 @@
             <a:lstStyle/>
             <a:p>
               <a:r>
-                <a:rPr lang="en-US" sz="1400" dirty="0"/>
+                <a:rPr lang="en-US" sz="1051" dirty="0"/>
                 <a:t>Hiring rose steadily to 2022 but dropped in 2023 due to a hiring freeze.</a:t>
               </a:r>
             </a:p>
@@ -6295,8 +7357,8 @@
         </p:nvSpPr>
         <p:spPr>
           <a:xfrm>
-            <a:off x="457200" y="3400899"/>
-            <a:ext cx="2433320" cy="838800"/>
+            <a:off x="363935" y="2365852"/>
+            <a:ext cx="1824991" cy="629100"/>
           </a:xfrm>
           <a:prstGeom prst="rect">
             <a:avLst/>
@@ -6327,10 +7389,10 @@
           <a:p>
             <a:pPr algn="ctr"/>
             <a:r>
-              <a:rPr lang="de-DE" sz="3600" dirty="0"/>
+              <a:rPr lang="de-DE" sz="2700" dirty="0"/>
               <a:t>Attrition</a:t>
             </a:r>
-            <a:endParaRPr lang="en-US" sz="3600" dirty="0"/>
+            <a:endParaRPr lang="en-US" sz="2700" dirty="0"/>
           </a:p>
         </p:txBody>
       </p:sp>
@@ -6348,10 +7410,10 @@
         </p:nvGrpSpPr>
         <p:grpSpPr>
           <a:xfrm>
-            <a:off x="3151162" y="3323753"/>
-            <a:ext cx="5535638" cy="1019766"/>
+            <a:off x="2403417" y="2308000"/>
+            <a:ext cx="6083509" cy="788167"/>
             <a:chOff x="2864939" y="3785802"/>
-            <a:chExt cx="4572000" cy="1019766"/>
+            <a:chExt cx="4572000" cy="1050888"/>
           </a:xfrm>
         </p:grpSpPr>
         <p:sp>
@@ -6369,7 +7431,7 @@
           <p:spPr>
             <a:xfrm>
               <a:off x="2864939" y="3785802"/>
-              <a:ext cx="4572000" cy="523220"/>
+              <a:ext cx="4572000" cy="554340"/>
             </a:xfrm>
             <a:prstGeom prst="rect">
               <a:avLst/>
@@ -6386,11 +7448,11 @@
                 <a:defRPr sz="1200"/>
               </a:pPr>
               <a:r>
-                <a:rPr lang="en-US" sz="1400" dirty="0"/>
+                <a:rPr lang="en-US" sz="1051" dirty="0"/>
                 <a:t>Attrition (26%) exceeds the 15% target, highest in </a:t>
               </a:r>
               <a:r>
-                <a:rPr lang="en-US" sz="1400" dirty="0">
+                <a:rPr lang="en-US" sz="1051" dirty="0">
                   <a:solidFill>
                     <a:srgbClr val="FF0000"/>
                   </a:solidFill>
@@ -6414,8 +7476,8 @@
           </p:nvSpPr>
           <p:spPr>
             <a:xfrm>
-              <a:off x="2864939" y="4282348"/>
-              <a:ext cx="4572000" cy="523220"/>
+              <a:off x="2864939" y="4282350"/>
+              <a:ext cx="4572000" cy="554340"/>
             </a:xfrm>
             <a:prstGeom prst="rect">
               <a:avLst/>
@@ -6432,7 +7494,7 @@
                 <a:defRPr sz="1200"/>
               </a:pPr>
               <a:r>
-                <a:rPr lang="en-US" sz="1400" dirty="0"/>
+                <a:rPr lang="en-US" sz="1051" dirty="0"/>
                 <a:t>Hiring-to-Attrition: Current hiring does not offset attrition. Planned ramp-up needed to avoid SDV talent gaps.</a:t>
               </a:r>
             </a:p>
@@ -6453,8 +7515,8 @@
         </p:nvSpPr>
         <p:spPr>
           <a:xfrm>
-            <a:off x="457200" y="4617538"/>
-            <a:ext cx="2433320" cy="838800"/>
+            <a:off x="363935" y="3278332"/>
+            <a:ext cx="1824991" cy="629100"/>
           </a:xfrm>
           <a:prstGeom prst="rect">
             <a:avLst/>
@@ -6485,10 +7547,10 @@
           <a:p>
             <a:pPr algn="ctr"/>
             <a:r>
-              <a:rPr lang="de-DE" sz="3600"/>
+              <a:rPr lang="de-DE" sz="2700"/>
               <a:t>Skills</a:t>
             </a:r>
-            <a:endParaRPr lang="en-US" sz="3600" dirty="0"/>
+            <a:endParaRPr lang="en-US" sz="2700" dirty="0"/>
           </a:p>
         </p:txBody>
       </p:sp>
@@ -6506,8 +7568,8 @@
         </p:nvSpPr>
         <p:spPr>
           <a:xfrm>
-            <a:off x="3151162" y="4777961"/>
-            <a:ext cx="5535638" cy="523220"/>
+            <a:off x="2403417" y="3398651"/>
+            <a:ext cx="6083509" cy="415755"/>
           </a:xfrm>
           <a:prstGeom prst="rect">
             <a:avLst/>
@@ -6521,8 +7583,8 @@
           <a:lstStyle/>
           <a:p>
             <a:r>
-              <a:rPr lang="en-US" sz="1400" dirty="0"/>
-              <a:t>65% of employees engaged in upskilling, but alignment with SDV-critical skills needs confirmation. A skills fit-gap analysis is required.</a:t>
+              <a:rPr lang="en-US" sz="1051" dirty="0"/>
+              <a:t>65% of employees engaged in upskilling, but alignment with SDV-critical skills remains unclear. A skills fit-gap analysis is required.</a:t>
             </a:r>
           </a:p>
         </p:txBody>
@@ -6543,8 +7605,8 @@
         </p:nvCxnSpPr>
         <p:spPr>
           <a:xfrm>
-            <a:off x="180000" y="5650523"/>
-            <a:ext cx="8657041" cy="0"/>
+            <a:off x="156035" y="4053070"/>
+            <a:ext cx="8496000" cy="0"/>
           </a:xfrm>
           <a:prstGeom prst="line">
             <a:avLst/>
@@ -6588,8 +7650,8 @@
         </p:nvCxnSpPr>
         <p:spPr>
           <a:xfrm>
-            <a:off x="180000" y="4428618"/>
-            <a:ext cx="8657041" cy="0"/>
+            <a:off x="156035" y="3136642"/>
+            <a:ext cx="8496000" cy="0"/>
           </a:xfrm>
           <a:prstGeom prst="line">
             <a:avLst/>
@@ -6633,8 +7695,8 @@
         </p:nvCxnSpPr>
         <p:spPr>
           <a:xfrm>
-            <a:off x="180000" y="3152606"/>
-            <a:ext cx="8657041" cy="0"/>
+            <a:off x="156035" y="2179632"/>
+            <a:ext cx="8496000" cy="0"/>
           </a:xfrm>
           <a:prstGeom prst="line">
             <a:avLst/>
@@ -6676,41 +7738,48 @@
         </p:nvSpPr>
         <p:spPr>
           <a:xfrm>
-            <a:off x="457199" y="5844709"/>
-            <a:ext cx="8379841" cy="817008"/>
+            <a:off x="363935" y="4383533"/>
+            <a:ext cx="8288100" cy="461665"/>
           </a:xfrm>
           <a:prstGeom prst="rect">
             <a:avLst/>
           </a:prstGeom>
-          <a:ln>
-            <a:noFill/>
+          <a:noFill/>
+          <a:ln w="12700">
+            <a:solidFill>
+              <a:schemeClr val="tx2">
+                <a:lumMod val="75000"/>
+              </a:schemeClr>
+            </a:solidFill>
           </a:ln>
         </p:spPr>
-        <p:style>
-          <a:lnRef idx="2">
-            <a:schemeClr val="accent1">
-              <a:shade val="15000"/>
-            </a:schemeClr>
-          </a:lnRef>
-          <a:fillRef idx="1">
-            <a:schemeClr val="accent1"/>
-          </a:fillRef>
-          <a:effectRef idx="0">
-            <a:schemeClr val="accent1"/>
-          </a:effectRef>
-          <a:fontRef idx="minor">
-            <a:schemeClr val="lt1"/>
-          </a:fontRef>
-        </p:style>
         <p:txBody>
-          <a:bodyPr rtlCol="0" anchor="ctr"/>
+          <a:bodyPr wrap="square">
+            <a:spAutoFit/>
+          </a:bodyPr>
           <a:lstStyle/>
           <a:p>
             <a:pPr algn="ctr"/>
             <a:r>
-              <a:rPr lang="en-US" sz="2400" dirty="0"/>
+              <a:rPr lang="en-US" sz="1200" dirty="0">
+                <a:solidFill>
+                  <a:schemeClr val="tx1"/>
+                </a:solidFill>
+              </a:rPr>
               <a:t>Recommendations: Strengthen retention, align upskilling to gaps, plan proactive hiring, optimize channels.</a:t>
             </a:r>
+          </a:p>
+          <a:p>
+            <a:pPr algn="ctr"/>
+            <a:r>
+              <a:rPr lang="en-US" sz="1200" dirty="0"/>
+              <a:t>Lorem Ipsum</a:t>
+            </a:r>
+            <a:endParaRPr lang="en-US" sz="1200" dirty="0">
+              <a:solidFill>
+                <a:schemeClr val="tx1"/>
+              </a:solidFill>
+            </a:endParaRPr>
           </a:p>
         </p:txBody>
       </p:sp>
@@ -6758,16 +7827,14 @@
         </p:nvSpPr>
         <p:spPr>
           <a:xfrm>
-            <a:off x="457200" y="1032100"/>
-            <a:ext cx="3516086" cy="2501321"/>
+            <a:off x="355060" y="774080"/>
+            <a:ext cx="2581604" cy="1875991"/>
           </a:xfrm>
           <a:prstGeom prst="rect">
             <a:avLst/>
           </a:prstGeom>
           <a:solidFill>
-            <a:schemeClr val="accent1">
-              <a:alpha val="30000"/>
-            </a:schemeClr>
+            <a:srgbClr val="4F81BD"/>
           </a:solidFill>
           <a:ln>
             <a:noFill/>
@@ -6792,12 +7859,12 @@
           <a:lstStyle/>
           <a:p>
             <a:r>
-              <a:rPr lang="en-US" sz="1600" dirty="0">
+              <a:rPr lang="en-US" sz="1300" dirty="0">
                 <a:solidFill>
-                  <a:schemeClr val="tx1"/>
+                  <a:schemeClr val="bg1"/>
                 </a:solidFill>
               </a:rPr>
-              <a:t>Hiring steadily increased from 2018 to 2022 but sharply declined in 2023 due to a hiring freeze caused by a semiconductor shortage in the industry</a:t>
+              <a:t>Hiring steadily increased from 2018-2022 but sharply declined in 2023 due to a hiring freeze caused by a semiconductor shortage in the industry</a:t>
             </a:r>
           </a:p>
         </p:txBody>
@@ -6820,8 +7887,8 @@
         </p:nvSpPr>
         <p:spPr>
           <a:xfrm>
-            <a:off x="457200" y="274638"/>
-            <a:ext cx="8229600" cy="650583"/>
+            <a:off x="295200" y="205984"/>
+            <a:ext cx="8503468" cy="487937"/>
           </a:xfrm>
         </p:spPr>
         <p:txBody>
@@ -6831,7 +7898,7 @@
           <a:lstStyle/>
           <a:p>
             <a:r>
-              <a:rPr lang="en-US" sz="2400" dirty="0"/>
+              <a:rPr lang="en-US" sz="1800" dirty="0"/>
               <a:t>Hiring sufficient SDV Talent has been challenging since COVID</a:t>
             </a:r>
           </a:p>
@@ -6851,8 +7918,8 @@
         </p:nvSpPr>
         <p:spPr>
           <a:xfrm>
-            <a:off x="381450" y="6331743"/>
-            <a:ext cx="8563126" cy="338554"/>
+            <a:off x="295200" y="4748812"/>
+            <a:ext cx="8503468" cy="276999"/>
           </a:xfrm>
           <a:prstGeom prst="rect">
             <a:avLst/>
@@ -6874,8 +7941,8 @@
           <a:p>
             <a:pPr algn="ctr"/>
             <a:r>
-              <a:rPr lang="en-US" sz="1600" dirty="0"/>
-              <a:t>Recommendation: Shift resources from Career Fairs to LinkedIn, Recruiters &amp; Referral Program</a:t>
+              <a:rPr lang="en-US" sz="1200" dirty="0"/>
+              <a:t>Recommendation: Shift resources from Career Fairs to strengthen LinkedIn, Recruiters &amp; Referral Program</a:t>
             </a:r>
           </a:p>
         </p:txBody>
@@ -6894,8 +7961,8 @@
         </p:nvGrpSpPr>
         <p:grpSpPr>
           <a:xfrm>
-            <a:off x="4012576" y="1032102"/>
-            <a:ext cx="4932000" cy="2556000"/>
+            <a:off x="3641731" y="774077"/>
+            <a:ext cx="5015888" cy="1917000"/>
             <a:chOff x="0" y="0"/>
             <a:chExt cx="4469020" cy="2771913"/>
           </a:xfrm>
@@ -6913,7 +7980,7 @@
             <p:nvPr>
               <p:extLst>
                 <p:ext uri="{D42A27DB-BD31-4B8C-83A1-F6EECF244321}">
-                  <p14:modId xmlns:p14="http://schemas.microsoft.com/office/powerpoint/2010/main" val="1773273451"/>
+                  <p14:modId xmlns:p14="http://schemas.microsoft.com/office/powerpoint/2010/main" val="3374563705"/>
                 </p:ext>
               </p:extLst>
             </p:nvPr>
@@ -7068,26 +8135,13 @@
             <a:p>
               <a:pPr algn="ctr"/>
               <a:r>
-                <a:rPr lang="en-US" sz="1100" b="0">
+                <a:rPr lang="en-US" sz="825">
                   <a:solidFill>
                     <a:sysClr val="windowText" lastClr="000000"/>
                   </a:solidFill>
                 </a:rPr>
-                <a:t>Hiring</a:t>
+                <a:t>Hiring freeze</a:t>
               </a:r>
-              <a:r>
-                <a:rPr lang="en-US" sz="1100" b="0" baseline="0">
-                  <a:solidFill>
-                    <a:sysClr val="windowText" lastClr="000000"/>
-                  </a:solidFill>
-                </a:rPr>
-                <a:t> freeze</a:t>
-              </a:r>
-              <a:endParaRPr lang="en-US" sz="1100" b="0">
-                <a:solidFill>
-                  <a:sysClr val="windowText" lastClr="000000"/>
-                </a:solidFill>
-              </a:endParaRPr>
             </a:p>
           </p:txBody>
         </p:sp>
@@ -7195,14 +8249,14 @@
           <p:nvPr>
             <p:extLst>
               <p:ext uri="{D42A27DB-BD31-4B8C-83A1-F6EECF244321}">
-                <p14:modId xmlns:p14="http://schemas.microsoft.com/office/powerpoint/2010/main" val="1291051380"/>
+                <p14:modId xmlns:p14="http://schemas.microsoft.com/office/powerpoint/2010/main" val="3542146859"/>
               </p:ext>
             </p:extLst>
           </p:nvPr>
         </p:nvGraphicFramePr>
         <p:xfrm>
-          <a:off x="4109764" y="3825150"/>
-          <a:ext cx="4702222" cy="2385672"/>
+          <a:off x="3641731" y="2868867"/>
+          <a:ext cx="4869973" cy="1789255"/>
         </p:xfrm>
         <a:graphic>
           <a:graphicData uri="http://schemas.openxmlformats.org/drawingml/2006/chart">
@@ -7224,16 +8278,14 @@
         </p:nvSpPr>
         <p:spPr>
           <a:xfrm>
-            <a:off x="457200" y="3825150"/>
-            <a:ext cx="3516086" cy="2385672"/>
+            <a:off x="345332" y="2868867"/>
+            <a:ext cx="2581604" cy="1789255"/>
           </a:xfrm>
           <a:prstGeom prst="rect">
             <a:avLst/>
           </a:prstGeom>
           <a:solidFill>
-            <a:schemeClr val="accent1">
-              <a:alpha val="30000"/>
-            </a:schemeClr>
+            <a:srgbClr val="4F81BD"/>
           </a:solidFill>
           <a:ln>
             <a:noFill/>
@@ -7258,37 +8310,30 @@
           <a:lstStyle/>
           <a:p>
             <a:r>
-              <a:rPr lang="en-US" sz="1600" dirty="0">
+              <a:rPr lang="en-US" sz="1300" dirty="0">
                 <a:solidFill>
-                  <a:schemeClr val="tx1"/>
+                  <a:schemeClr val="bg1"/>
                 </a:solidFill>
               </a:rPr>
-              <a:t>LinkedIn drives ~40% of all hires, with Recruiters contributing ~27% and the Referral Program ~20%.</a:t>
-            </a:r>
-          </a:p>
-          <a:p>
-            <a:endParaRPr lang="en-US" sz="1600" dirty="0">
+              <a:t>LinkedIn drives ~40% of all hires, with Recruiters contributing ~27% and the Referral Program ~20%</a:t>
+            </a:r>
+          </a:p>
+          <a:p>
+            <a:endParaRPr lang="en-US" sz="1300" dirty="0">
               <a:solidFill>
-                <a:schemeClr val="tx1"/>
+                <a:schemeClr val="bg1"/>
               </a:solidFill>
             </a:endParaRPr>
           </a:p>
           <a:p>
             <a:r>
-              <a:rPr lang="en-US" sz="1600" dirty="0">
+              <a:rPr lang="en-US" sz="1300" dirty="0">
                 <a:solidFill>
-                  <a:schemeClr val="tx1"/>
+                  <a:schemeClr val="bg1"/>
                 </a:solidFill>
               </a:rPr>
-              <a:t>Career Fairs contribute only ~14% overall and have underperformed post-COVID, particularly in Asia-Pacific.</a:t>
-            </a:r>
-          </a:p>
-          <a:p>
-            <a:endParaRPr lang="en-US" sz="1600" dirty="0">
-              <a:solidFill>
-                <a:schemeClr val="tx1"/>
-              </a:solidFill>
-            </a:endParaRPr>
+              <a:t>Career Fairs contribute only ~14% overall and have underperformed post-COVID</a:t>
+            </a:r>
           </a:p>
         </p:txBody>
       </p:sp>
@@ -7342,64 +8387,126 @@
         </p:nvSpPr>
         <p:spPr>
           <a:xfrm>
-            <a:off x="370629" y="1762245"/>
-            <a:ext cx="4011998" cy="4247317"/>
+            <a:off x="295200" y="2996801"/>
+            <a:ext cx="3008999" cy="1200329"/>
           </a:xfrm>
           <a:prstGeom prst="rect">
             <a:avLst/>
           </a:prstGeom>
-          <a:noFill/>
+          <a:solidFill>
+            <a:srgbClr val="4F81BD"/>
+          </a:solidFill>
+          <a:ln>
+            <a:noFill/>
+          </a:ln>
         </p:spPr>
+        <p:style>
+          <a:lnRef idx="0">
+            <a:scrgbClr r="0" g="0" b="0"/>
+          </a:lnRef>
+          <a:fillRef idx="0">
+            <a:scrgbClr r="0" g="0" b="0"/>
+          </a:fillRef>
+          <a:effectRef idx="0">
+            <a:scrgbClr r="0" g="0" b="0"/>
+          </a:effectRef>
+          <a:fontRef idx="minor">
+            <a:schemeClr val="lt1"/>
+          </a:fontRef>
+        </p:style>
         <p:txBody>
-          <a:bodyPr wrap="square">
-            <a:spAutoFit/>
-          </a:bodyPr>
-          <a:lstStyle/>
-          <a:p>
+          <a:bodyPr rtlCol="0" anchor="ctr"/>
+          <a:lstStyle>
+            <a:defPPr>
+              <a:defRPr lang="en-US"/>
+            </a:defPPr>
+            <a:lvl1pPr>
+              <a:defRPr sz="1300">
+                <a:solidFill>
+                  <a:schemeClr val="bg1"/>
+                </a:solidFill>
+              </a:defRPr>
+            </a:lvl1pPr>
+            <a:lvl2pPr>
+              <a:defRPr>
+                <a:solidFill>
+                  <a:schemeClr val="lt1"/>
+                </a:solidFill>
+              </a:defRPr>
+            </a:lvl2pPr>
+            <a:lvl3pPr>
+              <a:defRPr>
+                <a:solidFill>
+                  <a:schemeClr val="lt1"/>
+                </a:solidFill>
+              </a:defRPr>
+            </a:lvl3pPr>
+            <a:lvl4pPr>
+              <a:defRPr>
+                <a:solidFill>
+                  <a:schemeClr val="lt1"/>
+                </a:solidFill>
+              </a:defRPr>
+            </a:lvl4pPr>
+            <a:lvl5pPr>
+              <a:defRPr>
+                <a:solidFill>
+                  <a:schemeClr val="lt1"/>
+                </a:solidFill>
+              </a:defRPr>
+            </a:lvl5pPr>
+            <a:lvl6pPr>
+              <a:defRPr>
+                <a:solidFill>
+                  <a:schemeClr val="lt1"/>
+                </a:solidFill>
+              </a:defRPr>
+            </a:lvl6pPr>
+            <a:lvl7pPr>
+              <a:defRPr>
+                <a:solidFill>
+                  <a:schemeClr val="lt1"/>
+                </a:solidFill>
+              </a:defRPr>
+            </a:lvl7pPr>
+            <a:lvl8pPr>
+              <a:defRPr>
+                <a:solidFill>
+                  <a:schemeClr val="lt1"/>
+                </a:solidFill>
+              </a:defRPr>
+            </a:lvl8pPr>
+            <a:lvl9pPr>
+              <a:defRPr>
+                <a:solidFill>
+                  <a:schemeClr val="lt1"/>
+                </a:solidFill>
+              </a:defRPr>
+            </a:lvl9pPr>
+          </a:lstStyle>
+          <a:p>
+            <a:endParaRPr lang="en-US" dirty="0"/>
+          </a:p>
+          <a:p>
+            <a:r>
+              <a:rPr lang="en-US"/>
+              <a:t>Attrition </a:t>
+            </a:r>
             <a:r>
               <a:rPr lang="en-US" dirty="0"/>
-              <a:t>Hiring-to-Attrition Ratio</a:t>
-            </a:r>
-          </a:p>
-          <a:p>
-            <a:pPr marL="285750" indent="-285750">
-              <a:buFont typeface="Arial" panose="020B0604020202020204" pitchFamily="34" charset="0"/>
-              <a:buChar char="•"/>
-            </a:pPr>
+              <a:t>is highest in NA (30%), lowest in APAC (22%), with EU in between (25%).</a:t>
+            </a:r>
+          </a:p>
+          <a:p>
             <a:r>
               <a:rPr lang="en-US" dirty="0"/>
-              <a:t>Attrition stands at 26% over 5.5 years — well above the 15% company target.</a:t>
-            </a:r>
-          </a:p>
-          <a:p>
-            <a:pPr marL="285750" indent="-285750">
-              <a:buFont typeface="Arial" panose="020B0604020202020204" pitchFamily="34" charset="0"/>
-              <a:buChar char="•"/>
-            </a:pPr>
-            <a:r>
-              <a:rPr lang="en-US" dirty="0"/>
-              <a:t>Attrition is highest in NA (30%), lowest in APAC (22%), with EU in between (25%).</a:t>
-            </a:r>
-          </a:p>
-          <a:p>
-            <a:pPr marL="285750" indent="-285750">
-              <a:buFont typeface="Arial" panose="020B0604020202020204" pitchFamily="34" charset="0"/>
-              <a:buChar char="•"/>
-            </a:pPr>
-            <a:r>
-              <a:rPr lang="en-US" dirty="0"/>
-              <a:t>High attrition is seen in Embedded Systems, Cloud Engineering, and Infotainment, mainly driven by lack of growth opportunities, better external offers, and personal reasons.</a:t>
-            </a:r>
-          </a:p>
-          <a:p>
-            <a:pPr marL="285750" indent="-285750">
-              <a:buFont typeface="Arial" panose="020B0604020202020204" pitchFamily="34" charset="0"/>
-              <a:buChar char="•"/>
-            </a:pPr>
-            <a:r>
-              <a:rPr lang="en-US" dirty="0"/>
-              <a:t>&gt;50% of Attrition were in an onsite work arrangement followed by remote (40) and hybrid (25) </a:t>
-            </a:r>
+              <a:t>High attrition is seen in Embedded Systems, Cloud Engineering, </a:t>
+            </a:r>
+            <a:r>
+              <a:rPr lang="en-US"/>
+              <a:t>and Infotainment</a:t>
+            </a:r>
+            <a:endParaRPr lang="en-US" dirty="0"/>
           </a:p>
         </p:txBody>
       </p:sp>
@@ -7421,8 +8528,8 @@
         </p:nvSpPr>
         <p:spPr>
           <a:xfrm>
-            <a:off x="457200" y="274638"/>
-            <a:ext cx="8229600" cy="650583"/>
+            <a:off x="295200" y="205984"/>
+            <a:ext cx="8401328" cy="487937"/>
           </a:xfrm>
         </p:spPr>
         <p:txBody>
@@ -7432,55 +8539,8 @@
           <a:lstStyle/>
           <a:p>
             <a:r>
-              <a:rPr lang="en-US" sz="2400" dirty="0"/>
-              <a:t>Attrition is at a critical high across regions and departments resulting in a shrinking work force globally</a:t>
-            </a:r>
-          </a:p>
-        </p:txBody>
-      </p:sp>
-      <p:sp>
-        <p:nvSpPr>
-          <p:cNvPr id="11" name="Rectangle 10">
-            <a:extLst>
-              <a:ext uri="{FF2B5EF4-FFF2-40B4-BE49-F238E27FC236}">
-                <a16:creationId xmlns:a16="http://schemas.microsoft.com/office/drawing/2014/main" id="{55DBBD23-7062-090F-AD79-15F0AA929900}"/>
-              </a:ext>
-            </a:extLst>
-          </p:cNvPr>
-          <p:cNvSpPr/>
-          <p:nvPr/>
-        </p:nvSpPr>
-        <p:spPr>
-          <a:xfrm>
-            <a:off x="5269973" y="1533367"/>
-            <a:ext cx="3598083" cy="4290646"/>
-          </a:xfrm>
-          <a:prstGeom prst="rect">
-            <a:avLst/>
-          </a:prstGeom>
-        </p:spPr>
-        <p:style>
-          <a:lnRef idx="1">
-            <a:schemeClr val="accent1"/>
-          </a:lnRef>
-          <a:fillRef idx="3">
-            <a:schemeClr val="accent1"/>
-          </a:fillRef>
-          <a:effectRef idx="2">
-            <a:schemeClr val="accent1"/>
-          </a:effectRef>
-          <a:fontRef idx="minor">
-            <a:schemeClr val="lt1"/>
-          </a:fontRef>
-        </p:style>
-        <p:txBody>
-          <a:bodyPr rtlCol="0" anchor="ctr"/>
-          <a:lstStyle/>
-          <a:p>
-            <a:pPr algn="ctr"/>
-            <a:r>
-              <a:rPr lang="en-US" dirty="0"/>
-              <a:t>Chart</a:t>
+              <a:rPr lang="en-US" sz="1800" dirty="0"/>
+              <a:t>Attrition increased to a critical high whilst hiring sharply decreased resulting in a shrinking work force globally</a:t>
             </a:r>
           </a:p>
         </p:txBody>
@@ -7499,8 +8559,8 @@
         </p:nvSpPr>
         <p:spPr>
           <a:xfrm>
-            <a:off x="381450" y="6139771"/>
-            <a:ext cx="8563126" cy="584775"/>
+            <a:off x="295200" y="4604833"/>
+            <a:ext cx="8401328" cy="276999"/>
           </a:xfrm>
           <a:prstGeom prst="rect">
             <a:avLst/>
@@ -7521,9 +8581,171 @@
           <a:lstStyle/>
           <a:p>
             <a:r>
-              <a:rPr lang="en-US" sz="1600" dirty="0"/>
+              <a:rPr lang="en-US" sz="1200" dirty="0"/>
               <a:t>Implication: Scenario plan for proactive hiring once market conditions stabilize to close emerging talent gaps.</a:t>
             </a:r>
+          </a:p>
+        </p:txBody>
+      </p:sp>
+      <p:graphicFrame>
+        <p:nvGraphicFramePr>
+          <p:cNvPr id="3" name="Chart 2">
+            <a:extLst>
+              <a:ext uri="{FF2B5EF4-FFF2-40B4-BE49-F238E27FC236}">
+                <a16:creationId xmlns:a16="http://schemas.microsoft.com/office/drawing/2014/main" id="{563EE209-7255-8D56-6E45-2CA9E18A08B5}"/>
+              </a:ext>
+            </a:extLst>
+          </p:cNvPr>
+          <p:cNvGraphicFramePr>
+            <a:graphicFrameLocks/>
+          </p:cNvGraphicFramePr>
+          <p:nvPr>
+            <p:extLst>
+              <p:ext uri="{D42A27DB-BD31-4B8C-83A1-F6EECF244321}">
+                <p14:modId xmlns:p14="http://schemas.microsoft.com/office/powerpoint/2010/main" val="2409632444"/>
+              </p:ext>
+            </p:extLst>
+          </p:nvPr>
+        </p:nvGraphicFramePr>
+        <p:xfrm>
+          <a:off x="3530165" y="990349"/>
+          <a:ext cx="5166363" cy="2069009"/>
+        </p:xfrm>
+        <a:graphic>
+          <a:graphicData uri="http://schemas.openxmlformats.org/drawingml/2006/chart">
+            <c:chart xmlns:c="http://schemas.openxmlformats.org/drawingml/2006/chart" xmlns:r="http://schemas.openxmlformats.org/officeDocument/2006/relationships" r:id="rId2"/>
+          </a:graphicData>
+        </a:graphic>
+      </p:graphicFrame>
+      <p:sp>
+        <p:nvSpPr>
+          <p:cNvPr id="4" name="Rectangle 3">
+            <a:extLst>
+              <a:ext uri="{FF2B5EF4-FFF2-40B4-BE49-F238E27FC236}">
+                <a16:creationId xmlns:a16="http://schemas.microsoft.com/office/drawing/2014/main" id="{E3A270CC-2FB1-04AD-1FD6-91D730EF0B79}"/>
+              </a:ext>
+            </a:extLst>
+          </p:cNvPr>
+          <p:cNvSpPr/>
+          <p:nvPr/>
+        </p:nvSpPr>
+        <p:spPr>
+          <a:xfrm>
+            <a:off x="295200" y="990345"/>
+            <a:ext cx="2637065" cy="1517836"/>
+          </a:xfrm>
+          <a:prstGeom prst="rect">
+            <a:avLst/>
+          </a:prstGeom>
+          <a:solidFill>
+            <a:srgbClr val="4F81BD"/>
+          </a:solidFill>
+          <a:ln>
+            <a:noFill/>
+          </a:ln>
+        </p:spPr>
+        <p:style>
+          <a:lnRef idx="0">
+            <a:scrgbClr r="0" g="0" b="0"/>
+          </a:lnRef>
+          <a:fillRef idx="0">
+            <a:scrgbClr r="0" g="0" b="0"/>
+          </a:fillRef>
+          <a:effectRef idx="0">
+            <a:scrgbClr r="0" g="0" b="0"/>
+          </a:effectRef>
+          <a:fontRef idx="minor">
+            <a:schemeClr val="lt1"/>
+          </a:fontRef>
+        </p:style>
+        <p:txBody>
+          <a:bodyPr rtlCol="0" anchor="ctr"/>
+          <a:lstStyle/>
+          <a:p>
+            <a:r>
+              <a:rPr lang="en-US" sz="1300" dirty="0">
+                <a:solidFill>
+                  <a:schemeClr val="bg1"/>
+                </a:solidFill>
+              </a:rPr>
+              <a:t>Attrition stands at 26% over 5.5 years — well above the 15% company target</a:t>
+            </a:r>
+          </a:p>
+          <a:p>
+            <a:endParaRPr lang="en-US" sz="1300" dirty="0">
+              <a:solidFill>
+                <a:schemeClr val="bg1"/>
+              </a:solidFill>
+            </a:endParaRPr>
+          </a:p>
+        </p:txBody>
+      </p:sp>
+      <p:sp>
+        <p:nvSpPr>
+          <p:cNvPr id="6" name="Rectangle 5">
+            <a:extLst>
+              <a:ext uri="{FF2B5EF4-FFF2-40B4-BE49-F238E27FC236}">
+                <a16:creationId xmlns:a16="http://schemas.microsoft.com/office/drawing/2014/main" id="{9CA03AD3-7D7A-B425-FAFC-754EB2AFC623}"/>
+              </a:ext>
+            </a:extLst>
+          </p:cNvPr>
+          <p:cNvSpPr/>
+          <p:nvPr/>
+        </p:nvSpPr>
+        <p:spPr>
+          <a:xfrm>
+            <a:off x="4859185" y="2996801"/>
+            <a:ext cx="2637065" cy="1517836"/>
+          </a:xfrm>
+          <a:prstGeom prst="rect">
+            <a:avLst/>
+          </a:prstGeom>
+          <a:solidFill>
+            <a:srgbClr val="4F81BD"/>
+          </a:solidFill>
+          <a:ln>
+            <a:noFill/>
+          </a:ln>
+        </p:spPr>
+        <p:style>
+          <a:lnRef idx="0">
+            <a:scrgbClr r="0" g="0" b="0"/>
+          </a:lnRef>
+          <a:fillRef idx="0">
+            <a:scrgbClr r="0" g="0" b="0"/>
+          </a:fillRef>
+          <a:effectRef idx="0">
+            <a:scrgbClr r="0" g="0" b="0"/>
+          </a:effectRef>
+          <a:fontRef idx="minor">
+            <a:schemeClr val="lt1"/>
+          </a:fontRef>
+        </p:style>
+        <p:txBody>
+          <a:bodyPr rtlCol="0" anchor="ctr"/>
+          <a:lstStyle/>
+          <a:p>
+            <a:r>
+              <a:rPr lang="en-US" sz="1300" dirty="0">
+                <a:solidFill>
+                  <a:schemeClr val="bg1"/>
+                </a:solidFill>
+              </a:rPr>
+              <a:t>TODO: Attrition across regions </a:t>
+            </a:r>
+            <a:r>
+              <a:rPr lang="en-US" sz="1300">
+                <a:solidFill>
+                  <a:schemeClr val="bg1"/>
+                </a:solidFill>
+              </a:rPr>
+              <a:t>and departments</a:t>
+            </a:r>
+            <a:endParaRPr lang="en-US" sz="1300" dirty="0">
+              <a:solidFill>
+                <a:schemeClr val="bg1"/>
+              </a:solidFill>
+            </a:endParaRPr>
           </a:p>
         </p:txBody>
       </p:sp>
@@ -7545,7 +8767,13 @@
   <p:cSld>
     <p:spTree>
       <p:nvGrpSpPr>
-        <p:cNvPr id="1" name=""/>
+        <p:cNvPr id="1" name="">
+          <a:extLst>
+            <a:ext uri="{FF2B5EF4-FFF2-40B4-BE49-F238E27FC236}">
+              <a16:creationId xmlns:a16="http://schemas.microsoft.com/office/drawing/2014/main" id="{2EE2EAEF-9449-C0F1-6DF2-7F4643AF9206}"/>
+            </a:ext>
+          </a:extLst>
+        </p:cNvPr>
         <p:cNvGrpSpPr/>
         <p:nvPr/>
       </p:nvGrpSpPr>
@@ -7562,7 +8790,7 @@
           <p:cNvPr id="5" name="TextBox 4">
             <a:extLst>
               <a:ext uri="{FF2B5EF4-FFF2-40B4-BE49-F238E27FC236}">
-                <a16:creationId xmlns:a16="http://schemas.microsoft.com/office/drawing/2014/main" id="{28EFEA92-B0BC-F21F-25FF-D348C079300A}"/>
+                <a16:creationId xmlns:a16="http://schemas.microsoft.com/office/drawing/2014/main" id="{41DC8EEB-5B76-F423-FB33-577E7C0B37AB}"/>
               </a:ext>
             </a:extLst>
           </p:cNvPr>
@@ -7571,8 +8799,8 @@
         </p:nvSpPr>
         <p:spPr>
           <a:xfrm>
-            <a:off x="427441" y="1799064"/>
-            <a:ext cx="4572000" cy="2862322"/>
+            <a:off x="1429092" y="689971"/>
+            <a:ext cx="3008999" cy="1384995"/>
           </a:xfrm>
           <a:prstGeom prst="rect">
             <a:avLst/>
@@ -7585,39 +8813,26 @@
           </a:bodyPr>
           <a:lstStyle/>
           <a:p>
-            <a:r>
-              <a:rPr lang="en-US" dirty="0"/>
-              <a:t>2️⃣ Upskilling &amp; Training Effectiveness</a:t>
-            </a:r>
-          </a:p>
-          <a:p>
-            <a:pPr marL="285750" indent="-285750">
+            <a:endParaRPr lang="en-US" sz="1200" dirty="0"/>
+          </a:p>
+          <a:p>
+            <a:pPr marL="214303" indent="-214303">
               <a:buFont typeface="Arial" panose="020B0604020202020204" pitchFamily="34" charset="0"/>
               <a:buChar char="•"/>
             </a:pPr>
             <a:r>
-              <a:rPr lang="en-US" dirty="0"/>
-              <a:t>65% of employees have completed or are in progress with upskilling programs.</a:t>
-            </a:r>
-          </a:p>
-          <a:p>
-            <a:pPr marL="285750" indent="-285750">
+              <a:rPr lang="en-US" sz="1200" dirty="0"/>
+              <a:t>mainly driven by lack of growth opportunities, better external offers, and personal reasons.</a:t>
+            </a:r>
+          </a:p>
+          <a:p>
+            <a:pPr marL="214303" indent="-214303">
               <a:buFont typeface="Arial" panose="020B0604020202020204" pitchFamily="34" charset="0"/>
               <a:buChar char="•"/>
             </a:pPr>
             <a:r>
-              <a:rPr lang="en-US" dirty="0"/>
-              <a:t>However, current tracking does not confirm if newly acquired skills match SDV-critical needs.</a:t>
-            </a:r>
-          </a:p>
-          <a:p>
-            <a:pPr marL="285750" indent="-285750">
-              <a:buFont typeface="Arial" panose="020B0604020202020204" pitchFamily="34" charset="0"/>
-              <a:buChar char="•"/>
-            </a:pPr>
-            <a:r>
-              <a:rPr lang="en-US" dirty="0"/>
-              <a:t>Next step: A deeper fit-gap analysis with the skills database is required to measure upskilling ROI and coverage of critical skill areas.</a:t>
+              <a:rPr lang="en-US" sz="1200" dirty="0"/>
+              <a:t>&gt;50% of Attrition were in an onsite work arrangement followed by remote (40) and hybrid (25) </a:t>
             </a:r>
           </a:p>
         </p:txBody>
@@ -7627,95 +8842,32 @@
           <p:cNvPr id="8" name="Title 1">
             <a:extLst>
               <a:ext uri="{FF2B5EF4-FFF2-40B4-BE49-F238E27FC236}">
-                <a16:creationId xmlns:a16="http://schemas.microsoft.com/office/drawing/2014/main" id="{7F5074A6-FF71-1B0F-A4E5-870F98D997B1}"/>
+                <a16:creationId xmlns:a16="http://schemas.microsoft.com/office/drawing/2014/main" id="{D922413E-6991-6E4A-CE38-EFE9DC18C6D0}"/>
               </a:ext>
             </a:extLst>
           </p:cNvPr>
-          <p:cNvSpPr txBox="1">
-            <a:spLocks/>
+          <p:cNvSpPr>
+            <a:spLocks noGrp="1"/>
           </p:cNvSpPr>
-          <p:nvPr/>
+          <p:nvPr>
+            <p:ph type="title"/>
+          </p:nvPr>
         </p:nvSpPr>
         <p:spPr>
           <a:xfrm>
-            <a:off x="457200" y="274638"/>
-            <a:ext cx="8229600" cy="650583"/>
+            <a:off x="295200" y="205984"/>
+            <a:ext cx="6172200" cy="487937"/>
           </a:xfrm>
-          <a:prstGeom prst="rect">
-            <a:avLst/>
-          </a:prstGeom>
         </p:spPr>
         <p:txBody>
-          <a:bodyPr vert="horz" lIns="91440" tIns="45720" rIns="91440" bIns="45720" rtlCol="0" anchor="ctr">
+          <a:bodyPr>
             <a:noAutofit/>
           </a:bodyPr>
-          <a:lstStyle>
-            <a:lvl1pPr algn="ctr" defTabSz="457200" rtl="0" eaLnBrk="1" latinLnBrk="0" hangingPunct="1">
-              <a:spcBef>
-                <a:spcPct val="0"/>
-              </a:spcBef>
-              <a:buNone/>
-              <a:defRPr sz="4400" kern="1200">
-                <a:solidFill>
-                  <a:schemeClr val="tx1"/>
-                </a:solidFill>
-                <a:latin typeface="+mj-lt"/>
-                <a:ea typeface="+mj-ea"/>
-                <a:cs typeface="+mj-cs"/>
-              </a:defRPr>
-            </a:lvl1pPr>
-          </a:lstStyle>
-          <a:p>
-            <a:r>
-              <a:rPr lang="en-US" sz="2400" dirty="0"/>
-              <a:t>Re- &amp; upskilling programs are utilized by the majority however it remains unclear the skills match the gap</a:t>
-            </a:r>
-          </a:p>
-        </p:txBody>
-      </p:sp>
-      <p:sp>
-        <p:nvSpPr>
-          <p:cNvPr id="11" name="Rectangle 10">
-            <a:extLst>
-              <a:ext uri="{FF2B5EF4-FFF2-40B4-BE49-F238E27FC236}">
-                <a16:creationId xmlns:a16="http://schemas.microsoft.com/office/drawing/2014/main" id="{3AB01521-C2C7-C364-44F3-84C048872A45}"/>
-              </a:ext>
-            </a:extLst>
-          </p:cNvPr>
-          <p:cNvSpPr/>
-          <p:nvPr/>
-        </p:nvSpPr>
-        <p:spPr>
-          <a:xfrm>
-            <a:off x="5269973" y="1533367"/>
-            <a:ext cx="3598083" cy="4290646"/>
-          </a:xfrm>
-          <a:prstGeom prst="rect">
-            <a:avLst/>
-          </a:prstGeom>
-        </p:spPr>
-        <p:style>
-          <a:lnRef idx="1">
-            <a:schemeClr val="accent1"/>
-          </a:lnRef>
-          <a:fillRef idx="3">
-            <a:schemeClr val="accent1"/>
-          </a:fillRef>
-          <a:effectRef idx="2">
-            <a:schemeClr val="accent1"/>
-          </a:effectRef>
-          <a:fontRef idx="minor">
-            <a:schemeClr val="lt1"/>
-          </a:fontRef>
-        </p:style>
-        <p:txBody>
-          <a:bodyPr rtlCol="0" anchor="ctr"/>
           <a:lstStyle/>
           <a:p>
-            <a:pPr algn="ctr"/>
-            <a:r>
-              <a:rPr lang="en-US" dirty="0"/>
-              <a:t>Chart</a:t>
+            <a:r>
+              <a:rPr lang="en-US" sz="1800" dirty="0"/>
+              <a:t>TODO: Cause of Attrition and also Work Arrangement Onsite</a:t>
             </a:r>
           </a:p>
         </p:txBody>
@@ -7725,7 +8877,7 @@
           <p:cNvPr id="2" name="TextBox 1">
             <a:extLst>
               <a:ext uri="{FF2B5EF4-FFF2-40B4-BE49-F238E27FC236}">
-                <a16:creationId xmlns:a16="http://schemas.microsoft.com/office/drawing/2014/main" id="{9C3E8682-77BA-3E08-CE08-E46B6C4C0E75}"/>
+                <a16:creationId xmlns:a16="http://schemas.microsoft.com/office/drawing/2014/main" id="{142030CD-2EC9-9DAD-DA5D-4247FC3FD0B9}"/>
               </a:ext>
             </a:extLst>
           </p:cNvPr>
@@ -7734,8 +8886,8 @@
         </p:nvSpPr>
         <p:spPr>
           <a:xfrm>
-            <a:off x="381450" y="6331743"/>
-            <a:ext cx="8563126" cy="338554"/>
+            <a:off x="1429091" y="4604833"/>
+            <a:ext cx="6422345" cy="461665"/>
           </a:xfrm>
           <a:prstGeom prst="rect">
             <a:avLst/>
@@ -7756,8 +8908,124 @@
           <a:lstStyle/>
           <a:p>
             <a:r>
-              <a:rPr lang="en-US" sz="1600" dirty="0"/>
-              <a:t>Implication: Align upskilling investments with actual SDV skill gaps and role requirements.</a:t>
+              <a:rPr lang="en-US" sz="1200" dirty="0"/>
+              <a:t>Implication: Scenario plan for proactive hiring once market conditions stabilize to close emerging talent gaps.</a:t>
+            </a:r>
+          </a:p>
+        </p:txBody>
+      </p:sp>
+      <p:sp>
+        <p:nvSpPr>
+          <p:cNvPr id="6" name="Rectangle 5">
+            <a:extLst>
+              <a:ext uri="{FF2B5EF4-FFF2-40B4-BE49-F238E27FC236}">
+                <a16:creationId xmlns:a16="http://schemas.microsoft.com/office/drawing/2014/main" id="{6843D364-74CC-894E-F56F-745245352C0F}"/>
+              </a:ext>
+            </a:extLst>
+          </p:cNvPr>
+          <p:cNvSpPr/>
+          <p:nvPr/>
+        </p:nvSpPr>
+        <p:spPr>
+          <a:xfrm>
+            <a:off x="4886775" y="817218"/>
+            <a:ext cx="2637065" cy="1517836"/>
+          </a:xfrm>
+          <a:prstGeom prst="rect">
+            <a:avLst/>
+          </a:prstGeom>
+          <a:solidFill>
+            <a:schemeClr val="accent1">
+              <a:alpha val="30000"/>
+            </a:schemeClr>
+          </a:solidFill>
+          <a:ln>
+            <a:noFill/>
+          </a:ln>
+        </p:spPr>
+        <p:style>
+          <a:lnRef idx="0">
+            <a:scrgbClr r="0" g="0" b="0"/>
+          </a:lnRef>
+          <a:fillRef idx="0">
+            <a:scrgbClr r="0" g="0" b="0"/>
+          </a:fillRef>
+          <a:effectRef idx="0">
+            <a:scrgbClr r="0" g="0" b="0"/>
+          </a:effectRef>
+          <a:fontRef idx="minor">
+            <a:schemeClr val="lt1"/>
+          </a:fontRef>
+        </p:style>
+        <p:txBody>
+          <a:bodyPr rtlCol="0" anchor="ctr"/>
+          <a:lstStyle/>
+          <a:p>
+            <a:r>
+              <a:rPr lang="en-US" sz="1200" dirty="0">
+                <a:solidFill>
+                  <a:schemeClr val="tx1"/>
+                </a:solidFill>
+              </a:rPr>
+              <a:t>TODO: Reasons</a:t>
+            </a:r>
+          </a:p>
+        </p:txBody>
+      </p:sp>
+      <p:sp>
+        <p:nvSpPr>
+          <p:cNvPr id="7" name="Rectangle 6">
+            <a:extLst>
+              <a:ext uri="{FF2B5EF4-FFF2-40B4-BE49-F238E27FC236}">
+                <a16:creationId xmlns:a16="http://schemas.microsoft.com/office/drawing/2014/main" id="{148E8A0B-EE2F-CE3C-696D-3C3996AEEF53}"/>
+              </a:ext>
+            </a:extLst>
+          </p:cNvPr>
+          <p:cNvSpPr/>
+          <p:nvPr/>
+        </p:nvSpPr>
+        <p:spPr>
+          <a:xfrm>
+            <a:off x="4886775" y="2523836"/>
+            <a:ext cx="2637065" cy="1517836"/>
+          </a:xfrm>
+          <a:prstGeom prst="rect">
+            <a:avLst/>
+          </a:prstGeom>
+          <a:solidFill>
+            <a:schemeClr val="accent1">
+              <a:alpha val="30000"/>
+            </a:schemeClr>
+          </a:solidFill>
+          <a:ln>
+            <a:noFill/>
+          </a:ln>
+        </p:spPr>
+        <p:style>
+          <a:lnRef idx="0">
+            <a:scrgbClr r="0" g="0" b="0"/>
+          </a:lnRef>
+          <a:fillRef idx="0">
+            <a:scrgbClr r="0" g="0" b="0"/>
+          </a:fillRef>
+          <a:effectRef idx="0">
+            <a:scrgbClr r="0" g="0" b="0"/>
+          </a:effectRef>
+          <a:fontRef idx="minor">
+            <a:schemeClr val="lt1"/>
+          </a:fontRef>
+        </p:style>
+        <p:txBody>
+          <a:bodyPr rtlCol="0" anchor="ctr"/>
+          <a:lstStyle/>
+          <a:p>
+            <a:r>
+              <a:rPr lang="en-US" sz="1200" dirty="0">
+                <a:solidFill>
+                  <a:schemeClr val="tx1"/>
+                </a:solidFill>
+              </a:rPr>
+              <a:t>TODO: Work Arrangement</a:t>
             </a:r>
           </a:p>
         </p:txBody>
@@ -7765,7 +9033,7 @@
     </p:spTree>
     <p:extLst>
       <p:ext uri="{BB962C8B-B14F-4D97-AF65-F5344CB8AC3E}">
-        <p14:creationId xmlns:p14="http://schemas.microsoft.com/office/powerpoint/2010/main" val="4119011201"/>
+        <p14:creationId xmlns:p14="http://schemas.microsoft.com/office/powerpoint/2010/main" val="269069042"/>
       </p:ext>
     </p:extLst>
   </p:cSld>
@@ -7797,7 +9065,7 @@
           <p:cNvPr id="5" name="TextBox 4">
             <a:extLst>
               <a:ext uri="{FF2B5EF4-FFF2-40B4-BE49-F238E27FC236}">
-                <a16:creationId xmlns:a16="http://schemas.microsoft.com/office/drawing/2014/main" id="{A338DE63-17E2-4F9D-5DAD-71F4933850F0}"/>
+                <a16:creationId xmlns:a16="http://schemas.microsoft.com/office/drawing/2014/main" id="{28EFEA92-B0BC-F21F-25FF-D348C079300A}"/>
               </a:ext>
             </a:extLst>
           </p:cNvPr>
@@ -7806,8 +9074,8 @@
         </p:nvSpPr>
         <p:spPr>
           <a:xfrm>
-            <a:off x="370629" y="1762245"/>
-            <a:ext cx="4011998" cy="2585323"/>
+            <a:off x="1463581" y="1349303"/>
+            <a:ext cx="3429000" cy="1339341"/>
           </a:xfrm>
           <a:prstGeom prst="rect">
             <a:avLst/>
@@ -7821,28 +9089,38 @@
           <a:lstStyle/>
           <a:p>
             <a:r>
-              <a:rPr lang="en-US" dirty="0"/>
-              <a:t>3️⃣ Hiring-to-Attrition Ratio</a:t>
-            </a:r>
-          </a:p>
-          <a:p>
-            <a:pPr marL="285750" indent="-285750">
+              <a:rPr lang="en-US" sz="1013" dirty="0"/>
+              <a:t>2️⃣ Upskilling &amp; Training Effectiveness</a:t>
+            </a:r>
+          </a:p>
+          <a:p>
+            <a:pPr marL="214303" indent="-214303">
               <a:buFont typeface="Arial" panose="020B0604020202020204" pitchFamily="34" charset="0"/>
               <a:buChar char="•"/>
             </a:pPr>
             <a:r>
-              <a:rPr lang="en-US" dirty="0"/>
-              <a:t>Current hiring levels do not sufficiently offset attrition in key roles.</a:t>
-            </a:r>
-          </a:p>
-          <a:p>
-            <a:pPr marL="285750" indent="-285750">
+              <a:rPr lang="en-US" sz="1013" dirty="0"/>
+              <a:t>65% of employees have completed or are in progress with upskilling programs.</a:t>
+            </a:r>
+          </a:p>
+          <a:p>
+            <a:pPr marL="214303" indent="-214303">
               <a:buFont typeface="Arial" panose="020B0604020202020204" pitchFamily="34" charset="0"/>
               <a:buChar char="•"/>
             </a:pPr>
             <a:r>
-              <a:rPr lang="en-US" dirty="0"/>
-              <a:t>The hiring-to-attrition ratio has worsened due to the 2023 hiring freeze, creating risks of critical talent shortfalls in SDV development functions.</a:t>
+              <a:rPr lang="en-US" sz="1013" dirty="0"/>
+              <a:t>However, current tracking does not confirm if newly acquired skills match SDV-critical needs.</a:t>
+            </a:r>
+          </a:p>
+          <a:p>
+            <a:pPr marL="214303" indent="-214303">
+              <a:buFont typeface="Arial" panose="020B0604020202020204" pitchFamily="34" charset="0"/>
+              <a:buChar char="•"/>
+            </a:pPr>
+            <a:r>
+              <a:rPr lang="en-US" sz="1013" dirty="0"/>
+              <a:t>Next step: A deeper fit-gap analysis with the skills database is required to measure upskilling ROI and coverage of critical skill areas.</a:t>
             </a:r>
           </a:p>
         </p:txBody>
@@ -7852,67 +9130,48 @@
           <p:cNvPr id="8" name="Title 1">
             <a:extLst>
               <a:ext uri="{FF2B5EF4-FFF2-40B4-BE49-F238E27FC236}">
-                <a16:creationId xmlns:a16="http://schemas.microsoft.com/office/drawing/2014/main" id="{AF40D974-DB05-67C2-8239-83266E465C76}"/>
+                <a16:creationId xmlns:a16="http://schemas.microsoft.com/office/drawing/2014/main" id="{7F5074A6-FF71-1B0F-A4E5-870F98D997B1}"/>
               </a:ext>
             </a:extLst>
           </p:cNvPr>
-          <p:cNvSpPr>
-            <a:spLocks noGrp="1"/>
+          <p:cNvSpPr txBox="1">
+            <a:spLocks/>
           </p:cNvSpPr>
-          <p:nvPr>
-            <p:ph type="title"/>
-          </p:nvPr>
-        </p:nvSpPr>
-        <p:spPr>
-          <a:xfrm>
-            <a:off x="457200" y="274638"/>
-            <a:ext cx="8229600" cy="650583"/>
-          </a:xfrm>
-        </p:spPr>
-        <p:txBody>
-          <a:bodyPr>
-            <a:noAutofit/>
-          </a:bodyPr>
-          <a:lstStyle/>
-          <a:p>
-            <a:r>
-              <a:rPr lang="en-US" sz="3600" dirty="0"/>
-              <a:t>SDV Talent Gap Analysis (3/4)</a:t>
-            </a:r>
-          </a:p>
-        </p:txBody>
-      </p:sp>
-      <p:sp>
-        <p:nvSpPr>
-          <p:cNvPr id="10" name="TextBox 9">
-            <a:extLst>
-              <a:ext uri="{FF2B5EF4-FFF2-40B4-BE49-F238E27FC236}">
-                <a16:creationId xmlns:a16="http://schemas.microsoft.com/office/drawing/2014/main" id="{12EE5DB4-4DC3-6BD1-DCE6-11AA9E222A58}"/>
-              </a:ext>
-            </a:extLst>
-          </p:cNvPr>
-          <p:cNvSpPr txBox="1"/>
           <p:nvPr/>
         </p:nvSpPr>
         <p:spPr>
           <a:xfrm>
-            <a:off x="457200" y="5937031"/>
-            <a:ext cx="8229600" cy="646331"/>
+            <a:off x="295200" y="205984"/>
+            <a:ext cx="6172200" cy="487937"/>
           </a:xfrm>
           <a:prstGeom prst="rect">
             <a:avLst/>
           </a:prstGeom>
-          <a:noFill/>
         </p:spPr>
         <p:txBody>
-          <a:bodyPr wrap="square">
-            <a:spAutoFit/>
+          <a:bodyPr vert="horz" lIns="68580" tIns="34291" rIns="68580" bIns="34291" rtlCol="0" anchor="ctr">
+            <a:noAutofit/>
           </a:bodyPr>
-          <a:lstStyle/>
-          <a:p>
-            <a:r>
-              <a:rPr lang="en-US" dirty="0"/>
-              <a:t>Implication: Scenario plan for proactive hiring once market conditions stabilize to close emerging talent gaps.</a:t>
+          <a:lstStyle>
+            <a:lvl1pPr algn="ctr" defTabSz="457200" rtl="0" eaLnBrk="1" latinLnBrk="0" hangingPunct="1">
+              <a:spcBef>
+                <a:spcPct val="0"/>
+              </a:spcBef>
+              <a:buNone/>
+              <a:defRPr sz="4400" kern="1200">
+                <a:solidFill>
+                  <a:schemeClr val="tx1"/>
+                </a:solidFill>
+                <a:latin typeface="+mj-lt"/>
+                <a:ea typeface="+mj-ea"/>
+                <a:cs typeface="+mj-cs"/>
+              </a:defRPr>
+            </a:lvl1pPr>
+          </a:lstStyle>
+          <a:p>
+            <a:r>
+              <a:rPr lang="en-US" sz="1800" dirty="0"/>
+              <a:t>Re- &amp; upskilling programs are utilized by the majority however it remains unclear the skills match the gap</a:t>
             </a:r>
           </a:p>
         </p:txBody>
@@ -7922,7 +9181,7 @@
           <p:cNvPr id="11" name="Rectangle 10">
             <a:extLst>
               <a:ext uri="{FF2B5EF4-FFF2-40B4-BE49-F238E27FC236}">
-                <a16:creationId xmlns:a16="http://schemas.microsoft.com/office/drawing/2014/main" id="{515801C6-872E-67CE-03B9-F0F37BBD7B35}"/>
+                <a16:creationId xmlns:a16="http://schemas.microsoft.com/office/drawing/2014/main" id="{3AB01521-C2C7-C364-44F3-84C048872A45}"/>
               </a:ext>
             </a:extLst>
           </p:cNvPr>
@@ -7931,8 +9190,8 @@
         </p:nvSpPr>
         <p:spPr>
           <a:xfrm>
-            <a:off x="5269973" y="1533367"/>
-            <a:ext cx="3598083" cy="4290646"/>
+            <a:off x="5095484" y="1150030"/>
+            <a:ext cx="2698563" cy="3217985"/>
           </a:xfrm>
           <a:prstGeom prst="rect">
             <a:avLst/>
@@ -7958,7 +9217,251 @@
           <a:p>
             <a:pPr algn="ctr"/>
             <a:r>
-              <a:rPr lang="en-US" dirty="0"/>
+              <a:rPr lang="en-US" sz="1013" dirty="0"/>
+              <a:t>Chart</a:t>
+            </a:r>
+          </a:p>
+        </p:txBody>
+      </p:sp>
+      <p:sp>
+        <p:nvSpPr>
+          <p:cNvPr id="2" name="TextBox 1">
+            <a:extLst>
+              <a:ext uri="{FF2B5EF4-FFF2-40B4-BE49-F238E27FC236}">
+                <a16:creationId xmlns:a16="http://schemas.microsoft.com/office/drawing/2014/main" id="{9C3E8682-77BA-3E08-CE08-E46B6C4C0E75}"/>
+              </a:ext>
+            </a:extLst>
+          </p:cNvPr>
+          <p:cNvSpPr txBox="1"/>
+          <p:nvPr/>
+        </p:nvSpPr>
+        <p:spPr>
+          <a:xfrm>
+            <a:off x="1429091" y="4748812"/>
+            <a:ext cx="6422345" cy="276999"/>
+          </a:xfrm>
+          <a:prstGeom prst="rect">
+            <a:avLst/>
+          </a:prstGeom>
+          <a:noFill/>
+          <a:ln w="12700">
+            <a:solidFill>
+              <a:schemeClr val="tx2">
+                <a:lumMod val="75000"/>
+              </a:schemeClr>
+            </a:solidFill>
+          </a:ln>
+        </p:spPr>
+        <p:txBody>
+          <a:bodyPr wrap="square">
+            <a:spAutoFit/>
+          </a:bodyPr>
+          <a:lstStyle/>
+          <a:p>
+            <a:r>
+              <a:rPr lang="en-US" sz="1200" dirty="0"/>
+              <a:t>Implication: Align upskilling investments with actual SDV skill gaps and role requirements.</a:t>
+            </a:r>
+          </a:p>
+        </p:txBody>
+      </p:sp>
+    </p:spTree>
+    <p:extLst>
+      <p:ext uri="{BB962C8B-B14F-4D97-AF65-F5344CB8AC3E}">
+        <p14:creationId xmlns:p14="http://schemas.microsoft.com/office/powerpoint/2010/main" val="4119011201"/>
+      </p:ext>
+    </p:extLst>
+  </p:cSld>
+  <p:clrMapOvr>
+    <a:masterClrMapping/>
+  </p:clrMapOvr>
+</p:sld>
+</file>
+
+<file path=ppt/slides/slide6.xml><?xml version="1.0" encoding="utf-8"?>
+<p:sld xmlns:a="http://schemas.openxmlformats.org/drawingml/2006/main" xmlns:r="http://schemas.openxmlformats.org/officeDocument/2006/relationships" xmlns:p="http://schemas.openxmlformats.org/presentationml/2006/main">
+  <p:cSld>
+    <p:spTree>
+      <p:nvGrpSpPr>
+        <p:cNvPr id="1" name=""/>
+        <p:cNvGrpSpPr/>
+        <p:nvPr/>
+      </p:nvGrpSpPr>
+      <p:grpSpPr>
+        <a:xfrm>
+          <a:off x="0" y="0"/>
+          <a:ext cx="0" cy="0"/>
+          <a:chOff x="0" y="0"/>
+          <a:chExt cx="0" cy="0"/>
+        </a:xfrm>
+      </p:grpSpPr>
+      <p:sp>
+        <p:nvSpPr>
+          <p:cNvPr id="5" name="TextBox 4">
+            <a:extLst>
+              <a:ext uri="{FF2B5EF4-FFF2-40B4-BE49-F238E27FC236}">
+                <a16:creationId xmlns:a16="http://schemas.microsoft.com/office/drawing/2014/main" id="{A338DE63-17E2-4F9D-5DAD-71F4933850F0}"/>
+              </a:ext>
+            </a:extLst>
+          </p:cNvPr>
+          <p:cNvSpPr txBox="1"/>
+          <p:nvPr/>
+        </p:nvSpPr>
+        <p:spPr>
+          <a:xfrm>
+            <a:off x="1420977" y="1321687"/>
+            <a:ext cx="3008999" cy="1027589"/>
+          </a:xfrm>
+          <a:prstGeom prst="rect">
+            <a:avLst/>
+          </a:prstGeom>
+          <a:noFill/>
+        </p:spPr>
+        <p:txBody>
+          <a:bodyPr wrap="square">
+            <a:spAutoFit/>
+          </a:bodyPr>
+          <a:lstStyle/>
+          <a:p>
+            <a:r>
+              <a:rPr lang="en-US" sz="1013" dirty="0"/>
+              <a:t>3️⃣ Hiring-to-Attrition Ratio</a:t>
+            </a:r>
+          </a:p>
+          <a:p>
+            <a:pPr marL="214303" indent="-214303">
+              <a:buFont typeface="Arial" panose="020B0604020202020204" pitchFamily="34" charset="0"/>
+              <a:buChar char="•"/>
+            </a:pPr>
+            <a:r>
+              <a:rPr lang="en-US" sz="1013" dirty="0"/>
+              <a:t>Current hiring levels do not sufficiently offset attrition in key roles.</a:t>
+            </a:r>
+          </a:p>
+          <a:p>
+            <a:pPr marL="214303" indent="-214303">
+              <a:buFont typeface="Arial" panose="020B0604020202020204" pitchFamily="34" charset="0"/>
+              <a:buChar char="•"/>
+            </a:pPr>
+            <a:r>
+              <a:rPr lang="en-US" sz="1013" dirty="0"/>
+              <a:t>The hiring-to-attrition ratio has worsened due to the 2023 hiring freeze, creating risks of critical talent shortfalls in SDV development functions.</a:t>
+            </a:r>
+          </a:p>
+        </p:txBody>
+      </p:sp>
+      <p:sp>
+        <p:nvSpPr>
+          <p:cNvPr id="8" name="Title 1">
+            <a:extLst>
+              <a:ext uri="{FF2B5EF4-FFF2-40B4-BE49-F238E27FC236}">
+                <a16:creationId xmlns:a16="http://schemas.microsoft.com/office/drawing/2014/main" id="{AF40D974-DB05-67C2-8239-83266E465C76}"/>
+              </a:ext>
+            </a:extLst>
+          </p:cNvPr>
+          <p:cNvSpPr>
+            <a:spLocks noGrp="1"/>
+          </p:cNvSpPr>
+          <p:nvPr>
+            <p:ph type="title"/>
+          </p:nvPr>
+        </p:nvSpPr>
+        <p:spPr>
+          <a:xfrm>
+            <a:off x="295200" y="205984"/>
+            <a:ext cx="6172200" cy="487937"/>
+          </a:xfrm>
+        </p:spPr>
+        <p:txBody>
+          <a:bodyPr>
+            <a:noAutofit/>
+          </a:bodyPr>
+          <a:lstStyle/>
+          <a:p>
+            <a:r>
+              <a:rPr lang="en-US" sz="2700" dirty="0"/>
+              <a:t>SDV Talent Gap Analysis (3/4)</a:t>
+            </a:r>
+          </a:p>
+        </p:txBody>
+      </p:sp>
+      <p:sp>
+        <p:nvSpPr>
+          <p:cNvPr id="10" name="TextBox 9">
+            <a:extLst>
+              <a:ext uri="{FF2B5EF4-FFF2-40B4-BE49-F238E27FC236}">
+                <a16:creationId xmlns:a16="http://schemas.microsoft.com/office/drawing/2014/main" id="{12EE5DB4-4DC3-6BD1-DCE6-11AA9E222A58}"/>
+              </a:ext>
+            </a:extLst>
+          </p:cNvPr>
+          <p:cNvSpPr txBox="1"/>
+          <p:nvPr/>
+        </p:nvSpPr>
+        <p:spPr>
+          <a:xfrm>
+            <a:off x="1485900" y="4452778"/>
+            <a:ext cx="6172200" cy="248209"/>
+          </a:xfrm>
+          <a:prstGeom prst="rect">
+            <a:avLst/>
+          </a:prstGeom>
+          <a:noFill/>
+        </p:spPr>
+        <p:txBody>
+          <a:bodyPr wrap="square">
+            <a:spAutoFit/>
+          </a:bodyPr>
+          <a:lstStyle/>
+          <a:p>
+            <a:r>
+              <a:rPr lang="en-US" sz="1013" dirty="0"/>
+              <a:t>Implication: Scenario plan for proactive hiring once market conditions stabilize to close emerging talent gaps.</a:t>
+            </a:r>
+          </a:p>
+        </p:txBody>
+      </p:sp>
+      <p:sp>
+        <p:nvSpPr>
+          <p:cNvPr id="11" name="Rectangle 10">
+            <a:extLst>
+              <a:ext uri="{FF2B5EF4-FFF2-40B4-BE49-F238E27FC236}">
+                <a16:creationId xmlns:a16="http://schemas.microsoft.com/office/drawing/2014/main" id="{515801C6-872E-67CE-03B9-F0F37BBD7B35}"/>
+              </a:ext>
+            </a:extLst>
+          </p:cNvPr>
+          <p:cNvSpPr/>
+          <p:nvPr/>
+        </p:nvSpPr>
+        <p:spPr>
+          <a:xfrm>
+            <a:off x="5095484" y="1150030"/>
+            <a:ext cx="2698563" cy="3217985"/>
+          </a:xfrm>
+          <a:prstGeom prst="rect">
+            <a:avLst/>
+          </a:prstGeom>
+        </p:spPr>
+        <p:style>
+          <a:lnRef idx="1">
+            <a:schemeClr val="accent1"/>
+          </a:lnRef>
+          <a:fillRef idx="3">
+            <a:schemeClr val="accent1"/>
+          </a:fillRef>
+          <a:effectRef idx="2">
+            <a:schemeClr val="accent1"/>
+          </a:effectRef>
+          <a:fontRef idx="minor">
+            <a:schemeClr val="lt1"/>
+          </a:fontRef>
+        </p:style>
+        <p:txBody>
+          <a:bodyPr rtlCol="0" anchor="ctr"/>
+          <a:lstStyle/>
+          <a:p>
+            <a:pPr algn="ctr"/>
+            <a:r>
+              <a:rPr lang="en-US" sz="1013" dirty="0"/>
               <a:t>Chart</a:t>
             </a:r>
           </a:p>

</xml_diff>